<commit_message>
Updates to DNP 2019 presentation
Changes made after meeting with DF yesterday.
</commit_message>
<xml_diff>
--- a/Presentations/DNP_October2019/tropiano_dnp_october2019.pptx
+++ b/Presentations/DNP_October2019/tropiano_dnp_october2019.pptx
@@ -25,14 +25,14 @@
     <p:sldId id="296" r:id="rId16"/>
     <p:sldId id="297" r:id="rId17"/>
     <p:sldId id="298" r:id="rId18"/>
-    <p:sldId id="299" r:id="rId19"/>
-    <p:sldId id="300" r:id="rId20"/>
-    <p:sldId id="287" r:id="rId21"/>
-    <p:sldId id="288" r:id="rId22"/>
-    <p:sldId id="273" r:id="rId23"/>
-    <p:sldId id="285" r:id="rId24"/>
-    <p:sldId id="301" r:id="rId25"/>
-    <p:sldId id="303" r:id="rId26"/>
+    <p:sldId id="287" r:id="rId19"/>
+    <p:sldId id="299" r:id="rId20"/>
+    <p:sldId id="300" r:id="rId21"/>
+    <p:sldId id="273" r:id="rId22"/>
+    <p:sldId id="285" r:id="rId23"/>
+    <p:sldId id="301" r:id="rId24"/>
+    <p:sldId id="303" r:id="rId25"/>
+    <p:sldId id="288" r:id="rId26"/>
   </p:sldIdLst>
   <p:sldSz cx="12192000" cy="6858000"/>
   <p:notesSz cx="6858000" cy="9144000"/>
@@ -161,6 +161,11 @@
       </a:defRPr>
     </a:lvl9pPr>
   </p:defaultTextStyle>
+  <p:extLst>
+    <p:ext uri="{EFAFB233-063F-42B5-8137-9DF3F51BA10A}">
+      <p15:sldGuideLst xmlns:p15="http://schemas.microsoft.com/office/powerpoint/2012/main"/>
+    </p:ext>
+  </p:extLst>
 </p:presentation>
 </file>
 
@@ -286,7 +291,7 @@
               <a:pPr>
                 <a:defRPr/>
               </a:pPr>
-              <a:t>10/10/19</a:t>
+              <a:t>10/11/19</a:t>
             </a:fld>
             <a:endParaRPr lang="en-US" dirty="0"/>
           </a:p>
@@ -1073,7 +1078,7 @@
               <a:pPr>
                 <a:defRPr/>
               </a:pPr>
-              <a:t>10/10/19</a:t>
+              <a:t>10/11/19</a:t>
             </a:fld>
             <a:endParaRPr lang="en-US" dirty="0"/>
           </a:p>
@@ -1298,7 +1303,7 @@
               <a:pPr>
                 <a:defRPr/>
               </a:pPr>
-              <a:t>10/10/19</a:t>
+              <a:t>10/11/19</a:t>
             </a:fld>
             <a:endParaRPr lang="en-US" dirty="0"/>
           </a:p>
@@ -1533,7 +1538,7 @@
               <a:pPr>
                 <a:defRPr/>
               </a:pPr>
-              <a:t>10/10/19</a:t>
+              <a:t>10/11/19</a:t>
             </a:fld>
             <a:endParaRPr lang="en-US" dirty="0"/>
           </a:p>
@@ -1758,7 +1763,7 @@
               <a:pPr>
                 <a:defRPr/>
               </a:pPr>
-              <a:t>10/10/19</a:t>
+              <a:t>10/11/19</a:t>
             </a:fld>
             <a:endParaRPr lang="en-US" dirty="0"/>
           </a:p>
@@ -2060,7 +2065,7 @@
               <a:pPr>
                 <a:defRPr/>
               </a:pPr>
-              <a:t>10/10/19</a:t>
+              <a:t>10/11/19</a:t>
             </a:fld>
             <a:endParaRPr lang="en-US" dirty="0"/>
           </a:p>
@@ -2352,7 +2357,7 @@
               <a:pPr>
                 <a:defRPr/>
               </a:pPr>
-              <a:t>10/10/19</a:t>
+              <a:t>10/11/19</a:t>
             </a:fld>
             <a:endParaRPr lang="en-US" dirty="0"/>
           </a:p>
@@ -2791,7 +2796,7 @@
               <a:pPr>
                 <a:defRPr/>
               </a:pPr>
-              <a:t>10/10/19</a:t>
+              <a:t>10/11/19</a:t>
             </a:fld>
             <a:endParaRPr lang="en-US" dirty="0"/>
           </a:p>
@@ -2959,7 +2964,7 @@
               <a:pPr>
                 <a:defRPr/>
               </a:pPr>
-              <a:t>10/10/19</a:t>
+              <a:t>10/11/19</a:t>
             </a:fld>
             <a:endParaRPr lang="en-US" dirty="0"/>
           </a:p>
@@ -3099,7 +3104,7 @@
               <a:pPr>
                 <a:defRPr/>
               </a:pPr>
-              <a:t>10/10/19</a:t>
+              <a:t>10/11/19</a:t>
             </a:fld>
             <a:endParaRPr lang="en-US" dirty="0"/>
           </a:p>
@@ -3437,7 +3442,7 @@
               <a:pPr>
                 <a:defRPr/>
               </a:pPr>
-              <a:t>10/10/19</a:t>
+              <a:t>10/11/19</a:t>
             </a:fld>
             <a:endParaRPr lang="en-US" dirty="0"/>
           </a:p>
@@ -3755,7 +3760,7 @@
               <a:pPr>
                 <a:defRPr/>
               </a:pPr>
-              <a:t>10/10/19</a:t>
+              <a:t>10/11/19</a:t>
             </a:fld>
             <a:endParaRPr lang="en-US" dirty="0"/>
           </a:p>
@@ -4080,7 +4085,7 @@
               <a:pPr>
                 <a:defRPr/>
               </a:pPr>
-              <a:t>10/10/19</a:t>
+              <a:t>10/11/19</a:t>
             </a:fld>
             <a:endParaRPr lang="en-US" dirty="0"/>
           </a:p>
@@ -5216,6 +5221,19 @@
               </a:rPr>
               <a:t>Universality in potential matrix elements is due to equivalent low-energy phase shifts</a:t>
             </a:r>
+            <a:r>
+              <a:rPr lang="en-US" altLang="en-US" sz="2200" baseline="30000" dirty="0">
+                <a:solidFill>
+                  <a:srgbClr val="C00000"/>
+                </a:solidFill>
+              </a:rPr>
+              <a:t>1</a:t>
+            </a:r>
+            <a:endParaRPr lang="en-US" altLang="en-US" sz="2200" dirty="0">
+              <a:solidFill>
+                <a:srgbClr val="C00000"/>
+              </a:solidFill>
+            </a:endParaRPr>
           </a:p>
         </p:txBody>
       </p:sp>
@@ -5399,6 +5417,85 @@
           </a:extLst>
         </p:spPr>
       </p:pic>
+      <p:sp>
+        <p:nvSpPr>
+          <p:cNvPr id="2" name="TextBox 1">
+            <a:extLst>
+              <a:ext uri="{FF2B5EF4-FFF2-40B4-BE49-F238E27FC236}">
+                <a16:creationId xmlns:a16="http://schemas.microsoft.com/office/drawing/2014/main" id="{E83E08E1-3135-1749-B2DB-982E8128202A}"/>
+              </a:ext>
+            </a:extLst>
+          </p:cNvPr>
+          <p:cNvSpPr txBox="1"/>
+          <p:nvPr/>
+        </p:nvSpPr>
+        <p:spPr>
+          <a:xfrm>
+            <a:off x="8039180" y="6381779"/>
+            <a:ext cx="4163334" cy="451406"/>
+          </a:xfrm>
+          <a:prstGeom prst="rect">
+            <a:avLst/>
+          </a:prstGeom>
+          <a:noFill/>
+        </p:spPr>
+        <p:txBody>
+          <a:bodyPr wrap="square" rtlCol="0">
+            <a:spAutoFit/>
+          </a:bodyPr>
+          <a:lstStyle/>
+          <a:p>
+            <a:r>
+              <a:rPr lang="en-US" sz="1400" baseline="30000" dirty="0">
+                <a:latin typeface="Arial" panose="020B0604020202020204" pitchFamily="34" charset="0"/>
+                <a:cs typeface="Arial" panose="020B0604020202020204" pitchFamily="34" charset="0"/>
+              </a:rPr>
+              <a:t>1</a:t>
+            </a:r>
+            <a:r>
+              <a:rPr lang="en-US" sz="1400" dirty="0">
+                <a:latin typeface="Arial" panose="020B0604020202020204" pitchFamily="34" charset="0"/>
+                <a:cs typeface="Arial" panose="020B0604020202020204" pitchFamily="34" charset="0"/>
+              </a:rPr>
+              <a:t>B. </a:t>
+            </a:r>
+            <a:r>
+              <a:rPr lang="en-US" sz="1400" dirty="0" err="1">
+                <a:latin typeface="Arial" panose="020B0604020202020204" pitchFamily="34" charset="0"/>
+                <a:cs typeface="Arial" panose="020B0604020202020204" pitchFamily="34" charset="0"/>
+              </a:rPr>
+              <a:t>Dainton</a:t>
+            </a:r>
+            <a:r>
+              <a:rPr lang="en-US" sz="1400" dirty="0">
+                <a:latin typeface="Arial" panose="020B0604020202020204" pitchFamily="34" charset="0"/>
+                <a:cs typeface="Arial" panose="020B0604020202020204" pitchFamily="34" charset="0"/>
+              </a:rPr>
+              <a:t> et al., Phys. Rev. C </a:t>
+            </a:r>
+            <a:r>
+              <a:rPr lang="en-US" sz="1400" b="1" dirty="0">
+                <a:latin typeface="Arial" panose="020B0604020202020204" pitchFamily="34" charset="0"/>
+                <a:cs typeface="Arial" panose="020B0604020202020204" pitchFamily="34" charset="0"/>
+              </a:rPr>
+              <a:t>89</a:t>
+            </a:r>
+            <a:r>
+              <a:rPr lang="en-US" sz="1400" dirty="0">
+                <a:latin typeface="Arial" panose="020B0604020202020204" pitchFamily="34" charset="0"/>
+                <a:cs typeface="Arial" panose="020B0604020202020204" pitchFamily="34" charset="0"/>
+              </a:rPr>
+              <a:t>, 014001 (2014) </a:t>
+            </a:r>
+          </a:p>
+          <a:p>
+            <a:endParaRPr lang="en-US" sz="1400" baseline="30000" dirty="0">
+              <a:latin typeface="Arial" panose="020B0604020202020204" pitchFamily="34" charset="0"/>
+              <a:cs typeface="Arial" panose="020B0604020202020204" pitchFamily="34" charset="0"/>
+            </a:endParaRPr>
+          </a:p>
+        </p:txBody>
+      </p:sp>
     </p:spTree>
     <p:extLst>
       <p:ext uri="{BB962C8B-B14F-4D97-AF65-F5344CB8AC3E}">
@@ -5466,8 +5563,8 @@
           </a:p>
         </p:txBody>
       </p:sp>
-      <mc:AlternateContent xmlns:mc="http://schemas.openxmlformats.org/markup-compatibility/2006">
-        <mc:Choice xmlns:a14="http://schemas.microsoft.com/office/drawing/2010/main" Requires="a14">
+      <mc:AlternateContent xmlns:mc="http://schemas.openxmlformats.org/markup-compatibility/2006" xmlns:a14="http://schemas.microsoft.com/office/drawing/2010/main">
+        <mc:Choice Requires="a14">
           <p:sp>
             <p:nvSpPr>
               <p:cNvPr id="24578" name="Content Placeholder 2">
@@ -5539,16 +5636,7 @@
                               </a:solidFill>
                               <a:latin typeface="Cambria Math" panose="02040503050406030204" pitchFamily="18" charset="0"/>
                             </a:rPr>
-                            <m:t>𝑑</m:t>
-                          </m:r>
-                          <m:r>
-                            <a:rPr lang="en-US" altLang="en-US" b="0" i="1" smtClean="0">
-                              <a:solidFill>
-                                <a:srgbClr val="C00000"/>
-                              </a:solidFill>
-                              <a:latin typeface="Cambria Math" panose="02040503050406030204" pitchFamily="18" charset="0"/>
-                            </a:rPr>
-                            <m:t>𝑂</m:t>
+                            <m:t>𝑑𝑂</m:t>
                           </m:r>
                           <m:r>
                             <a:rPr lang="en-US" altLang="en-US" b="0" i="1" smtClean="0">
@@ -5701,7 +5789,7 @@
             </p:txBody>
           </p:sp>
         </mc:Choice>
-        <mc:Fallback>
+        <mc:Fallback xmlns="">
           <p:sp>
             <p:nvSpPr>
               <p:cNvPr id="24578" name="Content Placeholder 2">
@@ -5803,8 +5891,8 @@
           </a:p>
         </p:txBody>
       </p:sp>
-      <mc:AlternateContent xmlns:mc="http://schemas.openxmlformats.org/markup-compatibility/2006">
-        <mc:Choice xmlns:a14="http://schemas.microsoft.com/office/drawing/2010/main" Requires="a14">
+      <mc:AlternateContent xmlns:mc="http://schemas.openxmlformats.org/markup-compatibility/2006" xmlns:a14="http://schemas.microsoft.com/office/drawing/2010/main">
+        <mc:Choice Requires="a14">
           <p:sp>
             <p:nvSpPr>
               <p:cNvPr id="24578" name="Content Placeholder 2">
@@ -5876,16 +5964,7 @@
                               </a:solidFill>
                               <a:latin typeface="Cambria Math" panose="02040503050406030204" pitchFamily="18" charset="0"/>
                             </a:rPr>
-                            <m:t>𝑑</m:t>
-                          </m:r>
-                          <m:r>
-                            <a:rPr lang="en-US" altLang="en-US" b="0" i="1" smtClean="0">
-                              <a:solidFill>
-                                <a:schemeClr val="tx1"/>
-                              </a:solidFill>
-                              <a:latin typeface="Cambria Math" panose="02040503050406030204" pitchFamily="18" charset="0"/>
-                            </a:rPr>
-                            <m:t>𝑂</m:t>
+                            <m:t>𝑑𝑂</m:t>
                           </m:r>
                           <m:r>
                             <a:rPr lang="en-US" altLang="en-US" b="0" i="1" smtClean="0">
@@ -6066,7 +6145,7 @@
             </p:txBody>
           </p:sp>
         </mc:Choice>
-        <mc:Fallback>
+        <mc:Fallback xmlns="">
           <p:sp>
             <p:nvSpPr>
               <p:cNvPr id="24578" name="Content Placeholder 2">
@@ -6173,8 +6252,8 @@
           </a:p>
         </p:txBody>
       </p:sp>
-      <mc:AlternateContent xmlns:mc="http://schemas.openxmlformats.org/markup-compatibility/2006">
-        <mc:Choice xmlns:a14="http://schemas.microsoft.com/office/drawing/2010/main" Requires="a14">
+      <mc:AlternateContent xmlns:mc="http://schemas.openxmlformats.org/markup-compatibility/2006" xmlns:a14="http://schemas.microsoft.com/office/drawing/2010/main">
+        <mc:Choice Requires="a14">
           <p:sp>
             <p:nvSpPr>
               <p:cNvPr id="24578" name="Content Placeholder 2">
@@ -6430,7 +6509,7 @@
             </p:txBody>
           </p:sp>
         </mc:Choice>
-        <mc:Fallback>
+        <mc:Fallback xmlns="">
           <p:sp>
             <p:nvSpPr>
               <p:cNvPr id="24578" name="Content Placeholder 2">
@@ -6537,8 +6616,8 @@
           </a:p>
         </p:txBody>
       </p:sp>
-      <mc:AlternateContent xmlns:mc="http://schemas.openxmlformats.org/markup-compatibility/2006">
-        <mc:Choice xmlns:a14="http://schemas.microsoft.com/office/drawing/2010/main" Requires="a14">
+      <mc:AlternateContent xmlns:mc="http://schemas.openxmlformats.org/markup-compatibility/2006" xmlns:a14="http://schemas.microsoft.com/office/drawing/2010/main">
+        <mc:Choice Requires="a14">
           <p:sp>
             <p:nvSpPr>
               <p:cNvPr id="25602" name="Content Placeholder 2">
@@ -6870,7 +6949,7 @@
             </p:txBody>
           </p:sp>
         </mc:Choice>
-        <mc:Fallback>
+        <mc:Fallback xmlns="">
           <p:sp>
             <p:nvSpPr>
               <p:cNvPr id="25602" name="Content Placeholder 2">
@@ -7034,8 +7113,8 @@
           </a:extLst>
         </p:spPr>
       </p:pic>
-      <mc:AlternateContent xmlns:mc="http://schemas.openxmlformats.org/markup-compatibility/2006">
-        <mc:Choice xmlns:a14="http://schemas.microsoft.com/office/drawing/2010/main" Requires="a14">
+      <mc:AlternateContent xmlns:mc="http://schemas.openxmlformats.org/markup-compatibility/2006" xmlns:a14="http://schemas.microsoft.com/office/drawing/2010/main">
+        <mc:Choice Requires="a14">
           <p:sp>
             <p:nvSpPr>
               <p:cNvPr id="7" name="TextBox 6">
@@ -7304,7 +7383,7 @@
             </p:txBody>
           </p:sp>
         </mc:Choice>
-        <mc:Fallback>
+        <mc:Fallback xmlns="">
           <p:sp>
             <p:nvSpPr>
               <p:cNvPr id="7" name="TextBox 6">
@@ -7416,8 +7495,8 @@
           </a:p>
         </p:txBody>
       </p:sp>
-      <mc:AlternateContent xmlns:mc="http://schemas.openxmlformats.org/markup-compatibility/2006">
-        <mc:Choice xmlns:a14="http://schemas.microsoft.com/office/drawing/2010/main" Requires="a14">
+      <mc:AlternateContent xmlns:mc="http://schemas.openxmlformats.org/markup-compatibility/2006" xmlns:a14="http://schemas.microsoft.com/office/drawing/2010/main">
+        <mc:Choice Requires="a14">
           <p:sp>
             <p:nvSpPr>
               <p:cNvPr id="25602" name="Content Placeholder 2">
@@ -7799,7 +7878,7 @@
             </p:txBody>
           </p:sp>
         </mc:Choice>
-        <mc:Fallback>
+        <mc:Fallback xmlns="">
           <p:sp>
             <p:nvSpPr>
               <p:cNvPr id="25602" name="Content Placeholder 2">
@@ -7963,8 +8042,8 @@
           </a:extLst>
         </p:spPr>
       </p:pic>
-      <mc:AlternateContent xmlns:mc="http://schemas.openxmlformats.org/markup-compatibility/2006">
-        <mc:Choice xmlns:a14="http://schemas.microsoft.com/office/drawing/2010/main" Requires="a14">
+      <mc:AlternateContent xmlns:mc="http://schemas.openxmlformats.org/markup-compatibility/2006" xmlns:a14="http://schemas.microsoft.com/office/drawing/2010/main">
+        <mc:Choice Requires="a14">
           <p:sp>
             <p:nvSpPr>
               <p:cNvPr id="6" name="TextBox 5">
@@ -8233,7 +8312,7 @@
             </p:txBody>
           </p:sp>
         </mc:Choice>
-        <mc:Fallback>
+        <mc:Fallback xmlns="">
           <p:sp>
             <p:nvSpPr>
               <p:cNvPr id="6" name="TextBox 5">
@@ -8345,8 +8424,8 @@
           </a:p>
         </p:txBody>
       </p:sp>
-      <mc:AlternateContent xmlns:mc="http://schemas.openxmlformats.org/markup-compatibility/2006">
-        <mc:Choice xmlns:a14="http://schemas.microsoft.com/office/drawing/2010/main" Requires="a14">
+      <mc:AlternateContent xmlns:mc="http://schemas.openxmlformats.org/markup-compatibility/2006" xmlns:a14="http://schemas.microsoft.com/office/drawing/2010/main">
+        <mc:Choice Requires="a14">
           <p:sp>
             <p:nvSpPr>
               <p:cNvPr id="25602" name="Content Placeholder 2">
@@ -8728,7 +8807,7 @@
             </p:txBody>
           </p:sp>
         </mc:Choice>
-        <mc:Fallback>
+        <mc:Fallback xmlns="">
           <p:sp>
             <p:nvSpPr>
               <p:cNvPr id="25602" name="Content Placeholder 2">
@@ -8952,8 +9031,8 @@
           </a:extLst>
         </p:spPr>
       </p:pic>
-      <mc:AlternateContent xmlns:mc="http://schemas.openxmlformats.org/markup-compatibility/2006">
-        <mc:Choice xmlns:a14="http://schemas.microsoft.com/office/drawing/2010/main" Requires="a14">
+      <mc:AlternateContent xmlns:mc="http://schemas.openxmlformats.org/markup-compatibility/2006" xmlns:a14="http://schemas.microsoft.com/office/drawing/2010/main">
+        <mc:Choice Requires="a14">
           <p:sp>
             <p:nvSpPr>
               <p:cNvPr id="8" name="TextBox 7">
@@ -9222,7 +9301,7 @@
             </p:txBody>
           </p:sp>
         </mc:Choice>
-        <mc:Fallback>
+        <mc:Fallback xmlns="">
           <p:sp>
             <p:nvSpPr>
               <p:cNvPr id="8" name="TextBox 7">
@@ -9334,8 +9413,8 @@
           </a:p>
         </p:txBody>
       </p:sp>
-      <mc:AlternateContent xmlns:mc="http://schemas.openxmlformats.org/markup-compatibility/2006">
-        <mc:Choice xmlns:a14="http://schemas.microsoft.com/office/drawing/2010/main" Requires="a14">
+      <mc:AlternateContent xmlns:mc="http://schemas.openxmlformats.org/markup-compatibility/2006" xmlns:a14="http://schemas.microsoft.com/office/drawing/2010/main">
+        <mc:Choice Requires="a14">
           <p:sp>
             <p:nvSpPr>
               <p:cNvPr id="25602" name="Content Placeholder 2">
@@ -9717,7 +9796,7 @@
             </p:txBody>
           </p:sp>
         </mc:Choice>
-        <mc:Fallback>
+        <mc:Fallback xmlns="">
           <p:sp>
             <p:nvSpPr>
               <p:cNvPr id="25602" name="Content Placeholder 2">
@@ -9941,8 +10020,8 @@
           </a:extLst>
         </p:spPr>
       </p:pic>
-      <mc:AlternateContent xmlns:mc="http://schemas.openxmlformats.org/markup-compatibility/2006">
-        <mc:Choice xmlns:a14="http://schemas.microsoft.com/office/drawing/2010/main" Requires="a14">
+      <mc:AlternateContent xmlns:mc="http://schemas.openxmlformats.org/markup-compatibility/2006" xmlns:a14="http://schemas.microsoft.com/office/drawing/2010/main">
+        <mc:Choice Requires="a14">
           <p:sp>
             <p:nvSpPr>
               <p:cNvPr id="8" name="TextBox 7">
@@ -10211,7 +10290,7 @@
             </p:txBody>
           </p:sp>
         </mc:Choice>
-        <mc:Fallback>
+        <mc:Fallback xmlns="">
           <p:sp>
             <p:nvSpPr>
               <p:cNvPr id="8" name="TextBox 7">
@@ -10256,8 +10335,8 @@
           </p:sp>
         </mc:Fallback>
       </mc:AlternateContent>
-      <mc:AlternateContent xmlns:mc="http://schemas.openxmlformats.org/markup-compatibility/2006">
-        <mc:Choice xmlns:a14="http://schemas.microsoft.com/office/drawing/2010/main" Requires="a14">
+      <mc:AlternateContent xmlns:mc="http://schemas.openxmlformats.org/markup-compatibility/2006" xmlns:a14="http://schemas.microsoft.com/office/drawing/2010/main">
+        <mc:Choice Requires="a14">
           <p:sp>
             <p:nvSpPr>
               <p:cNvPr id="2" name="TextBox 1">
@@ -10544,7 +10623,7 @@
             </p:txBody>
           </p:sp>
         </mc:Choice>
-        <mc:Fallback>
+        <mc:Fallback xmlns="">
           <p:sp>
             <p:nvSpPr>
               <p:cNvPr id="2" name="TextBox 1">
@@ -10608,6 +10687,752 @@
 </file>
 
 <file path=ppt/slides/slide18.xml><?xml version="1.0" encoding="utf-8"?>
+<p:sld xmlns:a="http://schemas.openxmlformats.org/drawingml/2006/main" xmlns:r="http://schemas.openxmlformats.org/officeDocument/2006/relationships" xmlns:p="http://schemas.openxmlformats.org/presentationml/2006/main">
+  <p:cSld>
+    <p:spTree>
+      <p:nvGrpSpPr>
+        <p:cNvPr id="1" name=""/>
+        <p:cNvGrpSpPr/>
+        <p:nvPr/>
+      </p:nvGrpSpPr>
+      <p:grpSpPr>
+        <a:xfrm>
+          <a:off x="0" y="0"/>
+          <a:ext cx="0" cy="0"/>
+          <a:chOff x="0" y="0"/>
+          <a:chExt cx="0" cy="0"/>
+        </a:xfrm>
+      </p:grpSpPr>
+      <p:sp>
+        <p:nvSpPr>
+          <p:cNvPr id="29697" name="Title 1">
+            <a:extLst>
+              <a:ext uri="{FF2B5EF4-FFF2-40B4-BE49-F238E27FC236}">
+                <a16:creationId xmlns:a16="http://schemas.microsoft.com/office/drawing/2014/main" id="{830C073B-E429-BD4E-BC96-7EB76A0C35C7}"/>
+              </a:ext>
+            </a:extLst>
+          </p:cNvPr>
+          <p:cNvSpPr>
+            <a:spLocks noGrp="1" noChangeArrowheads="1"/>
+          </p:cNvSpPr>
+          <p:nvPr>
+            <p:ph type="title"/>
+          </p:nvPr>
+        </p:nvSpPr>
+        <p:spPr/>
+        <p:txBody>
+          <a:bodyPr/>
+          <a:lstStyle/>
+          <a:p>
+            <a:pPr eaLnBrk="1" hangingPunct="1">
+              <a:lnSpc>
+                <a:spcPct val="100000"/>
+              </a:lnSpc>
+            </a:pPr>
+            <a:r>
+              <a:rPr lang="en-US" altLang="en-US" dirty="0">
+                <a:solidFill>
+                  <a:srgbClr val="002060"/>
+                </a:solidFill>
+              </a:rPr>
+              <a:t>Momentum projection operator</a:t>
+            </a:r>
+          </a:p>
+        </p:txBody>
+      </p:sp>
+      <mc:AlternateContent xmlns:mc="http://schemas.openxmlformats.org/markup-compatibility/2006" xmlns:a14="http://schemas.microsoft.com/office/drawing/2010/main">
+        <mc:Choice Requires="a14">
+          <p:sp>
+            <p:nvSpPr>
+              <p:cNvPr id="29698" name="Content Placeholder 2">
+                <a:extLst>
+                  <a:ext uri="{FF2B5EF4-FFF2-40B4-BE49-F238E27FC236}">
+                    <a16:creationId xmlns:a16="http://schemas.microsoft.com/office/drawing/2014/main" id="{5C90EF02-C1E2-2B4E-940D-292625AD1D37}"/>
+                  </a:ext>
+                </a:extLst>
+              </p:cNvPr>
+              <p:cNvSpPr>
+                <a:spLocks noGrp="1" noChangeArrowheads="1"/>
+              </p:cNvSpPr>
+              <p:nvPr>
+                <p:ph idx="1"/>
+              </p:nvPr>
+            </p:nvSpPr>
+            <p:spPr>
+              <a:xfrm>
+                <a:off x="8624528" y="2129918"/>
+                <a:ext cx="3389767" cy="4685095"/>
+              </a:xfrm>
+            </p:spPr>
+            <p:txBody>
+              <a:bodyPr/>
+              <a:lstStyle/>
+              <a:p>
+                <a:pPr eaLnBrk="1" hangingPunct="1">
+                  <a:lnSpc>
+                    <a:spcPct val="100000"/>
+                  </a:lnSpc>
+                </a:pPr>
+                <a:r>
+                  <a:rPr lang="en-US" altLang="en-US" sz="2200" dirty="0"/>
+                  <a:t>Evolution of high-momentum operator (</a:t>
+                </a:r>
+                <a14:m>
+                  <m:oMath xmlns:m="http://schemas.openxmlformats.org/officeDocument/2006/math">
+                    <m:r>
+                      <a:rPr lang="en-US" sz="2200" b="0" i="1" smtClean="0">
+                        <a:solidFill>
+                          <a:srgbClr val="C00000"/>
+                        </a:solidFill>
+                        <a:latin typeface="Cambria Math" panose="02040503050406030204" pitchFamily="18" charset="0"/>
+                        <a:cs typeface="Arial" panose="020B0604020202020204" pitchFamily="34" charset="0"/>
+                      </a:rPr>
+                      <m:t>𝑞</m:t>
+                    </m:r>
+                    <m:r>
+                      <a:rPr lang="en-US" sz="2200" b="0" i="1" smtClean="0">
+                        <a:solidFill>
+                          <a:srgbClr val="C00000"/>
+                        </a:solidFill>
+                        <a:latin typeface="Cambria Math" panose="02040503050406030204" pitchFamily="18" charset="0"/>
+                        <a:cs typeface="Arial" panose="020B0604020202020204" pitchFamily="34" charset="0"/>
+                      </a:rPr>
+                      <m:t>=3</m:t>
+                    </m:r>
+                  </m:oMath>
+                </a14:m>
+                <a:r>
+                  <a:rPr lang="en-US" altLang="en-US" sz="2200" dirty="0"/>
+                  <a:t> </a:t>
+                </a:r>
+                <a:r>
+                  <a:rPr lang="en-US" sz="2200" dirty="0">
+                    <a:solidFill>
+                      <a:srgbClr val="C00000"/>
+                    </a:solidFill>
+                    <a:cs typeface="Arial" panose="020B0604020202020204" pitchFamily="34" charset="0"/>
+                  </a:rPr>
+                  <a:t>fm</a:t>
+                </a:r>
+                <a:r>
+                  <a:rPr lang="en-US" sz="2200" baseline="30000" dirty="0">
+                    <a:solidFill>
+                      <a:srgbClr val="C00000"/>
+                    </a:solidFill>
+                    <a:cs typeface="Arial" panose="020B0604020202020204" pitchFamily="34" charset="0"/>
+                  </a:rPr>
+                  <a:t>-1</a:t>
+                </a:r>
+                <a:r>
+                  <a:rPr lang="en-US" altLang="en-US" sz="2200" dirty="0"/>
+                  <a:t>) shifts strength to low-momentum matrix elements</a:t>
+                </a:r>
+              </a:p>
+              <a:p>
+                <a:pPr eaLnBrk="1" hangingPunct="1">
+                  <a:lnSpc>
+                    <a:spcPct val="100000"/>
+                  </a:lnSpc>
+                </a:pPr>
+                <a:r>
+                  <a:rPr lang="en-US" altLang="en-US" sz="2200" dirty="0"/>
+                  <a:t>Low-momentum operator (</a:t>
+                </a:r>
+                <a14:m>
+                  <m:oMath xmlns:m="http://schemas.openxmlformats.org/officeDocument/2006/math">
+                    <m:r>
+                      <a:rPr lang="en-US" sz="2200" b="0" i="1" smtClean="0">
+                        <a:solidFill>
+                          <a:srgbClr val="C00000"/>
+                        </a:solidFill>
+                        <a:latin typeface="Cambria Math" panose="02040503050406030204" pitchFamily="18" charset="0"/>
+                        <a:cs typeface="Arial" panose="020B0604020202020204" pitchFamily="34" charset="0"/>
+                      </a:rPr>
+                      <m:t>𝑞</m:t>
+                    </m:r>
+                    <m:r>
+                      <a:rPr lang="en-US" sz="2200" b="0" i="1" smtClean="0">
+                        <a:solidFill>
+                          <a:srgbClr val="C00000"/>
+                        </a:solidFill>
+                        <a:latin typeface="Cambria Math" panose="02040503050406030204" pitchFamily="18" charset="0"/>
+                        <a:cs typeface="Arial" panose="020B0604020202020204" pitchFamily="34" charset="0"/>
+                      </a:rPr>
+                      <m:t>=0.3</m:t>
+                    </m:r>
+                  </m:oMath>
+                </a14:m>
+                <a:r>
+                  <a:rPr lang="en-US" altLang="en-US" sz="2200" dirty="0"/>
+                  <a:t> </a:t>
+                </a:r>
+                <a:r>
+                  <a:rPr lang="en-US" sz="2200" dirty="0">
+                    <a:solidFill>
+                      <a:srgbClr val="C00000"/>
+                    </a:solidFill>
+                    <a:cs typeface="Arial" panose="020B0604020202020204" pitchFamily="34" charset="0"/>
+                  </a:rPr>
+                  <a:t>fm</a:t>
+                </a:r>
+                <a:r>
+                  <a:rPr lang="en-US" sz="2200" baseline="30000" dirty="0">
+                    <a:solidFill>
+                      <a:srgbClr val="C00000"/>
+                    </a:solidFill>
+                    <a:cs typeface="Arial" panose="020B0604020202020204" pitchFamily="34" charset="0"/>
+                  </a:rPr>
+                  <a:t>-1</a:t>
+                </a:r>
+                <a:r>
+                  <a:rPr lang="en-US" altLang="en-US" sz="2200" dirty="0"/>
+                  <a:t>) retains the same momentum scale</a:t>
+                </a:r>
+              </a:p>
+            </p:txBody>
+          </p:sp>
+        </mc:Choice>
+        <mc:Fallback xmlns="">
+          <p:sp>
+            <p:nvSpPr>
+              <p:cNvPr id="29698" name="Content Placeholder 2">
+                <a:extLst>
+                  <a:ext uri="{FF2B5EF4-FFF2-40B4-BE49-F238E27FC236}">
+                    <a16:creationId xmlns:a16="http://schemas.microsoft.com/office/drawing/2014/main" id="{5C90EF02-C1E2-2B4E-940D-292625AD1D37}"/>
+                  </a:ext>
+                </a:extLst>
+              </p:cNvPr>
+              <p:cNvSpPr>
+                <a:spLocks noGrp="1" noRot="1" noChangeAspect="1" noMove="1" noResize="1" noEditPoints="1" noAdjustHandles="1" noChangeArrowheads="1" noChangeShapeType="1" noTextEdit="1"/>
+              </p:cNvSpPr>
+              <p:nvPr>
+                <p:ph idx="1"/>
+              </p:nvPr>
+            </p:nvSpPr>
+            <p:spPr>
+              <a:xfrm>
+                <a:off x="8624528" y="2129918"/>
+                <a:ext cx="3389767" cy="4685095"/>
+              </a:xfrm>
+              <a:blipFill>
+                <a:blip r:embed="rId2"/>
+                <a:stretch>
+                  <a:fillRect l="-1866" t="-1084"/>
+                </a:stretch>
+              </a:blipFill>
+            </p:spPr>
+            <p:txBody>
+              <a:bodyPr/>
+              <a:lstStyle/>
+              <a:p>
+                <a:r>
+                  <a:rPr lang="en-US">
+                    <a:noFill/>
+                  </a:rPr>
+                  <a:t> </a:t>
+                </a:r>
+              </a:p>
+            </p:txBody>
+          </p:sp>
+        </mc:Fallback>
+      </mc:AlternateContent>
+      <p:pic>
+        <p:nvPicPr>
+          <p:cNvPr id="29699" name="Picture 3">
+            <a:extLst>
+              <a:ext uri="{FF2B5EF4-FFF2-40B4-BE49-F238E27FC236}">
+                <a16:creationId xmlns:a16="http://schemas.microsoft.com/office/drawing/2014/main" id="{551FA7BB-A837-0840-AF6C-B5C3C7FB4BEB}"/>
+              </a:ext>
+            </a:extLst>
+          </p:cNvPr>
+          <p:cNvPicPr>
+            <a:picLocks noChangeAspect="1" noChangeArrowheads="1"/>
+          </p:cNvPicPr>
+          <p:nvPr/>
+        </p:nvPicPr>
+        <p:blipFill>
+          <a:blip r:embed="rId3">
+            <a:extLst>
+              <a:ext uri="{28A0092B-C50C-407E-A947-70E740481C1C}">
+                <a14:useLocalDpi xmlns:a14="http://schemas.microsoft.com/office/drawing/2010/main" val="0"/>
+              </a:ext>
+            </a:extLst>
+          </a:blip>
+          <a:srcRect/>
+          <a:stretch>
+            <a:fillRect/>
+          </a:stretch>
+        </p:blipFill>
+        <p:spPr bwMode="auto">
+          <a:xfrm>
+            <a:off x="8891" y="1790193"/>
+            <a:ext cx="8586024" cy="2194560"/>
+          </a:xfrm>
+          <a:prstGeom prst="rect">
+            <a:avLst/>
+          </a:prstGeom>
+          <a:noFill/>
+          <a:ln>
+            <a:noFill/>
+          </a:ln>
+          <a:extLst>
+            <a:ext uri="{909E8E84-426E-40DD-AFC4-6F175D3DCCD1}">
+              <a14:hiddenFill xmlns:a14="http://schemas.microsoft.com/office/drawing/2010/main">
+                <a:solidFill>
+                  <a:srgbClr val="FFFFFF"/>
+                </a:solidFill>
+              </a14:hiddenFill>
+            </a:ext>
+            <a:ext uri="{91240B29-F687-4F45-9708-019B960494DF}">
+              <a14:hiddenLine xmlns:a14="http://schemas.microsoft.com/office/drawing/2010/main" w="9525">
+                <a:solidFill>
+                  <a:srgbClr val="000000"/>
+                </a:solidFill>
+                <a:miter lim="800000"/>
+                <a:headEnd/>
+                <a:tailEnd/>
+              </a14:hiddenLine>
+            </a:ext>
+          </a:extLst>
+        </p:spPr>
+      </p:pic>
+      <mc:AlternateContent xmlns:mc="http://schemas.openxmlformats.org/markup-compatibility/2006" xmlns:a14="http://schemas.microsoft.com/office/drawing/2010/main">
+        <mc:Choice Requires="a14">
+          <p:sp>
+            <p:nvSpPr>
+              <p:cNvPr id="6" name="Rectangle 5">
+                <a:extLst>
+                  <a:ext uri="{FF2B5EF4-FFF2-40B4-BE49-F238E27FC236}">
+                    <a16:creationId xmlns:a16="http://schemas.microsoft.com/office/drawing/2014/main" id="{2FB372EB-3256-7B41-AA54-570D7DFBD0D7}"/>
+                  </a:ext>
+                </a:extLst>
+              </p:cNvPr>
+              <p:cNvSpPr/>
+              <p:nvPr/>
+            </p:nvSpPr>
+            <p:spPr>
+              <a:xfrm>
+                <a:off x="40421" y="6170734"/>
+                <a:ext cx="9734200" cy="644279"/>
+              </a:xfrm>
+              <a:prstGeom prst="rect">
+                <a:avLst/>
+              </a:prstGeom>
+            </p:spPr>
+            <p:txBody>
+              <a:bodyPr wrap="square">
+                <a:spAutoFit/>
+              </a:bodyPr>
+              <a:lstStyle/>
+              <a:p>
+                <a:r>
+                  <a:rPr lang="en-US" sz="1600" dirty="0">
+                    <a:latin typeface="Arial" panose="020B0604020202020204" pitchFamily="34" charset="0"/>
+                    <a:cs typeface="Arial" panose="020B0604020202020204" pitchFamily="34" charset="0"/>
+                  </a:rPr>
+                  <a:t>Fig. 6: </a:t>
+                </a:r>
+                <a:r>
+                  <a:rPr lang="en-US" altLang="en-US" sz="1600" dirty="0"/>
+                  <a:t>Integrand of </a:t>
+                </a:r>
+                <a14:m>
+                  <m:oMath xmlns:m="http://schemas.openxmlformats.org/officeDocument/2006/math">
+                    <m:d>
+                      <m:dPr>
+                        <m:begChr m:val="⟨"/>
+                        <m:endChr m:val="⟩"/>
+                        <m:ctrlPr>
+                          <a:rPr lang="en-US" altLang="en-US" sz="1600" i="1" smtClean="0">
+                            <a:solidFill>
+                              <a:srgbClr val="C00000"/>
+                            </a:solidFill>
+                            <a:latin typeface="Cambria Math" panose="02040503050406030204" pitchFamily="18" charset="0"/>
+                          </a:rPr>
+                        </m:ctrlPr>
+                      </m:dPr>
+                      <m:e>
+                        <m:sSub>
+                          <m:sSubPr>
+                            <m:ctrlPr>
+                              <a:rPr lang="en-US" altLang="en-US" sz="1600" i="1" smtClean="0">
+                                <a:solidFill>
+                                  <a:srgbClr val="C00000"/>
+                                </a:solidFill>
+                                <a:latin typeface="Cambria Math" panose="02040503050406030204" pitchFamily="18" charset="0"/>
+                              </a:rPr>
+                            </m:ctrlPr>
+                          </m:sSubPr>
+                          <m:e>
+                            <m:r>
+                              <a:rPr lang="en-US" altLang="en-US" sz="1600" i="1" smtClean="0">
+                                <a:solidFill>
+                                  <a:srgbClr val="C00000"/>
+                                </a:solidFill>
+                                <a:latin typeface="Cambria Math" panose="02040503050406030204" pitchFamily="18" charset="0"/>
+                                <a:ea typeface="Cambria Math" panose="02040503050406030204" pitchFamily="18" charset="0"/>
+                              </a:rPr>
+                              <m:t>𝜓</m:t>
+                            </m:r>
+                          </m:e>
+                          <m:sub>
+                            <m:r>
+                              <a:rPr lang="en-US" altLang="en-US" sz="1600" b="0" i="1" smtClean="0">
+                                <a:solidFill>
+                                  <a:srgbClr val="C00000"/>
+                                </a:solidFill>
+                                <a:latin typeface="Cambria Math" panose="02040503050406030204" pitchFamily="18" charset="0"/>
+                              </a:rPr>
+                              <m:t>𝑑</m:t>
+                            </m:r>
+                          </m:sub>
+                        </m:sSub>
+                      </m:e>
+                      <m:e>
+                        <m:sSubSup>
+                          <m:sSubSupPr>
+                            <m:ctrlPr>
+                              <a:rPr lang="en-US" altLang="en-US" sz="1600" i="1" smtClean="0">
+                                <a:solidFill>
+                                  <a:srgbClr val="C00000"/>
+                                </a:solidFill>
+                                <a:latin typeface="Cambria Math" panose="02040503050406030204" pitchFamily="18" charset="0"/>
+                              </a:rPr>
+                            </m:ctrlPr>
+                          </m:sSubSupPr>
+                          <m:e>
+                            <m:r>
+                              <a:rPr lang="en-US" altLang="en-US" sz="1600" b="0" i="1" smtClean="0">
+                                <a:solidFill>
+                                  <a:srgbClr val="C00000"/>
+                                </a:solidFill>
+                                <a:latin typeface="Cambria Math" panose="02040503050406030204" pitchFamily="18" charset="0"/>
+                              </a:rPr>
+                              <m:t>𝑎</m:t>
+                            </m:r>
+                          </m:e>
+                          <m:sub>
+                            <m:r>
+                              <a:rPr lang="en-US" altLang="en-US" sz="1600" b="0" i="1" smtClean="0">
+                                <a:solidFill>
+                                  <a:srgbClr val="C00000"/>
+                                </a:solidFill>
+                                <a:latin typeface="Cambria Math" panose="02040503050406030204" pitchFamily="18" charset="0"/>
+                              </a:rPr>
+                              <m:t>𝑞</m:t>
+                            </m:r>
+                          </m:sub>
+                          <m:sup>
+                            <m:r>
+                              <a:rPr lang="en-US" altLang="en-US" sz="1600" i="1" smtClean="0">
+                                <a:solidFill>
+                                  <a:srgbClr val="C00000"/>
+                                </a:solidFill>
+                                <a:latin typeface="Cambria Math" panose="02040503050406030204" pitchFamily="18" charset="0"/>
+                                <a:ea typeface="Cambria Math" panose="02040503050406030204" pitchFamily="18" charset="0"/>
+                              </a:rPr>
+                              <m:t>†</m:t>
+                            </m:r>
+                          </m:sup>
+                        </m:sSubSup>
+                        <m:sSub>
+                          <m:sSubPr>
+                            <m:ctrlPr>
+                              <a:rPr lang="en-US" altLang="en-US" sz="1600" i="1" smtClean="0">
+                                <a:solidFill>
+                                  <a:srgbClr val="C00000"/>
+                                </a:solidFill>
+                                <a:latin typeface="Cambria Math" panose="02040503050406030204" pitchFamily="18" charset="0"/>
+                              </a:rPr>
+                            </m:ctrlPr>
+                          </m:sSubPr>
+                          <m:e>
+                            <m:r>
+                              <a:rPr lang="en-US" altLang="en-US" sz="1600" b="0" i="1" smtClean="0">
+                                <a:solidFill>
+                                  <a:srgbClr val="C00000"/>
+                                </a:solidFill>
+                                <a:latin typeface="Cambria Math" panose="02040503050406030204" pitchFamily="18" charset="0"/>
+                              </a:rPr>
+                              <m:t>𝑎</m:t>
+                            </m:r>
+                          </m:e>
+                          <m:sub>
+                            <m:r>
+                              <a:rPr lang="en-US" altLang="en-US" sz="1600" b="0" i="1" smtClean="0">
+                                <a:solidFill>
+                                  <a:srgbClr val="C00000"/>
+                                </a:solidFill>
+                                <a:latin typeface="Cambria Math" panose="02040503050406030204" pitchFamily="18" charset="0"/>
+                              </a:rPr>
+                              <m:t>𝑞</m:t>
+                            </m:r>
+                          </m:sub>
+                        </m:sSub>
+                      </m:e>
+                      <m:e>
+                        <m:sSub>
+                          <m:sSubPr>
+                            <m:ctrlPr>
+                              <a:rPr lang="en-US" altLang="en-US" sz="1600" i="1" smtClean="0">
+                                <a:solidFill>
+                                  <a:srgbClr val="C00000"/>
+                                </a:solidFill>
+                                <a:latin typeface="Cambria Math" panose="02040503050406030204" pitchFamily="18" charset="0"/>
+                              </a:rPr>
+                            </m:ctrlPr>
+                          </m:sSubPr>
+                          <m:e>
+                            <m:r>
+                              <a:rPr lang="en-US" altLang="en-US" sz="1600" i="1" smtClean="0">
+                                <a:solidFill>
+                                  <a:srgbClr val="C00000"/>
+                                </a:solidFill>
+                                <a:latin typeface="Cambria Math" panose="02040503050406030204" pitchFamily="18" charset="0"/>
+                                <a:ea typeface="Cambria Math" panose="02040503050406030204" pitchFamily="18" charset="0"/>
+                              </a:rPr>
+                              <m:t>𝜓</m:t>
+                            </m:r>
+                          </m:e>
+                          <m:sub>
+                            <m:r>
+                              <a:rPr lang="en-US" altLang="en-US" sz="1600" b="0" i="1" smtClean="0">
+                                <a:solidFill>
+                                  <a:srgbClr val="C00000"/>
+                                </a:solidFill>
+                                <a:latin typeface="Cambria Math" panose="02040503050406030204" pitchFamily="18" charset="0"/>
+                              </a:rPr>
+                              <m:t>𝑑</m:t>
+                            </m:r>
+                          </m:sub>
+                        </m:sSub>
+                      </m:e>
+                    </m:d>
+                  </m:oMath>
+                </a14:m>
+                <a:r>
+                  <a:rPr lang="en-US" altLang="en-US" sz="1600" dirty="0"/>
+                  <a:t> in momentum-space </a:t>
+                </a:r>
+                <a:r>
+                  <a:rPr lang="en-US" sz="1600" dirty="0">
+                    <a:latin typeface="Arial" panose="020B0604020202020204" pitchFamily="34" charset="0"/>
+                    <a:cs typeface="Arial" panose="020B0604020202020204" pitchFamily="34" charset="0"/>
+                  </a:rPr>
+                  <a:t>for </a:t>
+                </a:r>
+                <a14:m>
+                  <m:oMath xmlns:m="http://schemas.openxmlformats.org/officeDocument/2006/math">
+                    <m:r>
+                      <a:rPr lang="en-US" sz="1600" b="0" i="1" smtClean="0">
+                        <a:solidFill>
+                          <a:srgbClr val="C00000"/>
+                        </a:solidFill>
+                        <a:latin typeface="Cambria Math" panose="02040503050406030204" pitchFamily="18" charset="0"/>
+                        <a:cs typeface="Arial" panose="020B0604020202020204" pitchFamily="34" charset="0"/>
+                      </a:rPr>
+                      <m:t>𝑞</m:t>
+                    </m:r>
+                    <m:r>
+                      <a:rPr lang="en-US" sz="1600" b="0" i="1" smtClean="0">
+                        <a:solidFill>
+                          <a:srgbClr val="C00000"/>
+                        </a:solidFill>
+                        <a:latin typeface="Cambria Math" panose="02040503050406030204" pitchFamily="18" charset="0"/>
+                        <a:cs typeface="Arial" panose="020B0604020202020204" pitchFamily="34" charset="0"/>
+                      </a:rPr>
+                      <m:t>=3</m:t>
+                    </m:r>
+                  </m:oMath>
+                </a14:m>
+                <a:r>
+                  <a:rPr lang="en-US" sz="1600" dirty="0">
+                    <a:solidFill>
+                      <a:srgbClr val="C00000"/>
+                    </a:solidFill>
+                    <a:latin typeface="Arial" panose="020B0604020202020204" pitchFamily="34" charset="0"/>
+                    <a:cs typeface="Arial" panose="020B0604020202020204" pitchFamily="34" charset="0"/>
+                  </a:rPr>
+                  <a:t> (top) </a:t>
+                </a:r>
+                <a:r>
+                  <a:rPr lang="en-US" sz="1600" dirty="0">
+                    <a:latin typeface="Arial" panose="020B0604020202020204" pitchFamily="34" charset="0"/>
+                    <a:cs typeface="Arial" panose="020B0604020202020204" pitchFamily="34" charset="0"/>
+                  </a:rPr>
+                  <a:t>and</a:t>
+                </a:r>
+                <a:r>
+                  <a:rPr lang="en-US" sz="1600" dirty="0">
+                    <a:solidFill>
+                      <a:srgbClr val="C00000"/>
+                    </a:solidFill>
+                    <a:latin typeface="Arial" panose="020B0604020202020204" pitchFamily="34" charset="0"/>
+                    <a:cs typeface="Arial" panose="020B0604020202020204" pitchFamily="34" charset="0"/>
+                  </a:rPr>
+                  <a:t> </a:t>
+                </a:r>
+                <a14:m>
+                  <m:oMath xmlns:m="http://schemas.openxmlformats.org/officeDocument/2006/math">
+                    <m:r>
+                      <a:rPr lang="en-US" sz="1600" b="0" i="1" smtClean="0">
+                        <a:solidFill>
+                          <a:srgbClr val="C00000"/>
+                        </a:solidFill>
+                        <a:latin typeface="Cambria Math" panose="02040503050406030204" pitchFamily="18" charset="0"/>
+                        <a:cs typeface="Arial" panose="020B0604020202020204" pitchFamily="34" charset="0"/>
+                      </a:rPr>
+                      <m:t>0.3</m:t>
+                    </m:r>
+                  </m:oMath>
+                </a14:m>
+                <a:r>
+                  <a:rPr lang="en-US" sz="1600" dirty="0">
+                    <a:solidFill>
+                      <a:srgbClr val="C00000"/>
+                    </a:solidFill>
+                    <a:latin typeface="Arial" panose="020B0604020202020204" pitchFamily="34" charset="0"/>
+                    <a:cs typeface="Arial" panose="020B0604020202020204" pitchFamily="34" charset="0"/>
+                  </a:rPr>
+                  <a:t> (bottom) fm</a:t>
+                </a:r>
+                <a:r>
+                  <a:rPr lang="en-US" sz="1600" baseline="30000" dirty="0">
+                    <a:solidFill>
+                      <a:srgbClr val="C00000"/>
+                    </a:solidFill>
+                    <a:latin typeface="Arial" panose="020B0604020202020204" pitchFamily="34" charset="0"/>
+                    <a:cs typeface="Arial" panose="020B0604020202020204" pitchFamily="34" charset="0"/>
+                  </a:rPr>
+                  <a:t>-1</a:t>
+                </a:r>
+                <a:r>
+                  <a:rPr lang="en-US" sz="1600" dirty="0">
+                    <a:latin typeface="Arial" panose="020B0604020202020204" pitchFamily="34" charset="0"/>
+                    <a:cs typeface="Arial" panose="020B0604020202020204" pitchFamily="34" charset="0"/>
+                  </a:rPr>
+                  <a:t> with SRG transformations for several values of </a:t>
+                </a:r>
+                <a14:m>
+                  <m:oMath xmlns:m="http://schemas.openxmlformats.org/officeDocument/2006/math">
+                    <m:r>
+                      <a:rPr lang="en-US" sz="1600" i="1">
+                        <a:latin typeface="Cambria Math" panose="02040503050406030204" pitchFamily="18" charset="0"/>
+                        <a:ea typeface="Cambria Math" panose="02040503050406030204" pitchFamily="18" charset="0"/>
+                      </a:rPr>
+                      <m:t>𝜆</m:t>
+                    </m:r>
+                  </m:oMath>
+                </a14:m>
+                <a:r>
+                  <a:rPr lang="en-US" sz="1600" dirty="0">
+                    <a:latin typeface="Arial" panose="020B0604020202020204" pitchFamily="34" charset="0"/>
+                    <a:cs typeface="Arial" panose="020B0604020202020204" pitchFamily="34" charset="0"/>
+                  </a:rPr>
+                  <a:t> where the transformations are done using the RKE N</a:t>
+                </a:r>
+                <a:r>
+                  <a:rPr lang="en-US" sz="1600" baseline="30000" dirty="0">
+                    <a:latin typeface="Arial" panose="020B0604020202020204" pitchFamily="34" charset="0"/>
+                    <a:cs typeface="Arial" panose="020B0604020202020204" pitchFamily="34" charset="0"/>
+                  </a:rPr>
+                  <a:t>3</a:t>
+                </a:r>
+                <a:r>
+                  <a:rPr lang="en-US" sz="1600" dirty="0">
+                    <a:latin typeface="Arial" panose="020B0604020202020204" pitchFamily="34" charset="0"/>
+                    <a:cs typeface="Arial" panose="020B0604020202020204" pitchFamily="34" charset="0"/>
+                  </a:rPr>
+                  <a:t>LO potential.</a:t>
+                </a:r>
+              </a:p>
+            </p:txBody>
+          </p:sp>
+        </mc:Choice>
+        <mc:Fallback xmlns="">
+          <p:sp>
+            <p:nvSpPr>
+              <p:cNvPr id="6" name="Rectangle 5">
+                <a:extLst>
+                  <a:ext uri="{FF2B5EF4-FFF2-40B4-BE49-F238E27FC236}">
+                    <a16:creationId xmlns:a16="http://schemas.microsoft.com/office/drawing/2014/main" id="{2FB372EB-3256-7B41-AA54-570D7DFBD0D7}"/>
+                  </a:ext>
+                </a:extLst>
+              </p:cNvPr>
+              <p:cNvSpPr>
+                <a:spLocks noRot="1" noChangeAspect="1" noMove="1" noResize="1" noEditPoints="1" noAdjustHandles="1" noChangeArrowheads="1" noChangeShapeType="1" noTextEdit="1"/>
+              </p:cNvSpPr>
+              <p:nvPr/>
+            </p:nvSpPr>
+            <p:spPr>
+              <a:xfrm>
+                <a:off x="40421" y="6170734"/>
+                <a:ext cx="9734200" cy="644279"/>
+              </a:xfrm>
+              <a:prstGeom prst="rect">
+                <a:avLst/>
+              </a:prstGeom>
+              <a:blipFill>
+                <a:blip r:embed="rId4"/>
+                <a:stretch>
+                  <a:fillRect l="-260" b="-9615"/>
+                </a:stretch>
+              </a:blipFill>
+            </p:spPr>
+            <p:txBody>
+              <a:bodyPr/>
+              <a:lstStyle/>
+              <a:p>
+                <a:r>
+                  <a:rPr lang="en-US">
+                    <a:noFill/>
+                  </a:rPr>
+                  <a:t> </a:t>
+                </a:r>
+              </a:p>
+            </p:txBody>
+          </p:sp>
+        </mc:Fallback>
+      </mc:AlternateContent>
+      <p:pic>
+        <p:nvPicPr>
+          <p:cNvPr id="3" name="Picture 2">
+            <a:extLst>
+              <a:ext uri="{FF2B5EF4-FFF2-40B4-BE49-F238E27FC236}">
+                <a16:creationId xmlns:a16="http://schemas.microsoft.com/office/drawing/2014/main" id="{33179002-82D9-D841-8CBD-3C358101F27D}"/>
+              </a:ext>
+            </a:extLst>
+          </p:cNvPr>
+          <p:cNvPicPr>
+            <a:picLocks noChangeAspect="1"/>
+          </p:cNvPicPr>
+          <p:nvPr/>
+        </p:nvPicPr>
+        <p:blipFill>
+          <a:blip r:embed="rId5"/>
+          <a:stretch>
+            <a:fillRect/>
+          </a:stretch>
+        </p:blipFill>
+        <p:spPr>
+          <a:xfrm>
+            <a:off x="8891" y="3980464"/>
+            <a:ext cx="8584107" cy="2194560"/>
+          </a:xfrm>
+          <a:prstGeom prst="rect">
+            <a:avLst/>
+          </a:prstGeom>
+        </p:spPr>
+      </p:pic>
+    </p:spTree>
+  </p:cSld>
+  <p:clrMapOvr>
+    <a:masterClrMapping/>
+  </p:clrMapOvr>
+</p:sld>
+</file>
+
+<file path=ppt/slides/slide19.xml><?xml version="1.0" encoding="utf-8"?>
 <p:sld xmlns:a="http://schemas.openxmlformats.org/drawingml/2006/main" xmlns:r="http://schemas.openxmlformats.org/officeDocument/2006/relationships" xmlns:p="http://schemas.openxmlformats.org/presentationml/2006/main">
   <p:cSld>
     <p:spTree>
@@ -10823,8 +11648,8 @@
           </a:extLst>
         </p:spPr>
       </p:pic>
-      <mc:AlternateContent xmlns:mc="http://schemas.openxmlformats.org/markup-compatibility/2006">
-        <mc:Choice xmlns:a14="http://schemas.microsoft.com/office/drawing/2010/main" Requires="a14">
+      <mc:AlternateContent xmlns:mc="http://schemas.openxmlformats.org/markup-compatibility/2006" xmlns:a14="http://schemas.microsoft.com/office/drawing/2010/main">
+        <mc:Choice Requires="a14">
           <p:sp>
             <p:nvSpPr>
               <p:cNvPr id="7" name="Rectangle 6">
@@ -11074,7 +11899,7 @@
             </p:txBody>
           </p:sp>
         </mc:Choice>
-        <mc:Fallback>
+        <mc:Fallback xmlns="">
           <p:sp>
             <p:nvSpPr>
               <p:cNvPr id="7" name="Rectangle 6">
@@ -11132,7 +11957,225 @@
 </p:sld>
 </file>
 
-<file path=ppt/slides/slide19.xml><?xml version="1.0" encoding="utf-8"?>
+<file path=ppt/slides/slide2.xml><?xml version="1.0" encoding="utf-8"?>
+<p:sld xmlns:a="http://schemas.openxmlformats.org/drawingml/2006/main" xmlns:r="http://schemas.openxmlformats.org/officeDocument/2006/relationships" xmlns:p="http://schemas.openxmlformats.org/presentationml/2006/main">
+  <p:cSld>
+    <p:spTree>
+      <p:nvGrpSpPr>
+        <p:cNvPr id="1" name=""/>
+        <p:cNvGrpSpPr/>
+        <p:nvPr/>
+      </p:nvGrpSpPr>
+      <p:grpSpPr>
+        <a:xfrm>
+          <a:off x="0" y="0"/>
+          <a:ext cx="0" cy="0"/>
+          <a:chOff x="0" y="0"/>
+          <a:chExt cx="0" cy="0"/>
+        </a:xfrm>
+      </p:grpSpPr>
+      <p:sp>
+        <p:nvSpPr>
+          <p:cNvPr id="16385" name="Title 1">
+            <a:extLst>
+              <a:ext uri="{FF2B5EF4-FFF2-40B4-BE49-F238E27FC236}">
+                <a16:creationId xmlns:a16="http://schemas.microsoft.com/office/drawing/2014/main" id="{9BDDD22C-8128-5F47-B475-27C774A2238A}"/>
+              </a:ext>
+            </a:extLst>
+          </p:cNvPr>
+          <p:cNvSpPr>
+            <a:spLocks noGrp="1" noChangeArrowheads="1"/>
+          </p:cNvSpPr>
+          <p:nvPr>
+            <p:ph type="title"/>
+          </p:nvPr>
+        </p:nvSpPr>
+        <p:spPr/>
+        <p:txBody>
+          <a:bodyPr/>
+          <a:lstStyle/>
+          <a:p>
+            <a:pPr eaLnBrk="1" hangingPunct="1">
+              <a:lnSpc>
+                <a:spcPct val="100000"/>
+              </a:lnSpc>
+            </a:pPr>
+            <a:r>
+              <a:rPr lang="en-US" altLang="en-US" dirty="0">
+                <a:solidFill>
+                  <a:srgbClr val="002060"/>
+                </a:solidFill>
+              </a:rPr>
+              <a:t>Motivation</a:t>
+            </a:r>
+          </a:p>
+        </p:txBody>
+      </p:sp>
+      <mc:AlternateContent xmlns:mc="http://schemas.openxmlformats.org/markup-compatibility/2006" xmlns:a14="http://schemas.microsoft.com/office/drawing/2010/main">
+        <mc:Choice Requires="a14">
+          <p:sp>
+            <p:nvSpPr>
+              <p:cNvPr id="16386" name="Content Placeholder 2">
+                <a:extLst>
+                  <a:ext uri="{FF2B5EF4-FFF2-40B4-BE49-F238E27FC236}">
+                    <a16:creationId xmlns:a16="http://schemas.microsoft.com/office/drawing/2014/main" id="{1E545BB1-32E9-674B-9038-39B228DDBB3F}"/>
+                  </a:ext>
+                </a:extLst>
+              </p:cNvPr>
+              <p:cNvSpPr>
+                <a:spLocks noGrp="1" noChangeArrowheads="1"/>
+              </p:cNvSpPr>
+              <p:nvPr>
+                <p:ph idx="1"/>
+              </p:nvPr>
+            </p:nvSpPr>
+            <p:spPr/>
+            <p:txBody>
+              <a:bodyPr/>
+              <a:lstStyle/>
+              <a:p>
+                <a:pPr eaLnBrk="1" hangingPunct="1">
+                  <a:lnSpc>
+                    <a:spcPct val="100000"/>
+                  </a:lnSpc>
+                </a:pPr>
+                <a:r>
+                  <a:rPr lang="en-US" dirty="0"/>
+                  <a:t>Explosion of new NN interactions from chiral effective field theory (</a:t>
+                </a:r>
+                <a14:m>
+                  <m:oMath xmlns:m="http://schemas.openxmlformats.org/officeDocument/2006/math">
+                    <m:r>
+                      <a:rPr lang="en-US" i="1" smtClean="0">
+                        <a:latin typeface="Cambria Math" panose="02040503050406030204" pitchFamily="18" charset="0"/>
+                        <a:ea typeface="Cambria Math" panose="02040503050406030204" pitchFamily="18" charset="0"/>
+                      </a:rPr>
+                      <m:t>𝜒</m:t>
+                    </m:r>
+                  </m:oMath>
+                </a14:m>
+                <a:r>
+                  <a:rPr lang="en-US" baseline="30000" dirty="0"/>
+                  <a:t>EFT</a:t>
+                </a:r>
+                <a:r>
+                  <a:rPr lang="en-US" dirty="0"/>
+                  <a:t>) in the last few years</a:t>
+                </a:r>
+              </a:p>
+              <a:p>
+                <a:pPr eaLnBrk="1" hangingPunct="1">
+                  <a:lnSpc>
+                    <a:spcPct val="100000"/>
+                  </a:lnSpc>
+                </a:pPr>
+                <a:r>
+                  <a:rPr lang="en-US" dirty="0"/>
+                  <a:t>Previous SRG studies of operators were limited to phenomenological models or one </a:t>
+                </a:r>
+                <a14:m>
+                  <m:oMath xmlns:m="http://schemas.openxmlformats.org/officeDocument/2006/math">
+                    <m:r>
+                      <a:rPr lang="en-US" i="1" smtClean="0">
+                        <a:latin typeface="Cambria Math" panose="02040503050406030204" pitchFamily="18" charset="0"/>
+                        <a:ea typeface="Cambria Math" panose="02040503050406030204" pitchFamily="18" charset="0"/>
+                      </a:rPr>
+                      <m:t>𝜒</m:t>
+                    </m:r>
+                  </m:oMath>
+                </a14:m>
+                <a:r>
+                  <a:rPr lang="en-US" baseline="30000" dirty="0"/>
+                  <a:t>EFT</a:t>
+                </a:r>
+                <a:r>
+                  <a:rPr lang="en-US" dirty="0"/>
+                  <a:t> interaction</a:t>
+                </a:r>
+              </a:p>
+              <a:p>
+                <a:pPr eaLnBrk="1" hangingPunct="1">
+                  <a:lnSpc>
+                    <a:spcPct val="100000"/>
+                  </a:lnSpc>
+                </a:pPr>
+                <a:r>
+                  <a:rPr lang="en-US" dirty="0">
+                    <a:solidFill>
+                      <a:srgbClr val="C00000"/>
+                    </a:solidFill>
+                  </a:rPr>
+                  <a:t>Revisit the question of how different potentials (regulator functions, cutoff, order, etc.) change under SRG transformations and how these transformations affect other operators</a:t>
+                </a:r>
+              </a:p>
+              <a:p>
+                <a:pPr eaLnBrk="1" hangingPunct="1">
+                  <a:lnSpc>
+                    <a:spcPct val="100000"/>
+                  </a:lnSpc>
+                </a:pPr>
+                <a:endParaRPr lang="en-US" dirty="0"/>
+              </a:p>
+              <a:p>
+                <a:pPr eaLnBrk="1" hangingPunct="1">
+                  <a:lnSpc>
+                    <a:spcPct val="100000"/>
+                  </a:lnSpc>
+                </a:pPr>
+                <a:endParaRPr lang="en-US" altLang="en-US" dirty="0"/>
+              </a:p>
+            </p:txBody>
+          </p:sp>
+        </mc:Choice>
+        <mc:Fallback xmlns="">
+          <p:sp>
+            <p:nvSpPr>
+              <p:cNvPr id="16386" name="Content Placeholder 2">
+                <a:extLst>
+                  <a:ext uri="{FF2B5EF4-FFF2-40B4-BE49-F238E27FC236}">
+                    <a16:creationId xmlns:a16="http://schemas.microsoft.com/office/drawing/2014/main" id="{1E545BB1-32E9-674B-9038-39B228DDBB3F}"/>
+                  </a:ext>
+                </a:extLst>
+              </p:cNvPr>
+              <p:cNvSpPr>
+                <a:spLocks noGrp="1" noRot="1" noChangeAspect="1" noMove="1" noResize="1" noEditPoints="1" noAdjustHandles="1" noChangeArrowheads="1" noChangeShapeType="1" noTextEdit="1"/>
+              </p:cNvSpPr>
+              <p:nvPr>
+                <p:ph idx="1"/>
+              </p:nvPr>
+            </p:nvSpPr>
+            <p:spPr>
+              <a:blipFill>
+                <a:blip r:embed="rId2"/>
+                <a:stretch>
+                  <a:fillRect l="-965" t="-1754" r="-1930"/>
+                </a:stretch>
+              </a:blipFill>
+            </p:spPr>
+            <p:txBody>
+              <a:bodyPr/>
+              <a:lstStyle/>
+              <a:p>
+                <a:r>
+                  <a:rPr lang="en-US">
+                    <a:noFill/>
+                  </a:rPr>
+                  <a:t> </a:t>
+                </a:r>
+              </a:p>
+            </p:txBody>
+          </p:sp>
+        </mc:Fallback>
+      </mc:AlternateContent>
+    </p:spTree>
+  </p:cSld>
+  <p:clrMapOvr>
+    <a:masterClrMapping/>
+  </p:clrMapOvr>
+</p:sld>
+</file>
+
+<file path=ppt/slides/slide20.xml><?xml version="1.0" encoding="utf-8"?>
 <p:sld xmlns:a="http://schemas.openxmlformats.org/drawingml/2006/main" xmlns:r="http://schemas.openxmlformats.org/officeDocument/2006/relationships" xmlns:p="http://schemas.openxmlformats.org/presentationml/2006/main">
   <p:cSld>
     <p:spTree>
@@ -11186,8 +12229,8 @@
           </a:p>
         </p:txBody>
       </p:sp>
-      <mc:AlternateContent xmlns:mc="http://schemas.openxmlformats.org/markup-compatibility/2006">
-        <mc:Choice xmlns:a14="http://schemas.microsoft.com/office/drawing/2010/main" Requires="a14">
+      <mc:AlternateContent xmlns:mc="http://schemas.openxmlformats.org/markup-compatibility/2006" xmlns:a14="http://schemas.microsoft.com/office/drawing/2010/main">
+        <mc:Choice Requires="a14">
           <p:sp>
             <p:nvSpPr>
               <p:cNvPr id="28674" name="Content Placeholder 2">
@@ -11514,7 +12557,7 @@
             </p:txBody>
           </p:sp>
         </mc:Choice>
-        <mc:Fallback>
+        <mc:Fallback xmlns="">
           <p:sp>
             <p:nvSpPr>
               <p:cNvPr id="28674" name="Content Placeholder 2">
@@ -11909,8 +12952,8 @@
           </a:extLst>
         </p:spPr>
       </p:pic>
-      <mc:AlternateContent xmlns:mc="http://schemas.openxmlformats.org/markup-compatibility/2006">
-        <mc:Choice xmlns:a14="http://schemas.microsoft.com/office/drawing/2010/main" Requires="a14">
+      <mc:AlternateContent xmlns:mc="http://schemas.openxmlformats.org/markup-compatibility/2006" xmlns:a14="http://schemas.microsoft.com/office/drawing/2010/main">
+        <mc:Choice Requires="a14">
           <p:sp>
             <p:nvSpPr>
               <p:cNvPr id="10" name="Rectangle 9">
@@ -12160,7 +13203,7 @@
             </p:txBody>
           </p:sp>
         </mc:Choice>
-        <mc:Fallback>
+        <mc:Fallback xmlns="">
           <p:sp>
             <p:nvSpPr>
               <p:cNvPr id="10" name="Rectangle 9">
@@ -12218,1123 +13261,7 @@
 </p:sld>
 </file>
 
-<file path=ppt/slides/slide2.xml><?xml version="1.0" encoding="utf-8"?>
-<p:sld xmlns:a="http://schemas.openxmlformats.org/drawingml/2006/main" xmlns:r="http://schemas.openxmlformats.org/officeDocument/2006/relationships" xmlns:p="http://schemas.openxmlformats.org/presentationml/2006/main">
-  <p:cSld>
-    <p:spTree>
-      <p:nvGrpSpPr>
-        <p:cNvPr id="1" name=""/>
-        <p:cNvGrpSpPr/>
-        <p:nvPr/>
-      </p:nvGrpSpPr>
-      <p:grpSpPr>
-        <a:xfrm>
-          <a:off x="0" y="0"/>
-          <a:ext cx="0" cy="0"/>
-          <a:chOff x="0" y="0"/>
-          <a:chExt cx="0" cy="0"/>
-        </a:xfrm>
-      </p:grpSpPr>
-      <p:sp>
-        <p:nvSpPr>
-          <p:cNvPr id="16385" name="Title 1">
-            <a:extLst>
-              <a:ext uri="{FF2B5EF4-FFF2-40B4-BE49-F238E27FC236}">
-                <a16:creationId xmlns:a16="http://schemas.microsoft.com/office/drawing/2014/main" id="{9BDDD22C-8128-5F47-B475-27C774A2238A}"/>
-              </a:ext>
-            </a:extLst>
-          </p:cNvPr>
-          <p:cNvSpPr>
-            <a:spLocks noGrp="1" noChangeArrowheads="1"/>
-          </p:cNvSpPr>
-          <p:nvPr>
-            <p:ph type="title"/>
-          </p:nvPr>
-        </p:nvSpPr>
-        <p:spPr/>
-        <p:txBody>
-          <a:bodyPr/>
-          <a:lstStyle/>
-          <a:p>
-            <a:pPr eaLnBrk="1" hangingPunct="1">
-              <a:lnSpc>
-                <a:spcPct val="100000"/>
-              </a:lnSpc>
-            </a:pPr>
-            <a:r>
-              <a:rPr lang="en-US" altLang="en-US" dirty="0">
-                <a:solidFill>
-                  <a:srgbClr val="002060"/>
-                </a:solidFill>
-              </a:rPr>
-              <a:t>Motivation</a:t>
-            </a:r>
-          </a:p>
-        </p:txBody>
-      </p:sp>
-      <mc:AlternateContent xmlns:mc="http://schemas.openxmlformats.org/markup-compatibility/2006">
-        <mc:Choice xmlns:a14="http://schemas.microsoft.com/office/drawing/2010/main" Requires="a14">
-          <p:sp>
-            <p:nvSpPr>
-              <p:cNvPr id="16386" name="Content Placeholder 2">
-                <a:extLst>
-                  <a:ext uri="{FF2B5EF4-FFF2-40B4-BE49-F238E27FC236}">
-                    <a16:creationId xmlns:a16="http://schemas.microsoft.com/office/drawing/2014/main" id="{1E545BB1-32E9-674B-9038-39B228DDBB3F}"/>
-                  </a:ext>
-                </a:extLst>
-              </p:cNvPr>
-              <p:cNvSpPr>
-                <a:spLocks noGrp="1" noChangeArrowheads="1"/>
-              </p:cNvSpPr>
-              <p:nvPr>
-                <p:ph idx="1"/>
-              </p:nvPr>
-            </p:nvSpPr>
-            <p:spPr/>
-            <p:txBody>
-              <a:bodyPr/>
-              <a:lstStyle/>
-              <a:p>
-                <a:pPr eaLnBrk="1" hangingPunct="1">
-                  <a:lnSpc>
-                    <a:spcPct val="100000"/>
-                  </a:lnSpc>
-                </a:pPr>
-                <a:r>
-                  <a:rPr lang="en-US" dirty="0"/>
-                  <a:t>Explosion of new NN interactions from chiral effective field theory (</a:t>
-                </a:r>
-                <a14:m>
-                  <m:oMath xmlns:m="http://schemas.openxmlformats.org/officeDocument/2006/math">
-                    <m:r>
-                      <a:rPr lang="en-US" i="1" smtClean="0">
-                        <a:latin typeface="Cambria Math" panose="02040503050406030204" pitchFamily="18" charset="0"/>
-                        <a:ea typeface="Cambria Math" panose="02040503050406030204" pitchFamily="18" charset="0"/>
-                      </a:rPr>
-                      <m:t>𝜒</m:t>
-                    </m:r>
-                  </m:oMath>
-                </a14:m>
-                <a:r>
-                  <a:rPr lang="en-US" baseline="30000" dirty="0"/>
-                  <a:t>EFT</a:t>
-                </a:r>
-                <a:r>
-                  <a:rPr lang="en-US" dirty="0"/>
-                  <a:t>) in the last few years</a:t>
-                </a:r>
-              </a:p>
-              <a:p>
-                <a:pPr eaLnBrk="1" hangingPunct="1">
-                  <a:lnSpc>
-                    <a:spcPct val="100000"/>
-                  </a:lnSpc>
-                </a:pPr>
-                <a:r>
-                  <a:rPr lang="en-US" dirty="0"/>
-                  <a:t>Previous SRG studies of operators were limited to phenomenological models or one </a:t>
-                </a:r>
-                <a14:m>
-                  <m:oMath xmlns:m="http://schemas.openxmlformats.org/officeDocument/2006/math">
-                    <m:r>
-                      <a:rPr lang="en-US" i="1" smtClean="0">
-                        <a:latin typeface="Cambria Math" panose="02040503050406030204" pitchFamily="18" charset="0"/>
-                        <a:ea typeface="Cambria Math" panose="02040503050406030204" pitchFamily="18" charset="0"/>
-                      </a:rPr>
-                      <m:t>𝜒</m:t>
-                    </m:r>
-                  </m:oMath>
-                </a14:m>
-                <a:r>
-                  <a:rPr lang="en-US" baseline="30000" dirty="0"/>
-                  <a:t>EFT</a:t>
-                </a:r>
-                <a:r>
-                  <a:rPr lang="en-US" dirty="0"/>
-                  <a:t> interaction</a:t>
-                </a:r>
-              </a:p>
-              <a:p>
-                <a:pPr eaLnBrk="1" hangingPunct="1">
-                  <a:lnSpc>
-                    <a:spcPct val="100000"/>
-                  </a:lnSpc>
-                </a:pPr>
-                <a:r>
-                  <a:rPr lang="en-US" dirty="0">
-                    <a:solidFill>
-                      <a:srgbClr val="C00000"/>
-                    </a:solidFill>
-                  </a:rPr>
-                  <a:t>Revisit the question of how different potentials (regulator functions, cutoff, order, etc.) change under SRG transformations and how these transformations affect other operators</a:t>
-                </a:r>
-              </a:p>
-              <a:p>
-                <a:pPr eaLnBrk="1" hangingPunct="1">
-                  <a:lnSpc>
-                    <a:spcPct val="100000"/>
-                  </a:lnSpc>
-                </a:pPr>
-                <a:endParaRPr lang="en-US" dirty="0"/>
-              </a:p>
-              <a:p>
-                <a:pPr eaLnBrk="1" hangingPunct="1">
-                  <a:lnSpc>
-                    <a:spcPct val="100000"/>
-                  </a:lnSpc>
-                </a:pPr>
-                <a:endParaRPr lang="en-US" altLang="en-US" dirty="0"/>
-              </a:p>
-            </p:txBody>
-          </p:sp>
-        </mc:Choice>
-        <mc:Fallback>
-          <p:sp>
-            <p:nvSpPr>
-              <p:cNvPr id="16386" name="Content Placeholder 2">
-                <a:extLst>
-                  <a:ext uri="{FF2B5EF4-FFF2-40B4-BE49-F238E27FC236}">
-                    <a16:creationId xmlns:a16="http://schemas.microsoft.com/office/drawing/2014/main" id="{1E545BB1-32E9-674B-9038-39B228DDBB3F}"/>
-                  </a:ext>
-                </a:extLst>
-              </p:cNvPr>
-              <p:cNvSpPr>
-                <a:spLocks noGrp="1" noRot="1" noChangeAspect="1" noMove="1" noResize="1" noEditPoints="1" noAdjustHandles="1" noChangeArrowheads="1" noChangeShapeType="1" noTextEdit="1"/>
-              </p:cNvSpPr>
-              <p:nvPr>
-                <p:ph idx="1"/>
-              </p:nvPr>
-            </p:nvSpPr>
-            <p:spPr>
-              <a:blipFill>
-                <a:blip r:embed="rId2"/>
-                <a:stretch>
-                  <a:fillRect l="-965" t="-1754" r="-1930"/>
-                </a:stretch>
-              </a:blipFill>
-            </p:spPr>
-            <p:txBody>
-              <a:bodyPr/>
-              <a:lstStyle/>
-              <a:p>
-                <a:r>
-                  <a:rPr lang="en-US">
-                    <a:noFill/>
-                  </a:rPr>
-                  <a:t> </a:t>
-                </a:r>
-              </a:p>
-            </p:txBody>
-          </p:sp>
-        </mc:Fallback>
-      </mc:AlternateContent>
-    </p:spTree>
-  </p:cSld>
-  <p:clrMapOvr>
-    <a:masterClrMapping/>
-  </p:clrMapOvr>
-</p:sld>
-</file>
-
-<file path=ppt/slides/slide20.xml><?xml version="1.0" encoding="utf-8"?>
-<p:sld xmlns:a="http://schemas.openxmlformats.org/drawingml/2006/main" xmlns:r="http://schemas.openxmlformats.org/officeDocument/2006/relationships" xmlns:p="http://schemas.openxmlformats.org/presentationml/2006/main">
-  <p:cSld>
-    <p:spTree>
-      <p:nvGrpSpPr>
-        <p:cNvPr id="1" name=""/>
-        <p:cNvGrpSpPr/>
-        <p:nvPr/>
-      </p:nvGrpSpPr>
-      <p:grpSpPr>
-        <a:xfrm>
-          <a:off x="0" y="0"/>
-          <a:ext cx="0" cy="0"/>
-          <a:chOff x="0" y="0"/>
-          <a:chExt cx="0" cy="0"/>
-        </a:xfrm>
-      </p:grpSpPr>
-      <p:sp>
-        <p:nvSpPr>
-          <p:cNvPr id="29697" name="Title 1">
-            <a:extLst>
-              <a:ext uri="{FF2B5EF4-FFF2-40B4-BE49-F238E27FC236}">
-                <a16:creationId xmlns:a16="http://schemas.microsoft.com/office/drawing/2014/main" id="{830C073B-E429-BD4E-BC96-7EB76A0C35C7}"/>
-              </a:ext>
-            </a:extLst>
-          </p:cNvPr>
-          <p:cNvSpPr>
-            <a:spLocks noGrp="1" noChangeArrowheads="1"/>
-          </p:cNvSpPr>
-          <p:nvPr>
-            <p:ph type="title"/>
-          </p:nvPr>
-        </p:nvSpPr>
-        <p:spPr/>
-        <p:txBody>
-          <a:bodyPr/>
-          <a:lstStyle/>
-          <a:p>
-            <a:pPr eaLnBrk="1" hangingPunct="1">
-              <a:lnSpc>
-                <a:spcPct val="100000"/>
-              </a:lnSpc>
-            </a:pPr>
-            <a:r>
-              <a:rPr lang="en-US" altLang="en-US" dirty="0">
-                <a:solidFill>
-                  <a:srgbClr val="002060"/>
-                </a:solidFill>
-              </a:rPr>
-              <a:t>Momentum projection operator</a:t>
-            </a:r>
-          </a:p>
-        </p:txBody>
-      </p:sp>
-      <mc:AlternateContent xmlns:mc="http://schemas.openxmlformats.org/markup-compatibility/2006">
-        <mc:Choice xmlns:a14="http://schemas.microsoft.com/office/drawing/2010/main" Requires="a14">
-          <p:sp>
-            <p:nvSpPr>
-              <p:cNvPr id="29698" name="Content Placeholder 2">
-                <a:extLst>
-                  <a:ext uri="{FF2B5EF4-FFF2-40B4-BE49-F238E27FC236}">
-                    <a16:creationId xmlns:a16="http://schemas.microsoft.com/office/drawing/2014/main" id="{5C90EF02-C1E2-2B4E-940D-292625AD1D37}"/>
-                  </a:ext>
-                </a:extLst>
-              </p:cNvPr>
-              <p:cNvSpPr>
-                <a:spLocks noGrp="1" noChangeArrowheads="1"/>
-              </p:cNvSpPr>
-              <p:nvPr>
-                <p:ph idx="1"/>
-              </p:nvPr>
-            </p:nvSpPr>
-            <p:spPr>
-              <a:xfrm>
-                <a:off x="8624528" y="2129918"/>
-                <a:ext cx="3389767" cy="4685095"/>
-              </a:xfrm>
-            </p:spPr>
-            <p:txBody>
-              <a:bodyPr/>
-              <a:lstStyle/>
-              <a:p>
-                <a:pPr eaLnBrk="1" hangingPunct="1">
-                  <a:lnSpc>
-                    <a:spcPct val="100000"/>
-                  </a:lnSpc>
-                </a:pPr>
-                <a:r>
-                  <a:rPr lang="en-US" altLang="en-US" sz="2200" dirty="0"/>
-                  <a:t>Evolution of high-momentum operator (</a:t>
-                </a:r>
-                <a14:m>
-                  <m:oMath xmlns:m="http://schemas.openxmlformats.org/officeDocument/2006/math">
-                    <m:r>
-                      <a:rPr lang="en-US" sz="2200" b="0" i="1" smtClean="0">
-                        <a:solidFill>
-                          <a:srgbClr val="C00000"/>
-                        </a:solidFill>
-                        <a:latin typeface="Cambria Math" panose="02040503050406030204" pitchFamily="18" charset="0"/>
-                        <a:cs typeface="Arial" panose="020B0604020202020204" pitchFamily="34" charset="0"/>
-                      </a:rPr>
-                      <m:t>𝑞</m:t>
-                    </m:r>
-                    <m:r>
-                      <a:rPr lang="en-US" sz="2200" b="0" i="1" smtClean="0">
-                        <a:solidFill>
-                          <a:srgbClr val="C00000"/>
-                        </a:solidFill>
-                        <a:latin typeface="Cambria Math" panose="02040503050406030204" pitchFamily="18" charset="0"/>
-                        <a:cs typeface="Arial" panose="020B0604020202020204" pitchFamily="34" charset="0"/>
-                      </a:rPr>
-                      <m:t>=3</m:t>
-                    </m:r>
-                  </m:oMath>
-                </a14:m>
-                <a:r>
-                  <a:rPr lang="en-US" altLang="en-US" sz="2200" dirty="0"/>
-                  <a:t> </a:t>
-                </a:r>
-                <a:r>
-                  <a:rPr lang="en-US" sz="2200" dirty="0">
-                    <a:solidFill>
-                      <a:srgbClr val="C00000"/>
-                    </a:solidFill>
-                    <a:cs typeface="Arial" panose="020B0604020202020204" pitchFamily="34" charset="0"/>
-                  </a:rPr>
-                  <a:t>fm</a:t>
-                </a:r>
-                <a:r>
-                  <a:rPr lang="en-US" sz="2200" baseline="30000" dirty="0">
-                    <a:solidFill>
-                      <a:srgbClr val="C00000"/>
-                    </a:solidFill>
-                    <a:cs typeface="Arial" panose="020B0604020202020204" pitchFamily="34" charset="0"/>
-                  </a:rPr>
-                  <a:t>-1</a:t>
-                </a:r>
-                <a:r>
-                  <a:rPr lang="en-US" altLang="en-US" sz="2200" dirty="0"/>
-                  <a:t>) shifts strength to low-momentum matrix elements</a:t>
-                </a:r>
-              </a:p>
-              <a:p>
-                <a:pPr eaLnBrk="1" hangingPunct="1">
-                  <a:lnSpc>
-                    <a:spcPct val="100000"/>
-                  </a:lnSpc>
-                </a:pPr>
-                <a:r>
-                  <a:rPr lang="en-US" altLang="en-US" sz="2200" dirty="0"/>
-                  <a:t>Low-momentum operator (</a:t>
-                </a:r>
-                <a14:m>
-                  <m:oMath xmlns:m="http://schemas.openxmlformats.org/officeDocument/2006/math">
-                    <m:r>
-                      <a:rPr lang="en-US" sz="2200" b="0" i="1" smtClean="0">
-                        <a:solidFill>
-                          <a:srgbClr val="C00000"/>
-                        </a:solidFill>
-                        <a:latin typeface="Cambria Math" panose="02040503050406030204" pitchFamily="18" charset="0"/>
-                        <a:cs typeface="Arial" panose="020B0604020202020204" pitchFamily="34" charset="0"/>
-                      </a:rPr>
-                      <m:t>𝑞</m:t>
-                    </m:r>
-                    <m:r>
-                      <a:rPr lang="en-US" sz="2200" b="0" i="1" smtClean="0">
-                        <a:solidFill>
-                          <a:srgbClr val="C00000"/>
-                        </a:solidFill>
-                        <a:latin typeface="Cambria Math" panose="02040503050406030204" pitchFamily="18" charset="0"/>
-                        <a:cs typeface="Arial" panose="020B0604020202020204" pitchFamily="34" charset="0"/>
-                      </a:rPr>
-                      <m:t>=0.3</m:t>
-                    </m:r>
-                  </m:oMath>
-                </a14:m>
-                <a:r>
-                  <a:rPr lang="en-US" altLang="en-US" sz="2200" dirty="0"/>
-                  <a:t> </a:t>
-                </a:r>
-                <a:r>
-                  <a:rPr lang="en-US" sz="2200" dirty="0">
-                    <a:solidFill>
-                      <a:srgbClr val="C00000"/>
-                    </a:solidFill>
-                    <a:cs typeface="Arial" panose="020B0604020202020204" pitchFamily="34" charset="0"/>
-                  </a:rPr>
-                  <a:t>fm</a:t>
-                </a:r>
-                <a:r>
-                  <a:rPr lang="en-US" sz="2200" baseline="30000" dirty="0">
-                    <a:solidFill>
-                      <a:srgbClr val="C00000"/>
-                    </a:solidFill>
-                    <a:cs typeface="Arial" panose="020B0604020202020204" pitchFamily="34" charset="0"/>
-                  </a:rPr>
-                  <a:t>-1</a:t>
-                </a:r>
-                <a:r>
-                  <a:rPr lang="en-US" altLang="en-US" sz="2200" dirty="0"/>
-                  <a:t>) retains the same momentum scale</a:t>
-                </a:r>
-              </a:p>
-            </p:txBody>
-          </p:sp>
-        </mc:Choice>
-        <mc:Fallback>
-          <p:sp>
-            <p:nvSpPr>
-              <p:cNvPr id="29698" name="Content Placeholder 2">
-                <a:extLst>
-                  <a:ext uri="{FF2B5EF4-FFF2-40B4-BE49-F238E27FC236}">
-                    <a16:creationId xmlns:a16="http://schemas.microsoft.com/office/drawing/2014/main" id="{5C90EF02-C1E2-2B4E-940D-292625AD1D37}"/>
-                  </a:ext>
-                </a:extLst>
-              </p:cNvPr>
-              <p:cNvSpPr>
-                <a:spLocks noGrp="1" noRot="1" noChangeAspect="1" noMove="1" noResize="1" noEditPoints="1" noAdjustHandles="1" noChangeArrowheads="1" noChangeShapeType="1" noTextEdit="1"/>
-              </p:cNvSpPr>
-              <p:nvPr>
-                <p:ph idx="1"/>
-              </p:nvPr>
-            </p:nvSpPr>
-            <p:spPr>
-              <a:xfrm>
-                <a:off x="8624528" y="2129918"/>
-                <a:ext cx="3389767" cy="4685095"/>
-              </a:xfrm>
-              <a:blipFill>
-                <a:blip r:embed="rId2"/>
-                <a:stretch>
-                  <a:fillRect l="-1866" t="-1084"/>
-                </a:stretch>
-              </a:blipFill>
-            </p:spPr>
-            <p:txBody>
-              <a:bodyPr/>
-              <a:lstStyle/>
-              <a:p>
-                <a:r>
-                  <a:rPr lang="en-US">
-                    <a:noFill/>
-                  </a:rPr>
-                  <a:t> </a:t>
-                </a:r>
-              </a:p>
-            </p:txBody>
-          </p:sp>
-        </mc:Fallback>
-      </mc:AlternateContent>
-      <p:pic>
-        <p:nvPicPr>
-          <p:cNvPr id="29699" name="Picture 3">
-            <a:extLst>
-              <a:ext uri="{FF2B5EF4-FFF2-40B4-BE49-F238E27FC236}">
-                <a16:creationId xmlns:a16="http://schemas.microsoft.com/office/drawing/2014/main" id="{551FA7BB-A837-0840-AF6C-B5C3C7FB4BEB}"/>
-              </a:ext>
-            </a:extLst>
-          </p:cNvPr>
-          <p:cNvPicPr>
-            <a:picLocks noChangeAspect="1" noChangeArrowheads="1"/>
-          </p:cNvPicPr>
-          <p:nvPr/>
-        </p:nvPicPr>
-        <p:blipFill>
-          <a:blip r:embed="rId3">
-            <a:extLst>
-              <a:ext uri="{28A0092B-C50C-407E-A947-70E740481C1C}">
-                <a14:useLocalDpi xmlns:a14="http://schemas.microsoft.com/office/drawing/2010/main" val="0"/>
-              </a:ext>
-            </a:extLst>
-          </a:blip>
-          <a:srcRect/>
-          <a:stretch>
-            <a:fillRect/>
-          </a:stretch>
-        </p:blipFill>
-        <p:spPr bwMode="auto">
-          <a:xfrm>
-            <a:off x="8891" y="1790193"/>
-            <a:ext cx="8586024" cy="2194560"/>
-          </a:xfrm>
-          <a:prstGeom prst="rect">
-            <a:avLst/>
-          </a:prstGeom>
-          <a:noFill/>
-          <a:ln>
-            <a:noFill/>
-          </a:ln>
-          <a:extLst>
-            <a:ext uri="{909E8E84-426E-40DD-AFC4-6F175D3DCCD1}">
-              <a14:hiddenFill xmlns:a14="http://schemas.microsoft.com/office/drawing/2010/main">
-                <a:solidFill>
-                  <a:srgbClr val="FFFFFF"/>
-                </a:solidFill>
-              </a14:hiddenFill>
-            </a:ext>
-            <a:ext uri="{91240B29-F687-4F45-9708-019B960494DF}">
-              <a14:hiddenLine xmlns:a14="http://schemas.microsoft.com/office/drawing/2010/main" w="9525">
-                <a:solidFill>
-                  <a:srgbClr val="000000"/>
-                </a:solidFill>
-                <a:miter lim="800000"/>
-                <a:headEnd/>
-                <a:tailEnd/>
-              </a14:hiddenLine>
-            </a:ext>
-          </a:extLst>
-        </p:spPr>
-      </p:pic>
-      <mc:AlternateContent xmlns:mc="http://schemas.openxmlformats.org/markup-compatibility/2006">
-        <mc:Choice xmlns:a14="http://schemas.microsoft.com/office/drawing/2010/main" Requires="a14">
-          <p:sp>
-            <p:nvSpPr>
-              <p:cNvPr id="6" name="Rectangle 5">
-                <a:extLst>
-                  <a:ext uri="{FF2B5EF4-FFF2-40B4-BE49-F238E27FC236}">
-                    <a16:creationId xmlns:a16="http://schemas.microsoft.com/office/drawing/2014/main" id="{2FB372EB-3256-7B41-AA54-570D7DFBD0D7}"/>
-                  </a:ext>
-                </a:extLst>
-              </p:cNvPr>
-              <p:cNvSpPr/>
-              <p:nvPr/>
-            </p:nvSpPr>
-            <p:spPr>
-              <a:xfrm>
-                <a:off x="40421" y="6170734"/>
-                <a:ext cx="9734200" cy="644279"/>
-              </a:xfrm>
-              <a:prstGeom prst="rect">
-                <a:avLst/>
-              </a:prstGeom>
-            </p:spPr>
-            <p:txBody>
-              <a:bodyPr wrap="square">
-                <a:spAutoFit/>
-              </a:bodyPr>
-              <a:lstStyle/>
-              <a:p>
-                <a:r>
-                  <a:rPr lang="en-US" sz="1600" dirty="0">
-                    <a:latin typeface="Arial" panose="020B0604020202020204" pitchFamily="34" charset="0"/>
-                    <a:cs typeface="Arial" panose="020B0604020202020204" pitchFamily="34" charset="0"/>
-                  </a:rPr>
-                  <a:t>Fig. 6: </a:t>
-                </a:r>
-                <a:r>
-                  <a:rPr lang="en-US" altLang="en-US" sz="1600" dirty="0"/>
-                  <a:t>Integrand of </a:t>
-                </a:r>
-                <a14:m>
-                  <m:oMath xmlns:m="http://schemas.openxmlformats.org/officeDocument/2006/math">
-                    <m:d>
-                      <m:dPr>
-                        <m:begChr m:val="⟨"/>
-                        <m:endChr m:val="⟩"/>
-                        <m:ctrlPr>
-                          <a:rPr lang="en-US" altLang="en-US" sz="1600" i="1" smtClean="0">
-                            <a:solidFill>
-                              <a:srgbClr val="C00000"/>
-                            </a:solidFill>
-                            <a:latin typeface="Cambria Math" panose="02040503050406030204" pitchFamily="18" charset="0"/>
-                          </a:rPr>
-                        </m:ctrlPr>
-                      </m:dPr>
-                      <m:e>
-                        <m:sSub>
-                          <m:sSubPr>
-                            <m:ctrlPr>
-                              <a:rPr lang="en-US" altLang="en-US" sz="1600" i="1" smtClean="0">
-                                <a:solidFill>
-                                  <a:srgbClr val="C00000"/>
-                                </a:solidFill>
-                                <a:latin typeface="Cambria Math" panose="02040503050406030204" pitchFamily="18" charset="0"/>
-                              </a:rPr>
-                            </m:ctrlPr>
-                          </m:sSubPr>
-                          <m:e>
-                            <m:r>
-                              <a:rPr lang="en-US" altLang="en-US" sz="1600" i="1" smtClean="0">
-                                <a:solidFill>
-                                  <a:srgbClr val="C00000"/>
-                                </a:solidFill>
-                                <a:latin typeface="Cambria Math" panose="02040503050406030204" pitchFamily="18" charset="0"/>
-                                <a:ea typeface="Cambria Math" panose="02040503050406030204" pitchFamily="18" charset="0"/>
-                              </a:rPr>
-                              <m:t>𝜓</m:t>
-                            </m:r>
-                          </m:e>
-                          <m:sub>
-                            <m:r>
-                              <a:rPr lang="en-US" altLang="en-US" sz="1600" b="0" i="1" smtClean="0">
-                                <a:solidFill>
-                                  <a:srgbClr val="C00000"/>
-                                </a:solidFill>
-                                <a:latin typeface="Cambria Math" panose="02040503050406030204" pitchFamily="18" charset="0"/>
-                              </a:rPr>
-                              <m:t>𝑑</m:t>
-                            </m:r>
-                          </m:sub>
-                        </m:sSub>
-                      </m:e>
-                      <m:e>
-                        <m:sSubSup>
-                          <m:sSubSupPr>
-                            <m:ctrlPr>
-                              <a:rPr lang="en-US" altLang="en-US" sz="1600" i="1" smtClean="0">
-                                <a:solidFill>
-                                  <a:srgbClr val="C00000"/>
-                                </a:solidFill>
-                                <a:latin typeface="Cambria Math" panose="02040503050406030204" pitchFamily="18" charset="0"/>
-                              </a:rPr>
-                            </m:ctrlPr>
-                          </m:sSubSupPr>
-                          <m:e>
-                            <m:r>
-                              <a:rPr lang="en-US" altLang="en-US" sz="1600" b="0" i="1" smtClean="0">
-                                <a:solidFill>
-                                  <a:srgbClr val="C00000"/>
-                                </a:solidFill>
-                                <a:latin typeface="Cambria Math" panose="02040503050406030204" pitchFamily="18" charset="0"/>
-                              </a:rPr>
-                              <m:t>𝑎</m:t>
-                            </m:r>
-                          </m:e>
-                          <m:sub>
-                            <m:r>
-                              <a:rPr lang="en-US" altLang="en-US" sz="1600" b="0" i="1" smtClean="0">
-                                <a:solidFill>
-                                  <a:srgbClr val="C00000"/>
-                                </a:solidFill>
-                                <a:latin typeface="Cambria Math" panose="02040503050406030204" pitchFamily="18" charset="0"/>
-                              </a:rPr>
-                              <m:t>𝑞</m:t>
-                            </m:r>
-                          </m:sub>
-                          <m:sup>
-                            <m:r>
-                              <a:rPr lang="en-US" altLang="en-US" sz="1600" i="1" smtClean="0">
-                                <a:solidFill>
-                                  <a:srgbClr val="C00000"/>
-                                </a:solidFill>
-                                <a:latin typeface="Cambria Math" panose="02040503050406030204" pitchFamily="18" charset="0"/>
-                                <a:ea typeface="Cambria Math" panose="02040503050406030204" pitchFamily="18" charset="0"/>
-                              </a:rPr>
-                              <m:t>†</m:t>
-                            </m:r>
-                          </m:sup>
-                        </m:sSubSup>
-                        <m:sSub>
-                          <m:sSubPr>
-                            <m:ctrlPr>
-                              <a:rPr lang="en-US" altLang="en-US" sz="1600" i="1" smtClean="0">
-                                <a:solidFill>
-                                  <a:srgbClr val="C00000"/>
-                                </a:solidFill>
-                                <a:latin typeface="Cambria Math" panose="02040503050406030204" pitchFamily="18" charset="0"/>
-                              </a:rPr>
-                            </m:ctrlPr>
-                          </m:sSubPr>
-                          <m:e>
-                            <m:r>
-                              <a:rPr lang="en-US" altLang="en-US" sz="1600" b="0" i="1" smtClean="0">
-                                <a:solidFill>
-                                  <a:srgbClr val="C00000"/>
-                                </a:solidFill>
-                                <a:latin typeface="Cambria Math" panose="02040503050406030204" pitchFamily="18" charset="0"/>
-                              </a:rPr>
-                              <m:t>𝑎</m:t>
-                            </m:r>
-                          </m:e>
-                          <m:sub>
-                            <m:r>
-                              <a:rPr lang="en-US" altLang="en-US" sz="1600" b="0" i="1" smtClean="0">
-                                <a:solidFill>
-                                  <a:srgbClr val="C00000"/>
-                                </a:solidFill>
-                                <a:latin typeface="Cambria Math" panose="02040503050406030204" pitchFamily="18" charset="0"/>
-                              </a:rPr>
-                              <m:t>𝑞</m:t>
-                            </m:r>
-                          </m:sub>
-                        </m:sSub>
-                      </m:e>
-                      <m:e>
-                        <m:sSub>
-                          <m:sSubPr>
-                            <m:ctrlPr>
-                              <a:rPr lang="en-US" altLang="en-US" sz="1600" i="1" smtClean="0">
-                                <a:solidFill>
-                                  <a:srgbClr val="C00000"/>
-                                </a:solidFill>
-                                <a:latin typeface="Cambria Math" panose="02040503050406030204" pitchFamily="18" charset="0"/>
-                              </a:rPr>
-                            </m:ctrlPr>
-                          </m:sSubPr>
-                          <m:e>
-                            <m:r>
-                              <a:rPr lang="en-US" altLang="en-US" sz="1600" i="1" smtClean="0">
-                                <a:solidFill>
-                                  <a:srgbClr val="C00000"/>
-                                </a:solidFill>
-                                <a:latin typeface="Cambria Math" panose="02040503050406030204" pitchFamily="18" charset="0"/>
-                                <a:ea typeface="Cambria Math" panose="02040503050406030204" pitchFamily="18" charset="0"/>
-                              </a:rPr>
-                              <m:t>𝜓</m:t>
-                            </m:r>
-                          </m:e>
-                          <m:sub>
-                            <m:r>
-                              <a:rPr lang="en-US" altLang="en-US" sz="1600" b="0" i="1" smtClean="0">
-                                <a:solidFill>
-                                  <a:srgbClr val="C00000"/>
-                                </a:solidFill>
-                                <a:latin typeface="Cambria Math" panose="02040503050406030204" pitchFamily="18" charset="0"/>
-                              </a:rPr>
-                              <m:t>𝑑</m:t>
-                            </m:r>
-                          </m:sub>
-                        </m:sSub>
-                      </m:e>
-                    </m:d>
-                  </m:oMath>
-                </a14:m>
-                <a:r>
-                  <a:rPr lang="en-US" altLang="en-US" sz="1600" dirty="0"/>
-                  <a:t> in momentum-space </a:t>
-                </a:r>
-                <a:r>
-                  <a:rPr lang="en-US" sz="1600" dirty="0">
-                    <a:latin typeface="Arial" panose="020B0604020202020204" pitchFamily="34" charset="0"/>
-                    <a:cs typeface="Arial" panose="020B0604020202020204" pitchFamily="34" charset="0"/>
-                  </a:rPr>
-                  <a:t>for </a:t>
-                </a:r>
-                <a14:m>
-                  <m:oMath xmlns:m="http://schemas.openxmlformats.org/officeDocument/2006/math">
-                    <m:r>
-                      <a:rPr lang="en-US" sz="1600" b="0" i="1" smtClean="0">
-                        <a:solidFill>
-                          <a:srgbClr val="C00000"/>
-                        </a:solidFill>
-                        <a:latin typeface="Cambria Math" panose="02040503050406030204" pitchFamily="18" charset="0"/>
-                        <a:cs typeface="Arial" panose="020B0604020202020204" pitchFamily="34" charset="0"/>
-                      </a:rPr>
-                      <m:t>𝑞</m:t>
-                    </m:r>
-                    <m:r>
-                      <a:rPr lang="en-US" sz="1600" b="0" i="1" smtClean="0">
-                        <a:solidFill>
-                          <a:srgbClr val="C00000"/>
-                        </a:solidFill>
-                        <a:latin typeface="Cambria Math" panose="02040503050406030204" pitchFamily="18" charset="0"/>
-                        <a:cs typeface="Arial" panose="020B0604020202020204" pitchFamily="34" charset="0"/>
-                      </a:rPr>
-                      <m:t>=3</m:t>
-                    </m:r>
-                  </m:oMath>
-                </a14:m>
-                <a:r>
-                  <a:rPr lang="en-US" sz="1600" dirty="0">
-                    <a:solidFill>
-                      <a:srgbClr val="C00000"/>
-                    </a:solidFill>
-                    <a:latin typeface="Arial" panose="020B0604020202020204" pitchFamily="34" charset="0"/>
-                    <a:cs typeface="Arial" panose="020B0604020202020204" pitchFamily="34" charset="0"/>
-                  </a:rPr>
-                  <a:t> (top) </a:t>
-                </a:r>
-                <a:r>
-                  <a:rPr lang="en-US" sz="1600" dirty="0">
-                    <a:latin typeface="Arial" panose="020B0604020202020204" pitchFamily="34" charset="0"/>
-                    <a:cs typeface="Arial" panose="020B0604020202020204" pitchFamily="34" charset="0"/>
-                  </a:rPr>
-                  <a:t>and</a:t>
-                </a:r>
-                <a:r>
-                  <a:rPr lang="en-US" sz="1600" dirty="0">
-                    <a:solidFill>
-                      <a:srgbClr val="C00000"/>
-                    </a:solidFill>
-                    <a:latin typeface="Arial" panose="020B0604020202020204" pitchFamily="34" charset="0"/>
-                    <a:cs typeface="Arial" panose="020B0604020202020204" pitchFamily="34" charset="0"/>
-                  </a:rPr>
-                  <a:t> </a:t>
-                </a:r>
-                <a14:m>
-                  <m:oMath xmlns:m="http://schemas.openxmlformats.org/officeDocument/2006/math">
-                    <m:r>
-                      <a:rPr lang="en-US" sz="1600" b="0" i="1" smtClean="0">
-                        <a:solidFill>
-                          <a:srgbClr val="C00000"/>
-                        </a:solidFill>
-                        <a:latin typeface="Cambria Math" panose="02040503050406030204" pitchFamily="18" charset="0"/>
-                        <a:cs typeface="Arial" panose="020B0604020202020204" pitchFamily="34" charset="0"/>
-                      </a:rPr>
-                      <m:t>0.3</m:t>
-                    </m:r>
-                  </m:oMath>
-                </a14:m>
-                <a:r>
-                  <a:rPr lang="en-US" sz="1600" dirty="0">
-                    <a:solidFill>
-                      <a:srgbClr val="C00000"/>
-                    </a:solidFill>
-                    <a:latin typeface="Arial" panose="020B0604020202020204" pitchFamily="34" charset="0"/>
-                    <a:cs typeface="Arial" panose="020B0604020202020204" pitchFamily="34" charset="0"/>
-                  </a:rPr>
-                  <a:t> (bottom) fm</a:t>
-                </a:r>
-                <a:r>
-                  <a:rPr lang="en-US" sz="1600" baseline="30000" dirty="0">
-                    <a:solidFill>
-                      <a:srgbClr val="C00000"/>
-                    </a:solidFill>
-                    <a:latin typeface="Arial" panose="020B0604020202020204" pitchFamily="34" charset="0"/>
-                    <a:cs typeface="Arial" panose="020B0604020202020204" pitchFamily="34" charset="0"/>
-                  </a:rPr>
-                  <a:t>-1</a:t>
-                </a:r>
-                <a:r>
-                  <a:rPr lang="en-US" sz="1600" dirty="0">
-                    <a:latin typeface="Arial" panose="020B0604020202020204" pitchFamily="34" charset="0"/>
-                    <a:cs typeface="Arial" panose="020B0604020202020204" pitchFamily="34" charset="0"/>
-                  </a:rPr>
-                  <a:t> with SRG transformations for several values of </a:t>
-                </a:r>
-                <a14:m>
-                  <m:oMath xmlns:m="http://schemas.openxmlformats.org/officeDocument/2006/math">
-                    <m:r>
-                      <a:rPr lang="en-US" sz="1600" i="1">
-                        <a:latin typeface="Cambria Math" panose="02040503050406030204" pitchFamily="18" charset="0"/>
-                        <a:ea typeface="Cambria Math" panose="02040503050406030204" pitchFamily="18" charset="0"/>
-                      </a:rPr>
-                      <m:t>𝜆</m:t>
-                    </m:r>
-                  </m:oMath>
-                </a14:m>
-                <a:r>
-                  <a:rPr lang="en-US" sz="1600" dirty="0">
-                    <a:latin typeface="Arial" panose="020B0604020202020204" pitchFamily="34" charset="0"/>
-                    <a:cs typeface="Arial" panose="020B0604020202020204" pitchFamily="34" charset="0"/>
-                  </a:rPr>
-                  <a:t> where the transformations are done using the RKE N</a:t>
-                </a:r>
-                <a:r>
-                  <a:rPr lang="en-US" sz="1600" baseline="30000" dirty="0">
-                    <a:latin typeface="Arial" panose="020B0604020202020204" pitchFamily="34" charset="0"/>
-                    <a:cs typeface="Arial" panose="020B0604020202020204" pitchFamily="34" charset="0"/>
-                  </a:rPr>
-                  <a:t>3</a:t>
-                </a:r>
-                <a:r>
-                  <a:rPr lang="en-US" sz="1600" dirty="0">
-                    <a:latin typeface="Arial" panose="020B0604020202020204" pitchFamily="34" charset="0"/>
-                    <a:cs typeface="Arial" panose="020B0604020202020204" pitchFamily="34" charset="0"/>
-                  </a:rPr>
-                  <a:t>LO potential.</a:t>
-                </a:r>
-              </a:p>
-            </p:txBody>
-          </p:sp>
-        </mc:Choice>
-        <mc:Fallback>
-          <p:sp>
-            <p:nvSpPr>
-              <p:cNvPr id="6" name="Rectangle 5">
-                <a:extLst>
-                  <a:ext uri="{FF2B5EF4-FFF2-40B4-BE49-F238E27FC236}">
-                    <a16:creationId xmlns:a16="http://schemas.microsoft.com/office/drawing/2014/main" id="{2FB372EB-3256-7B41-AA54-570D7DFBD0D7}"/>
-                  </a:ext>
-                </a:extLst>
-              </p:cNvPr>
-              <p:cNvSpPr>
-                <a:spLocks noRot="1" noChangeAspect="1" noMove="1" noResize="1" noEditPoints="1" noAdjustHandles="1" noChangeArrowheads="1" noChangeShapeType="1" noTextEdit="1"/>
-              </p:cNvSpPr>
-              <p:nvPr/>
-            </p:nvSpPr>
-            <p:spPr>
-              <a:xfrm>
-                <a:off x="40421" y="6170734"/>
-                <a:ext cx="9734200" cy="644279"/>
-              </a:xfrm>
-              <a:prstGeom prst="rect">
-                <a:avLst/>
-              </a:prstGeom>
-              <a:blipFill>
-                <a:blip r:embed="rId4"/>
-                <a:stretch>
-                  <a:fillRect l="-260" b="-9615"/>
-                </a:stretch>
-              </a:blipFill>
-            </p:spPr>
-            <p:txBody>
-              <a:bodyPr/>
-              <a:lstStyle/>
-              <a:p>
-                <a:r>
-                  <a:rPr lang="en-US">
-                    <a:noFill/>
-                  </a:rPr>
-                  <a:t> </a:t>
-                </a:r>
-              </a:p>
-            </p:txBody>
-          </p:sp>
-        </mc:Fallback>
-      </mc:AlternateContent>
-      <p:pic>
-        <p:nvPicPr>
-          <p:cNvPr id="3" name="Picture 2">
-            <a:extLst>
-              <a:ext uri="{FF2B5EF4-FFF2-40B4-BE49-F238E27FC236}">
-                <a16:creationId xmlns:a16="http://schemas.microsoft.com/office/drawing/2014/main" id="{33179002-82D9-D841-8CBD-3C358101F27D}"/>
-              </a:ext>
-            </a:extLst>
-          </p:cNvPr>
-          <p:cNvPicPr>
-            <a:picLocks noChangeAspect="1"/>
-          </p:cNvPicPr>
-          <p:nvPr/>
-        </p:nvPicPr>
-        <p:blipFill>
-          <a:blip r:embed="rId5"/>
-          <a:stretch>
-            <a:fillRect/>
-          </a:stretch>
-        </p:blipFill>
-        <p:spPr>
-          <a:xfrm>
-            <a:off x="8891" y="3980464"/>
-            <a:ext cx="8584107" cy="2194560"/>
-          </a:xfrm>
-          <a:prstGeom prst="rect">
-            <a:avLst/>
-          </a:prstGeom>
-        </p:spPr>
-      </p:pic>
-    </p:spTree>
-  </p:cSld>
-  <p:clrMapOvr>
-    <a:masterClrMapping/>
-  </p:clrMapOvr>
-</p:sld>
-</file>
-
 <file path=ppt/slides/slide21.xml><?xml version="1.0" encoding="utf-8"?>
-<p:sld xmlns:a="http://schemas.openxmlformats.org/drawingml/2006/main" xmlns:r="http://schemas.openxmlformats.org/officeDocument/2006/relationships" xmlns:p="http://schemas.openxmlformats.org/presentationml/2006/main">
-  <p:cSld>
-    <p:spTree>
-      <p:nvGrpSpPr>
-        <p:cNvPr id="1" name=""/>
-        <p:cNvGrpSpPr/>
-        <p:nvPr/>
-      </p:nvGrpSpPr>
-      <p:grpSpPr>
-        <a:xfrm>
-          <a:off x="0" y="0"/>
-          <a:ext cx="0" cy="0"/>
-          <a:chOff x="0" y="0"/>
-          <a:chExt cx="0" cy="0"/>
-        </a:xfrm>
-      </p:grpSpPr>
-      <p:sp>
-        <p:nvSpPr>
-          <p:cNvPr id="30721" name="Title 1">
-            <a:extLst>
-              <a:ext uri="{FF2B5EF4-FFF2-40B4-BE49-F238E27FC236}">
-                <a16:creationId xmlns:a16="http://schemas.microsoft.com/office/drawing/2014/main" id="{075253A1-56FB-1248-87F2-E39A89F9DE31}"/>
-              </a:ext>
-            </a:extLst>
-          </p:cNvPr>
-          <p:cNvSpPr>
-            <a:spLocks noGrp="1" noChangeArrowheads="1"/>
-          </p:cNvSpPr>
-          <p:nvPr>
-            <p:ph type="title"/>
-          </p:nvPr>
-        </p:nvSpPr>
-        <p:spPr/>
-        <p:txBody>
-          <a:bodyPr/>
-          <a:lstStyle/>
-          <a:p>
-            <a:pPr eaLnBrk="1" hangingPunct="1">
-              <a:lnSpc>
-                <a:spcPct val="100000"/>
-              </a:lnSpc>
-            </a:pPr>
-            <a:r>
-              <a:rPr lang="en-US" altLang="en-US" dirty="0">
-                <a:solidFill>
-                  <a:srgbClr val="002060"/>
-                </a:solidFill>
-              </a:rPr>
-              <a:t>Momentum projection operator</a:t>
-            </a:r>
-          </a:p>
-        </p:txBody>
-      </p:sp>
-      <p:sp>
-        <p:nvSpPr>
-          <p:cNvPr id="30722" name="Content Placeholder 2">
-            <a:extLst>
-              <a:ext uri="{FF2B5EF4-FFF2-40B4-BE49-F238E27FC236}">
-                <a16:creationId xmlns:a16="http://schemas.microsoft.com/office/drawing/2014/main" id="{992B6A82-40BD-D342-86C9-23637472E5DA}"/>
-              </a:ext>
-            </a:extLst>
-          </p:cNvPr>
-          <p:cNvSpPr>
-            <a:spLocks noGrp="1" noChangeArrowheads="1"/>
-          </p:cNvSpPr>
-          <p:nvPr>
-            <p:ph idx="1"/>
-          </p:nvPr>
-        </p:nvSpPr>
-        <p:spPr/>
-        <p:txBody>
-          <a:bodyPr/>
-          <a:lstStyle/>
-          <a:p>
-            <a:pPr eaLnBrk="1" hangingPunct="1">
-              <a:lnSpc>
-                <a:spcPct val="100000"/>
-              </a:lnSpc>
-            </a:pPr>
-            <a:endParaRPr lang="en-US" altLang="en-US" dirty="0"/>
-          </a:p>
-        </p:txBody>
-      </p:sp>
-      <p:pic>
-        <p:nvPicPr>
-          <p:cNvPr id="30723" name="Picture 3">
-            <a:extLst>
-              <a:ext uri="{FF2B5EF4-FFF2-40B4-BE49-F238E27FC236}">
-                <a16:creationId xmlns:a16="http://schemas.microsoft.com/office/drawing/2014/main" id="{C74867CB-7D59-0C45-A8ED-C11309581F65}"/>
-              </a:ext>
-            </a:extLst>
-          </p:cNvPr>
-          <p:cNvPicPr>
-            <a:picLocks noChangeAspect="1" noChangeArrowheads="1"/>
-          </p:cNvPicPr>
-          <p:nvPr/>
-        </p:nvPicPr>
-        <p:blipFill>
-          <a:blip r:embed="rId2">
-            <a:extLst>
-              <a:ext uri="{28A0092B-C50C-407E-A947-70E740481C1C}">
-                <a14:useLocalDpi xmlns:a14="http://schemas.microsoft.com/office/drawing/2010/main" val="0"/>
-              </a:ext>
-            </a:extLst>
-          </a:blip>
-          <a:srcRect/>
-          <a:stretch>
-            <a:fillRect/>
-          </a:stretch>
-        </p:blipFill>
-        <p:spPr bwMode="auto">
-          <a:xfrm>
-            <a:off x="2440481" y="2967695"/>
-            <a:ext cx="8396288" cy="3114675"/>
-          </a:xfrm>
-          <a:prstGeom prst="rect">
-            <a:avLst/>
-          </a:prstGeom>
-          <a:noFill/>
-          <a:ln>
-            <a:noFill/>
-          </a:ln>
-          <a:extLst>
-            <a:ext uri="{909E8E84-426E-40DD-AFC4-6F175D3DCCD1}">
-              <a14:hiddenFill xmlns:a14="http://schemas.microsoft.com/office/drawing/2010/main">
-                <a:solidFill>
-                  <a:srgbClr val="FFFFFF"/>
-                </a:solidFill>
-              </a14:hiddenFill>
-            </a:ext>
-            <a:ext uri="{91240B29-F687-4F45-9708-019B960494DF}">
-              <a14:hiddenLine xmlns:a14="http://schemas.microsoft.com/office/drawing/2010/main" w="9525">
-                <a:solidFill>
-                  <a:srgbClr val="000000"/>
-                </a:solidFill>
-                <a:miter lim="800000"/>
-                <a:headEnd/>
-                <a:tailEnd/>
-              </a14:hiddenLine>
-            </a:ext>
-          </a:extLst>
-        </p:spPr>
-      </p:pic>
-    </p:spTree>
-  </p:cSld>
-  <p:clrMapOvr>
-    <a:masterClrMapping/>
-  </p:clrMapOvr>
-</p:sld>
-</file>
-
-<file path=ppt/slides/slide22.xml><?xml version="1.0" encoding="utf-8"?>
 <p:sld xmlns:a="http://schemas.openxmlformats.org/drawingml/2006/main" xmlns:r="http://schemas.openxmlformats.org/officeDocument/2006/relationships" xmlns:p="http://schemas.openxmlformats.org/presentationml/2006/main">
   <p:cSld>
     <p:spTree>
@@ -13451,6 +13378,245 @@
 </p:sld>
 </file>
 
+<file path=ppt/slides/slide22.xml><?xml version="1.0" encoding="utf-8"?>
+<p:sld xmlns:a="http://schemas.openxmlformats.org/drawingml/2006/main" xmlns:r="http://schemas.openxmlformats.org/officeDocument/2006/relationships" xmlns:p="http://schemas.openxmlformats.org/presentationml/2006/main">
+  <p:cSld>
+    <p:spTree>
+      <p:nvGrpSpPr>
+        <p:cNvPr id="1" name=""/>
+        <p:cNvGrpSpPr/>
+        <p:nvPr/>
+      </p:nvGrpSpPr>
+      <p:grpSpPr>
+        <a:xfrm>
+          <a:off x="0" y="0"/>
+          <a:ext cx="0" cy="0"/>
+          <a:chOff x="0" y="0"/>
+          <a:chExt cx="0" cy="0"/>
+        </a:xfrm>
+      </p:grpSpPr>
+      <p:sp>
+        <p:nvSpPr>
+          <p:cNvPr id="32769" name="Title 1">
+            <a:extLst>
+              <a:ext uri="{FF2B5EF4-FFF2-40B4-BE49-F238E27FC236}">
+                <a16:creationId xmlns:a16="http://schemas.microsoft.com/office/drawing/2014/main" id="{77B55FB8-3DB9-FC45-AAE0-190505D0FACD}"/>
+              </a:ext>
+            </a:extLst>
+          </p:cNvPr>
+          <p:cNvSpPr>
+            <a:spLocks noGrp="1" noChangeArrowheads="1"/>
+          </p:cNvSpPr>
+          <p:nvPr>
+            <p:ph type="title"/>
+          </p:nvPr>
+        </p:nvSpPr>
+        <p:spPr/>
+        <p:txBody>
+          <a:bodyPr/>
+          <a:lstStyle/>
+          <a:p>
+            <a:pPr eaLnBrk="1" hangingPunct="1">
+              <a:lnSpc>
+                <a:spcPct val="100000"/>
+              </a:lnSpc>
+            </a:pPr>
+            <a:r>
+              <a:rPr lang="en-US" altLang="en-US" dirty="0">
+                <a:solidFill>
+                  <a:srgbClr val="002060"/>
+                </a:solidFill>
+              </a:rPr>
+              <a:t>Outlook</a:t>
+            </a:r>
+          </a:p>
+        </p:txBody>
+      </p:sp>
+      <mc:AlternateContent xmlns:mc="http://schemas.openxmlformats.org/markup-compatibility/2006" xmlns:a14="http://schemas.microsoft.com/office/drawing/2010/main">
+        <mc:Choice Requires="a14">
+          <p:sp>
+            <p:nvSpPr>
+              <p:cNvPr id="32770" name="Content Placeholder 2">
+                <a:extLst>
+                  <a:ext uri="{FF2B5EF4-FFF2-40B4-BE49-F238E27FC236}">
+                    <a16:creationId xmlns:a16="http://schemas.microsoft.com/office/drawing/2014/main" id="{FAE87B20-C27B-164C-B21C-70E62B6DC4B4}"/>
+                  </a:ext>
+                </a:extLst>
+              </p:cNvPr>
+              <p:cNvSpPr>
+                <a:spLocks noGrp="1" noChangeArrowheads="1"/>
+              </p:cNvSpPr>
+              <p:nvPr>
+                <p:ph idx="1"/>
+              </p:nvPr>
+            </p:nvSpPr>
+            <p:spPr/>
+            <p:txBody>
+              <a:bodyPr/>
+              <a:lstStyle/>
+              <a:p>
+                <a:pPr eaLnBrk="1" hangingPunct="1">
+                  <a:lnSpc>
+                    <a:spcPct val="100000"/>
+                  </a:lnSpc>
+                </a:pPr>
+                <a:r>
+                  <a:rPr lang="en-US" altLang="en-US" sz="2600" dirty="0">
+                    <a:solidFill>
+                      <a:srgbClr val="C00000"/>
+                    </a:solidFill>
+                  </a:rPr>
+                  <a:t>Further test SRG-evolution of other operators (</a:t>
+                </a:r>
+                <a14:m>
+                  <m:oMath xmlns:m="http://schemas.openxmlformats.org/officeDocument/2006/math">
+                    <m:sSup>
+                      <m:sSupPr>
+                        <m:ctrlPr>
+                          <a:rPr lang="en-US" altLang="en-US" sz="2600" i="1" smtClean="0">
+                            <a:solidFill>
+                              <a:srgbClr val="C00000"/>
+                            </a:solidFill>
+                            <a:latin typeface="Cambria Math" panose="02040503050406030204" pitchFamily="18" charset="0"/>
+                          </a:rPr>
+                        </m:ctrlPr>
+                      </m:sSupPr>
+                      <m:e>
+                        <m:acc>
+                          <m:accPr>
+                            <m:chr m:val="̂"/>
+                            <m:ctrlPr>
+                              <a:rPr lang="en-US" altLang="en-US" sz="2600" i="1" smtClean="0">
+                                <a:solidFill>
+                                  <a:srgbClr val="C00000"/>
+                                </a:solidFill>
+                                <a:latin typeface="Cambria Math" panose="02040503050406030204" pitchFamily="18" charset="0"/>
+                              </a:rPr>
+                            </m:ctrlPr>
+                          </m:accPr>
+                          <m:e>
+                            <m:r>
+                              <a:rPr lang="en-US" altLang="en-US" sz="2600" b="0" i="1" smtClean="0">
+                                <a:solidFill>
+                                  <a:srgbClr val="C00000"/>
+                                </a:solidFill>
+                                <a:latin typeface="Cambria Math" panose="02040503050406030204" pitchFamily="18" charset="0"/>
+                              </a:rPr>
+                              <m:t>𝑟</m:t>
+                            </m:r>
+                          </m:e>
+                        </m:acc>
+                      </m:e>
+                      <m:sup>
+                        <m:r>
+                          <a:rPr lang="en-US" altLang="en-US" sz="2600" b="0" i="1" smtClean="0">
+                            <a:solidFill>
+                              <a:srgbClr val="C00000"/>
+                            </a:solidFill>
+                            <a:latin typeface="Cambria Math" panose="02040503050406030204" pitchFamily="18" charset="0"/>
+                          </a:rPr>
+                          <m:t>2</m:t>
+                        </m:r>
+                      </m:sup>
+                    </m:sSup>
+                  </m:oMath>
+                </a14:m>
+                <a:r>
+                  <a:rPr lang="en-US" altLang="en-US" sz="2600" dirty="0">
+                    <a:solidFill>
+                      <a:srgbClr val="C00000"/>
+                    </a:solidFill>
+                  </a:rPr>
+                  <a:t>, </a:t>
+                </a:r>
+                <a14:m>
+                  <m:oMath xmlns:m="http://schemas.openxmlformats.org/officeDocument/2006/math">
+                    <m:acc>
+                      <m:accPr>
+                        <m:chr m:val="̂"/>
+                        <m:ctrlPr>
+                          <a:rPr lang="en-US" altLang="en-US" sz="2600" i="1" smtClean="0">
+                            <a:solidFill>
+                              <a:srgbClr val="C00000"/>
+                            </a:solidFill>
+                            <a:latin typeface="Cambria Math" panose="02040503050406030204" pitchFamily="18" charset="0"/>
+                          </a:rPr>
+                        </m:ctrlPr>
+                      </m:accPr>
+                      <m:e>
+                        <m:r>
+                          <a:rPr lang="en-US" altLang="en-US" sz="2600" b="0" i="1" smtClean="0">
+                            <a:solidFill>
+                              <a:srgbClr val="C00000"/>
+                            </a:solidFill>
+                            <a:latin typeface="Cambria Math" panose="02040503050406030204" pitchFamily="18" charset="0"/>
+                          </a:rPr>
+                          <m:t>𝑄</m:t>
+                        </m:r>
+                      </m:e>
+                    </m:acc>
+                  </m:oMath>
+                </a14:m>
+                <a:r>
+                  <a:rPr lang="en-US" altLang="en-US" sz="2600" dirty="0">
+                    <a:solidFill>
+                      <a:srgbClr val="C00000"/>
+                    </a:solidFill>
+                  </a:rPr>
+                  <a:t>, etc.)</a:t>
+                </a:r>
+              </a:p>
+            </p:txBody>
+          </p:sp>
+        </mc:Choice>
+        <mc:Fallback xmlns="">
+          <p:sp>
+            <p:nvSpPr>
+              <p:cNvPr id="32770" name="Content Placeholder 2">
+                <a:extLst>
+                  <a:ext uri="{FF2B5EF4-FFF2-40B4-BE49-F238E27FC236}">
+                    <a16:creationId xmlns:a16="http://schemas.microsoft.com/office/drawing/2014/main" id="{FAE87B20-C27B-164C-B21C-70E62B6DC4B4}"/>
+                  </a:ext>
+                </a:extLst>
+              </p:cNvPr>
+              <p:cNvSpPr>
+                <a:spLocks noGrp="1" noRot="1" noChangeAspect="1" noMove="1" noResize="1" noEditPoints="1" noAdjustHandles="1" noChangeArrowheads="1" noChangeShapeType="1" noTextEdit="1"/>
+              </p:cNvSpPr>
+              <p:nvPr>
+                <p:ph idx="1"/>
+              </p:nvPr>
+            </p:nvSpPr>
+            <p:spPr>
+              <a:blipFill>
+                <a:blip r:embed="rId2"/>
+                <a:stretch>
+                  <a:fillRect l="-844" t="-1170"/>
+                </a:stretch>
+              </a:blipFill>
+            </p:spPr>
+            <p:txBody>
+              <a:bodyPr/>
+              <a:lstStyle/>
+              <a:p>
+                <a:r>
+                  <a:rPr lang="en-US">
+                    <a:noFill/>
+                  </a:rPr>
+                  <a:t> </a:t>
+                </a:r>
+              </a:p>
+            </p:txBody>
+          </p:sp>
+        </mc:Fallback>
+      </mc:AlternateContent>
+    </p:spTree>
+  </p:cSld>
+  <p:clrMapOvr>
+    <a:masterClrMapping/>
+  </p:clrMapOvr>
+</p:sld>
+</file>
+
 <file path=ppt/slides/slide23.xml><?xml version="1.0" encoding="utf-8"?>
 <p:sld xmlns:a="http://schemas.openxmlformats.org/drawingml/2006/main" xmlns:r="http://schemas.openxmlformats.org/officeDocument/2006/relationships" xmlns:p="http://schemas.openxmlformats.org/presentationml/2006/main">
   <p:cSld>
@@ -13536,7 +13702,7 @@
                 <a:r>
                   <a:rPr lang="en-US" altLang="en-US" sz="2600" dirty="0">
                     <a:solidFill>
-                      <a:srgbClr val="C00000"/>
+                      <a:schemeClr val="tx1"/>
                     </a:solidFill>
                   </a:rPr>
                   <a:t>Further test SRG-evolution of other operators (</a:t>
@@ -13548,7 +13714,7 @@
                         <m:ctrlPr>
                           <a:rPr lang="en-US" altLang="en-US" sz="2600" i="1" smtClean="0">
                             <a:solidFill>
-                              <a:srgbClr val="C00000"/>
+                              <a:schemeClr val="tx1"/>
                             </a:solidFill>
                             <a:latin typeface="Cambria Math" panose="02040503050406030204" pitchFamily="18" charset="0"/>
                           </a:rPr>
@@ -13561,7 +13727,7 @@
                             <m:ctrlPr>
                               <a:rPr lang="en-US" altLang="en-US" sz="2600" i="1" smtClean="0">
                                 <a:solidFill>
-                                  <a:srgbClr val="C00000"/>
+                                  <a:schemeClr val="tx1"/>
                                 </a:solidFill>
                                 <a:latin typeface="Cambria Math" panose="02040503050406030204" pitchFamily="18" charset="0"/>
                               </a:rPr>
@@ -13571,7 +13737,7 @@
                             <m:r>
                               <a:rPr lang="en-US" altLang="en-US" sz="2600" b="0" i="1" smtClean="0">
                                 <a:solidFill>
-                                  <a:srgbClr val="C00000"/>
+                                  <a:schemeClr val="tx1"/>
                                 </a:solidFill>
                                 <a:latin typeface="Cambria Math" panose="02040503050406030204" pitchFamily="18" charset="0"/>
                               </a:rPr>
@@ -13584,7 +13750,7 @@
                         <m:r>
                           <a:rPr lang="en-US" altLang="en-US" sz="2600" b="0" i="1" smtClean="0">
                             <a:solidFill>
-                              <a:srgbClr val="C00000"/>
+                              <a:schemeClr val="tx1"/>
                             </a:solidFill>
                             <a:latin typeface="Cambria Math" panose="02040503050406030204" pitchFamily="18" charset="0"/>
                           </a:rPr>
@@ -13597,7 +13763,7 @@
                 <a:r>
                   <a:rPr lang="en-US" altLang="en-US" sz="2600" dirty="0">
                     <a:solidFill>
-                      <a:srgbClr val="C00000"/>
+                      <a:schemeClr val="tx1"/>
                     </a:solidFill>
                   </a:rPr>
                   <a:t>, </a:t>
@@ -13610,7 +13776,7 @@
                         <m:ctrlPr>
                           <a:rPr lang="en-US" altLang="en-US" sz="2600" i="1" smtClean="0">
                             <a:solidFill>
-                              <a:srgbClr val="C00000"/>
+                              <a:schemeClr val="tx1"/>
                             </a:solidFill>
                             <a:latin typeface="Cambria Math" panose="02040503050406030204" pitchFamily="18" charset="0"/>
                           </a:rPr>
@@ -13620,7 +13786,7 @@
                         <m:r>
                           <a:rPr lang="en-US" altLang="en-US" sz="2600" b="0" i="1" smtClean="0">
                             <a:solidFill>
-                              <a:srgbClr val="C00000"/>
+                              <a:schemeClr val="tx1"/>
                             </a:solidFill>
                             <a:latin typeface="Cambria Math" panose="02040503050406030204" pitchFamily="18" charset="0"/>
                           </a:rPr>
@@ -13633,10 +13799,195 @@
                 <a:r>
                   <a:rPr lang="en-US" altLang="en-US" sz="2600" dirty="0">
                     <a:solidFill>
+                      <a:schemeClr val="tx1"/>
+                    </a:solidFill>
+                  </a:rPr>
+                  <a:t>, etc.)</a:t>
+                </a:r>
+              </a:p>
+              <a:p>
+                <a:pPr eaLnBrk="1" hangingPunct="1">
+                  <a:lnSpc>
+                    <a:spcPct val="100000"/>
+                  </a:lnSpc>
+                </a:pPr>
+                <a:r>
+                  <a:rPr lang="en-US" altLang="en-US" sz="2600" dirty="0">
+                    <a:solidFill>
                       <a:srgbClr val="C00000"/>
                     </a:solidFill>
                   </a:rPr>
-                  <a:t>, etc.)</a:t>
+                  <a:t>Recent interest in high cutoff potentials and spurious, deeply bound states</a:t>
+                </a:r>
+                <a:r>
+                  <a:rPr lang="en-US" altLang="en-US" sz="2600" baseline="30000" dirty="0">
+                    <a:solidFill>
+                      <a:srgbClr val="C00000"/>
+                    </a:solidFill>
+                  </a:rPr>
+                  <a:t>1</a:t>
+                </a:r>
+                <a:endParaRPr lang="en-US" altLang="en-US" sz="2600" dirty="0">
+                  <a:solidFill>
+                    <a:srgbClr val="C00000"/>
+                  </a:solidFill>
+                </a:endParaRPr>
+              </a:p>
+              <a:p>
+                <a:pPr lvl="1" eaLnBrk="1" hangingPunct="1">
+                  <a:lnSpc>
+                    <a:spcPct val="100000"/>
+                  </a:lnSpc>
+                </a:pPr>
+                <a:r>
+                  <a:rPr lang="en-US" altLang="en-US" sz="2200" dirty="0">
+                    <a:solidFill>
+                      <a:srgbClr val="C00000"/>
+                    </a:solidFill>
+                  </a:rPr>
+                  <a:t>Spurious bound states can affect decoupling and universality (choice in     </a:t>
+                </a:r>
+                <a14:m>
+                  <m:oMath xmlns:m="http://schemas.openxmlformats.org/officeDocument/2006/math">
+                    <m:r>
+                      <a:rPr lang="en-US" altLang="en-US" sz="2200" b="0" i="1" smtClean="0">
+                        <a:solidFill>
+                          <a:srgbClr val="C00000"/>
+                        </a:solidFill>
+                        <a:latin typeface="Cambria Math" panose="02040503050406030204" pitchFamily="18" charset="0"/>
+                      </a:rPr>
+                      <m:t>𝐺</m:t>
+                    </m:r>
+                    <m:r>
+                      <a:rPr lang="en-US" altLang="en-US" sz="2200" b="0" i="1" smtClean="0">
+                        <a:solidFill>
+                          <a:srgbClr val="C00000"/>
+                        </a:solidFill>
+                        <a:latin typeface="Cambria Math" panose="02040503050406030204" pitchFamily="18" charset="0"/>
+                        <a:ea typeface="Cambria Math" panose="02040503050406030204" pitchFamily="18" charset="0"/>
+                      </a:rPr>
+                      <m:t>=</m:t>
+                    </m:r>
+                    <m:sSub>
+                      <m:sSubPr>
+                        <m:ctrlPr>
+                          <a:rPr lang="en-US" altLang="en-US" sz="2200" b="0" i="1" smtClean="0">
+                            <a:solidFill>
+                              <a:srgbClr val="C00000"/>
+                            </a:solidFill>
+                            <a:latin typeface="Cambria Math" panose="02040503050406030204" pitchFamily="18" charset="0"/>
+                            <a:ea typeface="Cambria Math" panose="02040503050406030204" pitchFamily="18" charset="0"/>
+                          </a:rPr>
+                        </m:ctrlPr>
+                      </m:sSubPr>
+                      <m:e>
+                        <m:r>
+                          <a:rPr lang="en-US" altLang="en-US" sz="2200" b="0" i="1" smtClean="0">
+                            <a:solidFill>
+                              <a:srgbClr val="C00000"/>
+                            </a:solidFill>
+                            <a:latin typeface="Cambria Math" panose="02040503050406030204" pitchFamily="18" charset="0"/>
+                            <a:ea typeface="Cambria Math" panose="02040503050406030204" pitchFamily="18" charset="0"/>
+                          </a:rPr>
+                          <m:t>𝐻</m:t>
+                        </m:r>
+                      </m:e>
+                      <m:sub>
+                        <m:r>
+                          <a:rPr lang="en-US" altLang="en-US" sz="2200" b="0" i="1" smtClean="0">
+                            <a:solidFill>
+                              <a:srgbClr val="C00000"/>
+                            </a:solidFill>
+                            <a:latin typeface="Cambria Math" panose="02040503050406030204" pitchFamily="18" charset="0"/>
+                            <a:ea typeface="Cambria Math" panose="02040503050406030204" pitchFamily="18" charset="0"/>
+                          </a:rPr>
+                          <m:t>𝐷</m:t>
+                        </m:r>
+                      </m:sub>
+                    </m:sSub>
+                  </m:oMath>
+                </a14:m>
+                <a:r>
+                  <a:rPr lang="en-US" altLang="en-US" sz="2200" dirty="0">
+                    <a:solidFill>
+                      <a:srgbClr val="C00000"/>
+                    </a:solidFill>
+                  </a:rPr>
+                  <a:t> or </a:t>
+                </a:r>
+                <a14:m>
+                  <m:oMath xmlns:m="http://schemas.openxmlformats.org/officeDocument/2006/math">
+                    <m:sSub>
+                      <m:sSubPr>
+                        <m:ctrlPr>
+                          <a:rPr lang="en-US" altLang="en-US" sz="2200" i="1" smtClean="0">
+                            <a:solidFill>
+                              <a:srgbClr val="C00000"/>
+                            </a:solidFill>
+                            <a:latin typeface="Cambria Math" panose="02040503050406030204" pitchFamily="18" charset="0"/>
+                          </a:rPr>
+                        </m:ctrlPr>
+                      </m:sSubPr>
+                      <m:e>
+                        <m:r>
+                          <a:rPr lang="en-US" altLang="en-US" sz="2200" b="0" i="1" smtClean="0">
+                            <a:solidFill>
+                              <a:srgbClr val="C00000"/>
+                            </a:solidFill>
+                            <a:latin typeface="Cambria Math" panose="02040503050406030204" pitchFamily="18" charset="0"/>
+                          </a:rPr>
+                          <m:t>𝑇</m:t>
+                        </m:r>
+                      </m:e>
+                      <m:sub>
+                        <m:r>
+                          <a:rPr lang="en-US" altLang="en-US" sz="2200" b="0" i="1" smtClean="0">
+                            <a:solidFill>
+                              <a:srgbClr val="C00000"/>
+                            </a:solidFill>
+                            <a:latin typeface="Cambria Math" panose="02040503050406030204" pitchFamily="18" charset="0"/>
+                          </a:rPr>
+                          <m:t>𝑟𝑒𝑙</m:t>
+                        </m:r>
+                      </m:sub>
+                    </m:sSub>
+                  </m:oMath>
+                </a14:m>
+                <a:r>
+                  <a:rPr lang="en-US" altLang="en-US" sz="2200" dirty="0">
+                    <a:solidFill>
+                      <a:srgbClr val="C00000"/>
+                    </a:solidFill>
+                  </a:rPr>
+                  <a:t> is important)</a:t>
+                </a:r>
+                <a:r>
+                  <a:rPr lang="en-US" altLang="en-US" sz="2200" baseline="30000" dirty="0">
+                    <a:solidFill>
+                      <a:srgbClr val="C00000"/>
+                    </a:solidFill>
+                  </a:rPr>
+                  <a:t>2</a:t>
+                </a:r>
+                <a:endParaRPr lang="en-US" altLang="en-US" sz="2200" dirty="0">
+                  <a:solidFill>
+                    <a:srgbClr val="C00000"/>
+                  </a:solidFill>
+                </a:endParaRPr>
+              </a:p>
+              <a:p>
+                <a:pPr lvl="1" eaLnBrk="1" hangingPunct="1">
+                  <a:lnSpc>
+                    <a:spcPct val="100000"/>
+                  </a:lnSpc>
+                </a:pPr>
+                <a:r>
+                  <a:rPr lang="en-US" altLang="en-US" sz="2200" dirty="0">
+                    <a:solidFill>
+                      <a:srgbClr val="C00000"/>
+                    </a:solidFill>
+                  </a:rPr>
+                  <a:t>How do other operators change with these potentials?</a:t>
                 </a:r>
               </a:p>
             </p:txBody>
@@ -13682,7 +14033,86 @@
           </p:sp>
         </mc:Fallback>
       </mc:AlternateContent>
+      <p:sp>
+        <p:nvSpPr>
+          <p:cNvPr id="2" name="TextBox 1">
+            <a:extLst>
+              <a:ext uri="{FF2B5EF4-FFF2-40B4-BE49-F238E27FC236}">
+                <a16:creationId xmlns:a16="http://schemas.microsoft.com/office/drawing/2014/main" id="{04983B8F-2912-9240-AE63-C6B5A47ABAF1}"/>
+              </a:ext>
+            </a:extLst>
+          </p:cNvPr>
+          <p:cNvSpPr txBox="1"/>
+          <p:nvPr/>
+        </p:nvSpPr>
+        <p:spPr>
+          <a:xfrm>
+            <a:off x="2514924" y="6338986"/>
+            <a:ext cx="7162153" cy="523220"/>
+          </a:xfrm>
+          <a:prstGeom prst="rect">
+            <a:avLst/>
+          </a:prstGeom>
+          <a:noFill/>
+        </p:spPr>
+        <p:txBody>
+          <a:bodyPr wrap="none" rtlCol="0">
+            <a:spAutoFit/>
+          </a:bodyPr>
+          <a:lstStyle/>
+          <a:p>
+            <a:r>
+              <a:rPr lang="en-US" sz="1400" baseline="30000" dirty="0"/>
+              <a:t>1</a:t>
+            </a:r>
+            <a:r>
+              <a:rPr lang="en-US" sz="1400" dirty="0"/>
+              <a:t>I. </a:t>
+            </a:r>
+            <a:r>
+              <a:rPr lang="en-US" sz="1400" dirty="0" err="1"/>
+              <a:t>Tews</a:t>
+            </a:r>
+            <a:r>
+              <a:rPr lang="en-US" sz="1400" dirty="0"/>
+              <a:t> et al., Phys. Rev. C </a:t>
+            </a:r>
+            <a:r>
+              <a:rPr lang="en-US" sz="1400" b="1" dirty="0"/>
+              <a:t>98</a:t>
+            </a:r>
+            <a:r>
+              <a:rPr lang="en-US" sz="1400" dirty="0"/>
+              <a:t>, 024001 (2018), </a:t>
+            </a:r>
+            <a:r>
+              <a:rPr lang="en-US" sz="1400" baseline="30000" dirty="0"/>
+              <a:t>2</a:t>
+            </a:r>
+            <a:r>
+              <a:rPr lang="en-US" sz="1400" dirty="0"/>
+              <a:t>K.A. Wendt et al., Phys. Rev. C </a:t>
+            </a:r>
+            <a:r>
+              <a:rPr lang="en-US" sz="1400" b="1" dirty="0"/>
+              <a:t>83</a:t>
+            </a:r>
+            <a:r>
+              <a:rPr lang="en-US" sz="1400" dirty="0"/>
+              <a:t>, 034005 (2011) </a:t>
+            </a:r>
+          </a:p>
+          <a:p>
+            <a:endParaRPr lang="en-US" sz="1400" dirty="0"/>
+          </a:p>
+        </p:txBody>
+      </p:sp>
     </p:spTree>
+    <p:extLst>
+      <p:ext uri="{BB962C8B-B14F-4D97-AF65-F5344CB8AC3E}">
+        <p14:creationId xmlns:p14="http://schemas.microsoft.com/office/powerpoint/2010/main" val="3978763525"/>
+      </p:ext>
+    </p:extLst>
   </p:cSld>
   <p:clrMapOvr>
     <a:masterClrMapping/>
@@ -13834,11 +14264,7 @@
                   </m:oMath>
                 </a14:m>
                 <a:r>
-                  <a:rPr lang="en-US" altLang="en-US" sz="2600" dirty="0">
-                    <a:solidFill>
-                      <a:schemeClr val="tx1"/>
-                    </a:solidFill>
-                  </a:rPr>
+                  <a:rPr lang="en-US" altLang="en-US" sz="2600" dirty="0"/>
                   <a:t>, </a:t>
                 </a:r>
                 <a14:m>
@@ -13870,11 +14296,7 @@
                   </m:oMath>
                 </a14:m>
                 <a:r>
-                  <a:rPr lang="en-US" altLang="en-US" sz="2600" dirty="0">
-                    <a:solidFill>
-                      <a:schemeClr val="tx1"/>
-                    </a:solidFill>
-                  </a:rPr>
+                  <a:rPr lang="en-US" altLang="en-US" sz="2600" dirty="0"/>
                   <a:t>, etc.)</a:t>
                 </a:r>
               </a:p>
@@ -13885,13 +14307,14 @@
                   </a:lnSpc>
                 </a:pPr>
                 <a:r>
-                  <a:rPr lang="en-US" altLang="en-US" sz="2600" dirty="0">
-                    <a:solidFill>
-                      <a:srgbClr val="C00000"/>
-                    </a:solidFill>
-                  </a:rPr>
+                  <a:rPr lang="en-US" altLang="en-US" sz="2600" dirty="0"/>
                   <a:t>Recent interest in high cutoff potentials and spurious, deeply bound states</a:t>
                 </a:r>
+                <a:r>
+                  <a:rPr lang="en-US" altLang="en-US" sz="2600" baseline="30000" dirty="0"/>
+                  <a:t>1</a:t>
+                </a:r>
+                <a:endParaRPr lang="en-US" altLang="en-US" sz="2600" dirty="0"/>
               </a:p>
               <a:p>
                 <a:pPr lvl="1" eaLnBrk="1" hangingPunct="1">
@@ -13902,11 +14325,138 @@
                 <a:r>
                   <a:rPr lang="en-US" altLang="en-US" sz="2200" dirty="0">
                     <a:solidFill>
-                      <a:srgbClr val="C00000"/>
+                      <a:schemeClr val="tx1"/>
                     </a:solidFill>
                   </a:rPr>
-                  <a:t>Spurious bound states considerably change the conclusions on universality and decoupling</a:t>
-                </a:r>
+                  <a:t>Spurious bound states can affect decoupling and universality (choice in     </a:t>
+                </a:r>
+                <a14:m>
+                  <m:oMath xmlns:m="http://schemas.openxmlformats.org/officeDocument/2006/math">
+                    <m:r>
+                      <a:rPr lang="en-US" altLang="en-US" sz="2200" i="1">
+                        <a:solidFill>
+                          <a:schemeClr val="tx1"/>
+                        </a:solidFill>
+                        <a:latin typeface="Cambria Math" panose="02040503050406030204" pitchFamily="18" charset="0"/>
+                      </a:rPr>
+                      <m:t>𝐺</m:t>
+                    </m:r>
+                    <m:r>
+                      <a:rPr lang="en-US" altLang="en-US" sz="2200" i="1">
+                        <a:solidFill>
+                          <a:schemeClr val="tx1"/>
+                        </a:solidFill>
+                        <a:latin typeface="Cambria Math" panose="02040503050406030204" pitchFamily="18" charset="0"/>
+                        <a:ea typeface="Cambria Math" panose="02040503050406030204" pitchFamily="18" charset="0"/>
+                      </a:rPr>
+                      <m:t>=</m:t>
+                    </m:r>
+                    <m:sSub>
+                      <m:sSubPr>
+                        <m:ctrlPr>
+                          <a:rPr lang="en-US" altLang="en-US" sz="2200" i="1">
+                            <a:solidFill>
+                              <a:schemeClr val="tx1"/>
+                            </a:solidFill>
+                            <a:latin typeface="Cambria Math" panose="02040503050406030204" pitchFamily="18" charset="0"/>
+                            <a:ea typeface="Cambria Math" panose="02040503050406030204" pitchFamily="18" charset="0"/>
+                          </a:rPr>
+                        </m:ctrlPr>
+                      </m:sSubPr>
+                      <m:e>
+                        <m:r>
+                          <a:rPr lang="en-US" altLang="en-US" sz="2200" i="1">
+                            <a:solidFill>
+                              <a:schemeClr val="tx1"/>
+                            </a:solidFill>
+                            <a:latin typeface="Cambria Math" panose="02040503050406030204" pitchFamily="18" charset="0"/>
+                            <a:ea typeface="Cambria Math" panose="02040503050406030204" pitchFamily="18" charset="0"/>
+                          </a:rPr>
+                          <m:t>𝐻</m:t>
+                        </m:r>
+                      </m:e>
+                      <m:sub>
+                        <m:r>
+                          <a:rPr lang="en-US" altLang="en-US" sz="2200" i="1">
+                            <a:solidFill>
+                              <a:schemeClr val="tx1"/>
+                            </a:solidFill>
+                            <a:latin typeface="Cambria Math" panose="02040503050406030204" pitchFamily="18" charset="0"/>
+                            <a:ea typeface="Cambria Math" panose="02040503050406030204" pitchFamily="18" charset="0"/>
+                          </a:rPr>
+                          <m:t>𝐷</m:t>
+                        </m:r>
+                      </m:sub>
+                    </m:sSub>
+                  </m:oMath>
+                </a14:m>
+                <a:r>
+                  <a:rPr lang="en-US" altLang="en-US" sz="2200" dirty="0">
+                    <a:solidFill>
+                      <a:schemeClr val="tx1"/>
+                    </a:solidFill>
+                  </a:rPr>
+                  <a:t> or </a:t>
+                </a:r>
+                <a14:m>
+                  <m:oMath xmlns:m="http://schemas.openxmlformats.org/officeDocument/2006/math">
+                    <m:sSub>
+                      <m:sSubPr>
+                        <m:ctrlPr>
+                          <a:rPr lang="en-US" altLang="en-US" sz="2200" i="1">
+                            <a:solidFill>
+                              <a:schemeClr val="tx1"/>
+                            </a:solidFill>
+                            <a:latin typeface="Cambria Math" panose="02040503050406030204" pitchFamily="18" charset="0"/>
+                          </a:rPr>
+                        </m:ctrlPr>
+                      </m:sSubPr>
+                      <m:e>
+                        <m:r>
+                          <a:rPr lang="en-US" altLang="en-US" sz="2200" i="1">
+                            <a:solidFill>
+                              <a:schemeClr val="tx1"/>
+                            </a:solidFill>
+                            <a:latin typeface="Cambria Math" panose="02040503050406030204" pitchFamily="18" charset="0"/>
+                          </a:rPr>
+                          <m:t>𝑇</m:t>
+                        </m:r>
+                      </m:e>
+                      <m:sub>
+                        <m:r>
+                          <a:rPr lang="en-US" altLang="en-US" sz="2200" i="1">
+                            <a:solidFill>
+                              <a:schemeClr val="tx1"/>
+                            </a:solidFill>
+                            <a:latin typeface="Cambria Math" panose="02040503050406030204" pitchFamily="18" charset="0"/>
+                          </a:rPr>
+                          <m:t>𝑟𝑒𝑙</m:t>
+                        </m:r>
+                      </m:sub>
+                    </m:sSub>
+                  </m:oMath>
+                </a14:m>
+                <a:r>
+                  <a:rPr lang="en-US" altLang="en-US" sz="2200" dirty="0">
+                    <a:solidFill>
+                      <a:schemeClr val="tx1"/>
+                    </a:solidFill>
+                  </a:rPr>
+                  <a:t> is important)</a:t>
+                </a:r>
+                <a:r>
+                  <a:rPr lang="en-US" altLang="en-US" sz="2200" baseline="30000" dirty="0">
+                    <a:solidFill>
+                      <a:schemeClr val="tx1"/>
+                    </a:solidFill>
+                  </a:rPr>
+                  <a:t>2</a:t>
+                </a:r>
+                <a:endParaRPr lang="en-US" altLang="en-US" sz="2200" dirty="0">
+                  <a:solidFill>
+                    <a:schemeClr val="tx1"/>
+                  </a:solidFill>
+                </a:endParaRPr>
               </a:p>
               <a:p>
                 <a:pPr lvl="1" eaLnBrk="1" hangingPunct="1">
@@ -13915,248 +14465,8 @@
                   </a:lnSpc>
                 </a:pPr>
                 <a:r>
-                  <a:rPr lang="en-US" altLang="en-US" sz="2200" dirty="0">
-                    <a:solidFill>
-                      <a:srgbClr val="C00000"/>
-                    </a:solidFill>
-                  </a:rPr>
+                  <a:rPr lang="en-US" altLang="en-US" sz="2200" dirty="0"/>
                   <a:t>How do other operators change with these potentials?</a:t>
-                </a:r>
-              </a:p>
-            </p:txBody>
-          </p:sp>
-        </mc:Choice>
-        <mc:Fallback>
-          <p:sp>
-            <p:nvSpPr>
-              <p:cNvPr id="32770" name="Content Placeholder 2">
-                <a:extLst>
-                  <a:ext uri="{FF2B5EF4-FFF2-40B4-BE49-F238E27FC236}">
-                    <a16:creationId xmlns:a16="http://schemas.microsoft.com/office/drawing/2014/main" id="{FAE87B20-C27B-164C-B21C-70E62B6DC4B4}"/>
-                  </a:ext>
-                </a:extLst>
-              </p:cNvPr>
-              <p:cNvSpPr>
-                <a:spLocks noGrp="1" noRot="1" noChangeAspect="1" noMove="1" noResize="1" noEditPoints="1" noAdjustHandles="1" noChangeArrowheads="1" noChangeShapeType="1" noTextEdit="1"/>
-              </p:cNvSpPr>
-              <p:nvPr>
-                <p:ph idx="1"/>
-              </p:nvPr>
-            </p:nvSpPr>
-            <p:spPr>
-              <a:blipFill>
-                <a:blip r:embed="rId2"/>
-                <a:stretch>
-                  <a:fillRect l="-844" t="-1170"/>
-                </a:stretch>
-              </a:blipFill>
-            </p:spPr>
-            <p:txBody>
-              <a:bodyPr/>
-              <a:lstStyle/>
-              <a:p>
-                <a:r>
-                  <a:rPr lang="en-US">
-                    <a:noFill/>
-                  </a:rPr>
-                  <a:t> </a:t>
-                </a:r>
-              </a:p>
-            </p:txBody>
-          </p:sp>
-        </mc:Fallback>
-      </mc:AlternateContent>
-    </p:spTree>
-    <p:extLst>
-      <p:ext uri="{BB962C8B-B14F-4D97-AF65-F5344CB8AC3E}">
-        <p14:creationId xmlns:p14="http://schemas.microsoft.com/office/powerpoint/2010/main" val="3978763525"/>
-      </p:ext>
-    </p:extLst>
-  </p:cSld>
-  <p:clrMapOvr>
-    <a:masterClrMapping/>
-  </p:clrMapOvr>
-</p:sld>
-</file>
-
-<file path=ppt/slides/slide25.xml><?xml version="1.0" encoding="utf-8"?>
-<p:sld xmlns:a="http://schemas.openxmlformats.org/drawingml/2006/main" xmlns:r="http://schemas.openxmlformats.org/officeDocument/2006/relationships" xmlns:p="http://schemas.openxmlformats.org/presentationml/2006/main">
-  <p:cSld>
-    <p:spTree>
-      <p:nvGrpSpPr>
-        <p:cNvPr id="1" name=""/>
-        <p:cNvGrpSpPr/>
-        <p:nvPr/>
-      </p:nvGrpSpPr>
-      <p:grpSpPr>
-        <a:xfrm>
-          <a:off x="0" y="0"/>
-          <a:ext cx="0" cy="0"/>
-          <a:chOff x="0" y="0"/>
-          <a:chExt cx="0" cy="0"/>
-        </a:xfrm>
-      </p:grpSpPr>
-      <p:sp>
-        <p:nvSpPr>
-          <p:cNvPr id="32769" name="Title 1">
-            <a:extLst>
-              <a:ext uri="{FF2B5EF4-FFF2-40B4-BE49-F238E27FC236}">
-                <a16:creationId xmlns:a16="http://schemas.microsoft.com/office/drawing/2014/main" id="{77B55FB8-3DB9-FC45-AAE0-190505D0FACD}"/>
-              </a:ext>
-            </a:extLst>
-          </p:cNvPr>
-          <p:cNvSpPr>
-            <a:spLocks noGrp="1" noChangeArrowheads="1"/>
-          </p:cNvSpPr>
-          <p:nvPr>
-            <p:ph type="title"/>
-          </p:nvPr>
-        </p:nvSpPr>
-        <p:spPr/>
-        <p:txBody>
-          <a:bodyPr/>
-          <a:lstStyle/>
-          <a:p>
-            <a:pPr eaLnBrk="1" hangingPunct="1">
-              <a:lnSpc>
-                <a:spcPct val="100000"/>
-              </a:lnSpc>
-            </a:pPr>
-            <a:r>
-              <a:rPr lang="en-US" altLang="en-US" dirty="0">
-                <a:solidFill>
-                  <a:srgbClr val="002060"/>
-                </a:solidFill>
-              </a:rPr>
-              <a:t>Outlook</a:t>
-            </a:r>
-          </a:p>
-        </p:txBody>
-      </p:sp>
-      <mc:AlternateContent xmlns:mc="http://schemas.openxmlformats.org/markup-compatibility/2006">
-        <mc:Choice xmlns:a14="http://schemas.microsoft.com/office/drawing/2010/main" Requires="a14">
-          <p:sp>
-            <p:nvSpPr>
-              <p:cNvPr id="32770" name="Content Placeholder 2">
-                <a:extLst>
-                  <a:ext uri="{FF2B5EF4-FFF2-40B4-BE49-F238E27FC236}">
-                    <a16:creationId xmlns:a16="http://schemas.microsoft.com/office/drawing/2014/main" id="{FAE87B20-C27B-164C-B21C-70E62B6DC4B4}"/>
-                  </a:ext>
-                </a:extLst>
-              </p:cNvPr>
-              <p:cNvSpPr>
-                <a:spLocks noGrp="1" noChangeArrowheads="1"/>
-              </p:cNvSpPr>
-              <p:nvPr>
-                <p:ph idx="1"/>
-              </p:nvPr>
-            </p:nvSpPr>
-            <p:spPr/>
-            <p:txBody>
-              <a:bodyPr/>
-              <a:lstStyle/>
-              <a:p>
-                <a:pPr eaLnBrk="1" hangingPunct="1">
-                  <a:lnSpc>
-                    <a:spcPct val="100000"/>
-                  </a:lnSpc>
-                </a:pPr>
-                <a:r>
-                  <a:rPr lang="en-US" altLang="en-US" sz="2600" dirty="0">
-                    <a:solidFill>
-                      <a:schemeClr val="tx1"/>
-                    </a:solidFill>
-                  </a:rPr>
-                  <a:t>Further test SRG-evolution of other operators (</a:t>
-                </a:r>
-                <a14:m>
-                  <m:oMath xmlns:m="http://schemas.openxmlformats.org/officeDocument/2006/math">
-                    <m:sSup>
-                      <m:sSupPr>
-                        <m:ctrlPr>
-                          <a:rPr lang="en-US" altLang="en-US" sz="2600" i="1" smtClean="0">
-                            <a:solidFill>
-                              <a:schemeClr val="tx1"/>
-                            </a:solidFill>
-                            <a:latin typeface="Cambria Math" panose="02040503050406030204" pitchFamily="18" charset="0"/>
-                          </a:rPr>
-                        </m:ctrlPr>
-                      </m:sSupPr>
-                      <m:e>
-                        <m:acc>
-                          <m:accPr>
-                            <m:chr m:val="̂"/>
-                            <m:ctrlPr>
-                              <a:rPr lang="en-US" altLang="en-US" sz="2600" i="1" smtClean="0">
-                                <a:solidFill>
-                                  <a:schemeClr val="tx1"/>
-                                </a:solidFill>
-                                <a:latin typeface="Cambria Math" panose="02040503050406030204" pitchFamily="18" charset="0"/>
-                              </a:rPr>
-                            </m:ctrlPr>
-                          </m:accPr>
-                          <m:e>
-                            <m:r>
-                              <a:rPr lang="en-US" altLang="en-US" sz="2600" b="0" i="1" smtClean="0">
-                                <a:solidFill>
-                                  <a:schemeClr val="tx1"/>
-                                </a:solidFill>
-                                <a:latin typeface="Cambria Math" panose="02040503050406030204" pitchFamily="18" charset="0"/>
-                              </a:rPr>
-                              <m:t>𝑟</m:t>
-                            </m:r>
-                          </m:e>
-                        </m:acc>
-                      </m:e>
-                      <m:sup>
-                        <m:r>
-                          <a:rPr lang="en-US" altLang="en-US" sz="2600" b="0" i="1" smtClean="0">
-                            <a:solidFill>
-                              <a:schemeClr val="tx1"/>
-                            </a:solidFill>
-                            <a:latin typeface="Cambria Math" panose="02040503050406030204" pitchFamily="18" charset="0"/>
-                          </a:rPr>
-                          <m:t>2</m:t>
-                        </m:r>
-                      </m:sup>
-                    </m:sSup>
-                  </m:oMath>
-                </a14:m>
-                <a:r>
-                  <a:rPr lang="en-US" altLang="en-US" sz="2600" dirty="0"/>
-                  <a:t>, </a:t>
-                </a:r>
-                <a14:m>
-                  <m:oMath xmlns:m="http://schemas.openxmlformats.org/officeDocument/2006/math">
-                    <m:acc>
-                      <m:accPr>
-                        <m:chr m:val="̂"/>
-                        <m:ctrlPr>
-                          <a:rPr lang="en-US" altLang="en-US" sz="2600" i="1" smtClean="0">
-                            <a:solidFill>
-                              <a:schemeClr val="tx1"/>
-                            </a:solidFill>
-                            <a:latin typeface="Cambria Math" panose="02040503050406030204" pitchFamily="18" charset="0"/>
-                          </a:rPr>
-                        </m:ctrlPr>
-                      </m:accPr>
-                      <m:e>
-                        <m:r>
-                          <a:rPr lang="en-US" altLang="en-US" sz="2600" b="0" i="1" smtClean="0">
-                            <a:solidFill>
-                              <a:schemeClr val="tx1"/>
-                            </a:solidFill>
-                            <a:latin typeface="Cambria Math" panose="02040503050406030204" pitchFamily="18" charset="0"/>
-                          </a:rPr>
-                          <m:t>𝑄</m:t>
-                        </m:r>
-                      </m:e>
-                    </m:acc>
-                  </m:oMath>
-                </a14:m>
-                <a:r>
-                  <a:rPr lang="en-US" altLang="en-US" sz="2600" dirty="0"/>
-                  <a:t>, etc.)</a:t>
                 </a:r>
               </a:p>
               <a:p>
@@ -14166,9 +14476,26 @@
                   </a:lnSpc>
                 </a:pPr>
                 <a:r>
-                  <a:rPr lang="en-US" altLang="en-US" sz="2600" dirty="0"/>
-                  <a:t>Recent interest in high cutoff potentials and spurious, deeply bound states</a:t>
-                </a:r>
+                  <a:rPr lang="en-US" altLang="en-US" sz="2600" dirty="0">
+                    <a:solidFill>
+                      <a:srgbClr val="C00000"/>
+                    </a:solidFill>
+                  </a:rPr>
+                  <a:t>The Magnus expansion provides an improved approach to the SRG</a:t>
+                </a:r>
+                <a:r>
+                  <a:rPr lang="en-US" altLang="en-US" sz="2600" baseline="30000" dirty="0">
+                    <a:solidFill>
+                      <a:srgbClr val="C00000"/>
+                    </a:solidFill>
+                  </a:rPr>
+                  <a:t>3</a:t>
+                </a:r>
+                <a:endParaRPr lang="en-US" altLang="en-US" sz="2600" dirty="0">
+                  <a:solidFill>
+                    <a:srgbClr val="C00000"/>
+                  </a:solidFill>
+                </a:endParaRPr>
               </a:p>
               <a:p>
                 <a:pPr lvl="1" eaLnBrk="1" hangingPunct="1">
@@ -14177,49 +14504,28 @@
                   </a:lnSpc>
                 </a:pPr>
                 <a:r>
-                  <a:rPr lang="en-US" altLang="en-US" sz="2200" dirty="0"/>
-                  <a:t>Spurious bound states considerably change the conclusions on universality and decoupling</a:t>
-                </a:r>
-              </a:p>
-              <a:p>
-                <a:pPr lvl="1" eaLnBrk="1" hangingPunct="1">
-                  <a:lnSpc>
-                    <a:spcPct val="100000"/>
-                  </a:lnSpc>
-                </a:pPr>
-                <a:r>
-                  <a:rPr lang="en-US" altLang="en-US" sz="2200" dirty="0"/>
-                  <a:t>How do other operators change with these potentials?</a:t>
-                </a:r>
-              </a:p>
-              <a:p>
-                <a:pPr eaLnBrk="1" hangingPunct="1">
-                  <a:lnSpc>
-                    <a:spcPct val="100000"/>
-                  </a:lnSpc>
-                </a:pPr>
-                <a:r>
-                  <a:rPr lang="en-US" altLang="en-US" sz="2600" dirty="0">
-                    <a:solidFill>
-                      <a:srgbClr val="C00000"/>
-                    </a:solidFill>
-                  </a:rPr>
-                  <a:t>The Magnus expansion provides an improved approach to the SRG</a:t>
-                </a:r>
-              </a:p>
-              <a:p>
-                <a:pPr lvl="1" eaLnBrk="1" hangingPunct="1">
-                  <a:lnSpc>
-                    <a:spcPct val="100000"/>
-                  </a:lnSpc>
-                </a:pPr>
-                <a:r>
                   <a:rPr lang="en-US" altLang="en-US" sz="2200" dirty="0">
                     <a:solidFill>
                       <a:srgbClr val="C00000"/>
                     </a:solidFill>
                   </a:rPr>
-                  <a:t>Do the same characteristics of operator evolution, universality, generator and dependence hold in this approach?</a:t>
+                  <a:t>Do the same characteristics of operator evolution, universality, and </a:t>
+                </a:r>
+                <a:r>
+                  <a:rPr lang="en-US" altLang="en-US" sz="2200">
+                    <a:solidFill>
+                      <a:srgbClr val="C00000"/>
+                    </a:solidFill>
+                  </a:rPr>
+                  <a:t>generator dependence </a:t>
+                </a:r>
+                <a:r>
+                  <a:rPr lang="en-US" altLang="en-US" sz="2200" dirty="0">
+                    <a:solidFill>
+                      <a:srgbClr val="C00000"/>
+                    </a:solidFill>
+                  </a:rPr>
+                  <a:t>hold in this approach?</a:t>
                 </a:r>
               </a:p>
               <a:p>
@@ -14280,12 +14586,224 @@
           </p:sp>
         </mc:Fallback>
       </mc:AlternateContent>
+      <p:sp>
+        <p:nvSpPr>
+          <p:cNvPr id="4" name="TextBox 3">
+            <a:extLst>
+              <a:ext uri="{FF2B5EF4-FFF2-40B4-BE49-F238E27FC236}">
+                <a16:creationId xmlns:a16="http://schemas.microsoft.com/office/drawing/2014/main" id="{D0275396-9B73-CD4A-9960-5F3E92AE1A23}"/>
+              </a:ext>
+            </a:extLst>
+          </p:cNvPr>
+          <p:cNvSpPr txBox="1"/>
+          <p:nvPr/>
+        </p:nvSpPr>
+        <p:spPr>
+          <a:xfrm>
+            <a:off x="734148" y="6338986"/>
+            <a:ext cx="10723705" cy="523220"/>
+          </a:xfrm>
+          <a:prstGeom prst="rect">
+            <a:avLst/>
+          </a:prstGeom>
+          <a:noFill/>
+        </p:spPr>
+        <p:txBody>
+          <a:bodyPr wrap="none" rtlCol="0">
+            <a:spAutoFit/>
+          </a:bodyPr>
+          <a:lstStyle/>
+          <a:p>
+            <a:r>
+              <a:rPr lang="en-US" sz="1400" baseline="30000" dirty="0"/>
+              <a:t>1</a:t>
+            </a:r>
+            <a:r>
+              <a:rPr lang="en-US" sz="1400" dirty="0"/>
+              <a:t>I. </a:t>
+            </a:r>
+            <a:r>
+              <a:rPr lang="en-US" sz="1400" dirty="0" err="1"/>
+              <a:t>Tews</a:t>
+            </a:r>
+            <a:r>
+              <a:rPr lang="en-US" sz="1400" dirty="0"/>
+              <a:t> et al., Phys. Rev. C </a:t>
+            </a:r>
+            <a:r>
+              <a:rPr lang="en-US" sz="1400" b="1" dirty="0"/>
+              <a:t>98</a:t>
+            </a:r>
+            <a:r>
+              <a:rPr lang="en-US" sz="1400" dirty="0"/>
+              <a:t>, 024001 (2018), </a:t>
+            </a:r>
+            <a:r>
+              <a:rPr lang="en-US" sz="1400" baseline="30000" dirty="0"/>
+              <a:t>2</a:t>
+            </a:r>
+            <a:r>
+              <a:rPr lang="en-US" sz="1400" dirty="0"/>
+              <a:t>K.A. Wendt et al., Phys. Rev. C </a:t>
+            </a:r>
+            <a:r>
+              <a:rPr lang="en-US" sz="1400" b="1" dirty="0"/>
+              <a:t>83</a:t>
+            </a:r>
+            <a:r>
+              <a:rPr lang="en-US" sz="1400" dirty="0"/>
+              <a:t>, 034005 (2011), </a:t>
+            </a:r>
+            <a:r>
+              <a:rPr lang="en-US" sz="1400" baseline="30000" dirty="0"/>
+              <a:t>3</a:t>
+            </a:r>
+            <a:r>
+              <a:rPr lang="en-US" sz="1400" dirty="0"/>
+              <a:t>T.D. Morris et al., Phys. Rev. C </a:t>
+            </a:r>
+            <a:r>
+              <a:rPr lang="en-US" sz="1400" b="1" dirty="0"/>
+              <a:t>92</a:t>
+            </a:r>
+            <a:r>
+              <a:rPr lang="en-US" sz="1400" dirty="0"/>
+              <a:t>, 034331 (2015) </a:t>
+            </a:r>
+          </a:p>
+          <a:p>
+            <a:endParaRPr lang="en-US" sz="1400" dirty="0"/>
+          </a:p>
+        </p:txBody>
+      </p:sp>
     </p:spTree>
     <p:extLst>
       <p:ext uri="{BB962C8B-B14F-4D97-AF65-F5344CB8AC3E}">
         <p14:creationId xmlns:p14="http://schemas.microsoft.com/office/powerpoint/2010/main" val="296083682"/>
       </p:ext>
     </p:extLst>
+  </p:cSld>
+  <p:clrMapOvr>
+    <a:masterClrMapping/>
+  </p:clrMapOvr>
+</p:sld>
+</file>
+
+<file path=ppt/slides/slide25.xml><?xml version="1.0" encoding="utf-8"?>
+<p:sld xmlns:a="http://schemas.openxmlformats.org/drawingml/2006/main" xmlns:r="http://schemas.openxmlformats.org/officeDocument/2006/relationships" xmlns:p="http://schemas.openxmlformats.org/presentationml/2006/main">
+  <p:cSld>
+    <p:spTree>
+      <p:nvGrpSpPr>
+        <p:cNvPr id="1" name=""/>
+        <p:cNvGrpSpPr/>
+        <p:nvPr/>
+      </p:nvGrpSpPr>
+      <p:grpSpPr>
+        <a:xfrm>
+          <a:off x="0" y="0"/>
+          <a:ext cx="0" cy="0"/>
+          <a:chOff x="0" y="0"/>
+          <a:chExt cx="0" cy="0"/>
+        </a:xfrm>
+      </p:grpSpPr>
+      <p:sp>
+        <p:nvSpPr>
+          <p:cNvPr id="30721" name="Title 1">
+            <a:extLst>
+              <a:ext uri="{FF2B5EF4-FFF2-40B4-BE49-F238E27FC236}">
+                <a16:creationId xmlns:a16="http://schemas.microsoft.com/office/drawing/2014/main" id="{075253A1-56FB-1248-87F2-E39A89F9DE31}"/>
+              </a:ext>
+            </a:extLst>
+          </p:cNvPr>
+          <p:cNvSpPr>
+            <a:spLocks noGrp="1" noChangeArrowheads="1"/>
+          </p:cNvSpPr>
+          <p:nvPr>
+            <p:ph type="title"/>
+          </p:nvPr>
+        </p:nvSpPr>
+        <p:spPr/>
+        <p:txBody>
+          <a:bodyPr/>
+          <a:lstStyle/>
+          <a:p>
+            <a:pPr eaLnBrk="1" hangingPunct="1">
+              <a:lnSpc>
+                <a:spcPct val="100000"/>
+              </a:lnSpc>
+            </a:pPr>
+            <a:r>
+              <a:rPr lang="en-US" altLang="en-US" dirty="0">
+                <a:solidFill>
+                  <a:srgbClr val="002060"/>
+                </a:solidFill>
+              </a:rPr>
+              <a:t>Extras</a:t>
+            </a:r>
+          </a:p>
+        </p:txBody>
+      </p:sp>
+      <p:pic>
+        <p:nvPicPr>
+          <p:cNvPr id="30723" name="Picture 3">
+            <a:extLst>
+              <a:ext uri="{FF2B5EF4-FFF2-40B4-BE49-F238E27FC236}">
+                <a16:creationId xmlns:a16="http://schemas.microsoft.com/office/drawing/2014/main" id="{C74867CB-7D59-0C45-A8ED-C11309581F65}"/>
+              </a:ext>
+            </a:extLst>
+          </p:cNvPr>
+          <p:cNvPicPr>
+            <a:picLocks noChangeAspect="1" noChangeArrowheads="1"/>
+          </p:cNvPicPr>
+          <p:nvPr/>
+        </p:nvPicPr>
+        <p:blipFill>
+          <a:blip r:embed="rId2">
+            <a:extLst>
+              <a:ext uri="{28A0092B-C50C-407E-A947-70E740481C1C}">
+                <a14:useLocalDpi xmlns:a14="http://schemas.microsoft.com/office/drawing/2010/main" val="0"/>
+              </a:ext>
+            </a:extLst>
+          </a:blip>
+          <a:srcRect/>
+          <a:stretch>
+            <a:fillRect/>
+          </a:stretch>
+        </p:blipFill>
+        <p:spPr bwMode="auto">
+          <a:xfrm>
+            <a:off x="1166068" y="2122718"/>
+            <a:ext cx="9859863" cy="3657600"/>
+          </a:xfrm>
+          <a:prstGeom prst="rect">
+            <a:avLst/>
+          </a:prstGeom>
+          <a:noFill/>
+          <a:ln>
+            <a:noFill/>
+          </a:ln>
+          <a:extLst>
+            <a:ext uri="{909E8E84-426E-40DD-AFC4-6F175D3DCCD1}">
+              <a14:hiddenFill xmlns:a14="http://schemas.microsoft.com/office/drawing/2010/main">
+                <a:solidFill>
+                  <a:srgbClr val="FFFFFF"/>
+                </a:solidFill>
+              </a14:hiddenFill>
+            </a:ext>
+            <a:ext uri="{91240B29-F687-4F45-9708-019B960494DF}">
+              <a14:hiddenLine xmlns:a14="http://schemas.microsoft.com/office/drawing/2010/main" w="9525">
+                <a:solidFill>
+                  <a:srgbClr val="000000"/>
+                </a:solidFill>
+                <a:miter lim="800000"/>
+                <a:headEnd/>
+                <a:tailEnd/>
+              </a14:hiddenLine>
+            </a:ext>
+          </a:extLst>
+        </p:spPr>
+      </p:pic>
+    </p:spTree>
   </p:cSld>
   <p:clrMapOvr>
     <a:masterClrMapping/>
@@ -14347,8 +14865,8 @@
           </a:p>
         </p:txBody>
       </p:sp>
-      <mc:AlternateContent xmlns:mc="http://schemas.openxmlformats.org/markup-compatibility/2006">
-        <mc:Choice xmlns:a14="http://schemas.microsoft.com/office/drawing/2010/main" Requires="a14">
+      <mc:AlternateContent xmlns:mc="http://schemas.openxmlformats.org/markup-compatibility/2006" xmlns:a14="http://schemas.microsoft.com/office/drawing/2010/main">
+        <mc:Choice Requires="a14">
           <p:sp>
             <p:nvSpPr>
               <p:cNvPr id="17410" name="Content Placeholder 2">
@@ -15011,7 +15529,7 @@
             </p:txBody>
           </p:sp>
         </mc:Choice>
-        <mc:Fallback>
+        <mc:Fallback xmlns="">
           <p:sp>
             <p:nvSpPr>
               <p:cNvPr id="17410" name="Content Placeholder 2">
@@ -15113,8 +15631,8 @@
           </a:p>
         </p:txBody>
       </p:sp>
-      <mc:AlternateContent xmlns:mc="http://schemas.openxmlformats.org/markup-compatibility/2006">
-        <mc:Choice xmlns:a14="http://schemas.microsoft.com/office/drawing/2010/main" Requires="a14">
+      <mc:AlternateContent xmlns:mc="http://schemas.openxmlformats.org/markup-compatibility/2006" xmlns:a14="http://schemas.microsoft.com/office/drawing/2010/main">
+        <mc:Choice Requires="a14">
           <p:sp>
             <p:nvSpPr>
               <p:cNvPr id="18434" name="Content Placeholder 2">
@@ -15340,7 +15858,7 @@
             </p:txBody>
           </p:sp>
         </mc:Choice>
-        <mc:Fallback>
+        <mc:Fallback xmlns="">
           <p:sp>
             <p:nvSpPr>
               <p:cNvPr id="18434" name="Content Placeholder 2">
@@ -15386,132 +15904,72 @@
       </mc:AlternateContent>
       <p:pic>
         <p:nvPicPr>
-          <p:cNvPr id="18435" name="Picture 3">
+          <p:cNvPr id="4" name="Picture 3">
             <a:extLst>
               <a:ext uri="{FF2B5EF4-FFF2-40B4-BE49-F238E27FC236}">
-                <a16:creationId xmlns:a16="http://schemas.microsoft.com/office/drawing/2014/main" id="{F3EF34EE-F95F-C94B-8A13-08A5338FE7D5}"/>
+                <a16:creationId xmlns:a16="http://schemas.microsoft.com/office/drawing/2014/main" id="{298F31AC-2157-B44F-A54D-2A6CA439EF0F}"/>
               </a:ext>
             </a:extLst>
           </p:cNvPr>
           <p:cNvPicPr>
-            <a:picLocks noChangeAspect="1" noChangeArrowheads="1"/>
+            <a:picLocks noChangeAspect="1"/>
           </p:cNvPicPr>
           <p:nvPr/>
         </p:nvPicPr>
         <p:blipFill>
-          <a:blip r:embed="rId3">
-            <a:extLst>
-              <a:ext uri="{28A0092B-C50C-407E-A947-70E740481C1C}">
-                <a14:useLocalDpi xmlns:a14="http://schemas.microsoft.com/office/drawing/2010/main" val="0"/>
-              </a:ext>
-            </a:extLst>
-          </a:blip>
-          <a:srcRect/>
+          <a:blip r:embed="rId3"/>
           <a:stretch>
             <a:fillRect/>
           </a:stretch>
         </p:blipFill>
-        <p:spPr bwMode="auto">
+        <p:spPr>
           <a:xfrm>
-            <a:off x="3243741" y="1667975"/>
-            <a:ext cx="8948259" cy="2286000"/>
+            <a:off x="3241432" y="1690688"/>
+            <a:ext cx="8950568" cy="2286000"/>
           </a:xfrm>
           <a:prstGeom prst="rect">
             <a:avLst/>
           </a:prstGeom>
-          <a:noFill/>
-          <a:ln>
-            <a:noFill/>
-          </a:ln>
-          <a:extLst>
-            <a:ext uri="{909E8E84-426E-40DD-AFC4-6F175D3DCCD1}">
-              <a14:hiddenFill xmlns:a14="http://schemas.microsoft.com/office/drawing/2010/main">
-                <a:solidFill>
-                  <a:srgbClr val="FFFFFF"/>
-                </a:solidFill>
-              </a14:hiddenFill>
-            </a:ext>
-            <a:ext uri="{91240B29-F687-4F45-9708-019B960494DF}">
-              <a14:hiddenLine xmlns:a14="http://schemas.microsoft.com/office/drawing/2010/main" w="9525">
-                <a:solidFill>
-                  <a:srgbClr val="000000"/>
-                </a:solidFill>
-                <a:miter lim="800000"/>
-                <a:headEnd/>
-                <a:tailEnd/>
-              </a14:hiddenLine>
-            </a:ext>
-          </a:extLst>
         </p:spPr>
       </p:pic>
       <p:pic>
         <p:nvPicPr>
-          <p:cNvPr id="18436" name="Picture 4">
+          <p:cNvPr id="6" name="Picture 5">
             <a:extLst>
               <a:ext uri="{FF2B5EF4-FFF2-40B4-BE49-F238E27FC236}">
-                <a16:creationId xmlns:a16="http://schemas.microsoft.com/office/drawing/2014/main" id="{0C5B1EB8-7A6E-4B48-9FBC-40AA2B2AE1F8}"/>
+                <a16:creationId xmlns:a16="http://schemas.microsoft.com/office/drawing/2014/main" id="{6FB6FDC8-E476-6B4A-B4BA-BD66EC92C5FA}"/>
               </a:ext>
             </a:extLst>
           </p:cNvPr>
           <p:cNvPicPr>
-            <a:picLocks noChangeAspect="1" noChangeArrowheads="1"/>
+            <a:picLocks noChangeAspect="1"/>
           </p:cNvPicPr>
           <p:nvPr/>
         </p:nvPicPr>
         <p:blipFill>
-          <a:blip r:embed="rId4">
-            <a:extLst>
-              <a:ext uri="{28A0092B-C50C-407E-A947-70E740481C1C}">
-                <a14:useLocalDpi xmlns:a14="http://schemas.microsoft.com/office/drawing/2010/main" val="0"/>
-              </a:ext>
-            </a:extLst>
-          </a:blip>
-          <a:srcRect/>
+          <a:blip r:embed="rId4"/>
           <a:stretch>
             <a:fillRect/>
           </a:stretch>
         </p:blipFill>
-        <p:spPr bwMode="auto">
+        <p:spPr>
           <a:xfrm>
-            <a:off x="3239183" y="4006916"/>
-            <a:ext cx="8952816" cy="2286000"/>
+            <a:off x="3265585" y="4001294"/>
+            <a:ext cx="8950568" cy="2286000"/>
           </a:xfrm>
           <a:prstGeom prst="rect">
             <a:avLst/>
           </a:prstGeom>
-          <a:noFill/>
-          <a:ln>
-            <a:noFill/>
-          </a:ln>
-          <a:extLst>
-            <a:ext uri="{909E8E84-426E-40DD-AFC4-6F175D3DCCD1}">
-              <a14:hiddenFill xmlns:a14="http://schemas.microsoft.com/office/drawing/2010/main">
-                <a:solidFill>
-                  <a:srgbClr val="FFFFFF"/>
-                </a:solidFill>
-              </a14:hiddenFill>
-            </a:ext>
-            <a:ext uri="{91240B29-F687-4F45-9708-019B960494DF}">
-              <a14:hiddenLine xmlns:a14="http://schemas.microsoft.com/office/drawing/2010/main" w="9525">
-                <a:solidFill>
-                  <a:srgbClr val="000000"/>
-                </a:solidFill>
-                <a:miter lim="800000"/>
-                <a:headEnd/>
-                <a:tailEnd/>
-              </a14:hiddenLine>
-            </a:ext>
-          </a:extLst>
         </p:spPr>
       </p:pic>
       <mc:AlternateContent xmlns:mc="http://schemas.openxmlformats.org/markup-compatibility/2006">
         <mc:Choice xmlns:a14="http://schemas.microsoft.com/office/drawing/2010/main" Requires="a14">
           <p:sp>
             <p:nvSpPr>
-              <p:cNvPr id="3" name="TextBox 2">
+              <p:cNvPr id="11" name="TextBox 10">
                 <a:extLst>
                   <a:ext uri="{FF2B5EF4-FFF2-40B4-BE49-F238E27FC236}">
-                    <a16:creationId xmlns:a16="http://schemas.microsoft.com/office/drawing/2014/main" id="{5176E28F-4337-CC4F-9747-BFCFB632EA1E}"/>
+                    <a16:creationId xmlns:a16="http://schemas.microsoft.com/office/drawing/2014/main" id="{5AF15FF7-1B55-0B48-A37C-D6D892389F82}"/>
                   </a:ext>
                 </a:extLst>
               </p:cNvPr>
@@ -15520,8 +15978,8 @@
             </p:nvSpPr>
             <p:spPr>
               <a:xfrm>
-                <a:off x="3384331" y="6208836"/>
-                <a:ext cx="8713076" cy="830997"/>
+                <a:off x="3146839" y="6208836"/>
+                <a:ext cx="8950568" cy="830997"/>
               </a:xfrm>
               <a:prstGeom prst="rect">
                 <a:avLst/>
@@ -15664,7 +16122,35 @@
                     <a:latin typeface="Arial" panose="020B0604020202020204" pitchFamily="34" charset="0"/>
                     <a:cs typeface="Arial" panose="020B0604020202020204" pitchFamily="34" charset="0"/>
                   </a:rPr>
-                  <a:t>. Potentials from P. Reinert et al., Eur. Phys. J. A </a:t>
+                  <a:t> in the </a:t>
+                </a:r>
+                <a:r>
+                  <a:rPr lang="en-US" sz="1600" baseline="30000" dirty="0">
+                    <a:latin typeface="Arial" panose="020B0604020202020204" pitchFamily="34" charset="0"/>
+                    <a:cs typeface="Arial" panose="020B0604020202020204" pitchFamily="34" charset="0"/>
+                  </a:rPr>
+                  <a:t>1</a:t>
+                </a:r>
+                <a:r>
+                  <a:rPr lang="en-US" sz="1600" dirty="0">
+                    <a:latin typeface="Arial" panose="020B0604020202020204" pitchFamily="34" charset="0"/>
+                    <a:cs typeface="Arial" panose="020B0604020202020204" pitchFamily="34" charset="0"/>
+                  </a:rPr>
+                  <a:t>P</a:t>
+                </a:r>
+                <a:r>
+                  <a:rPr lang="en-US" sz="1600" baseline="-25000" dirty="0">
+                    <a:latin typeface="Arial" panose="020B0604020202020204" pitchFamily="34" charset="0"/>
+                    <a:cs typeface="Arial" panose="020B0604020202020204" pitchFamily="34" charset="0"/>
+                  </a:rPr>
+                  <a:t>1</a:t>
+                </a:r>
+                <a:r>
+                  <a:rPr lang="en-US" sz="1600" dirty="0">
+                    <a:latin typeface="Arial" panose="020B0604020202020204" pitchFamily="34" charset="0"/>
+                    <a:cs typeface="Arial" panose="020B0604020202020204" pitchFamily="34" charset="0"/>
+                  </a:rPr>
+                  <a:t> channel. Potentials from P. Reinert et al., Eur. Phys. J. A </a:t>
                 </a:r>
                 <a:r>
                   <a:rPr lang="en-US" sz="1600" b="1" dirty="0">
@@ -15695,10 +16181,10 @@
         <mc:Fallback>
           <p:sp>
             <p:nvSpPr>
-              <p:cNvPr id="3" name="TextBox 2">
+              <p:cNvPr id="11" name="TextBox 10">
                 <a:extLst>
                   <a:ext uri="{FF2B5EF4-FFF2-40B4-BE49-F238E27FC236}">
-                    <a16:creationId xmlns:a16="http://schemas.microsoft.com/office/drawing/2014/main" id="{5176E28F-4337-CC4F-9747-BFCFB632EA1E}"/>
+                    <a16:creationId xmlns:a16="http://schemas.microsoft.com/office/drawing/2014/main" id="{5AF15FF7-1B55-0B48-A37C-D6D892389F82}"/>
                   </a:ext>
                 </a:extLst>
               </p:cNvPr>
@@ -15709,8 +16195,8 @@
             </p:nvSpPr>
             <p:spPr>
               <a:xfrm>
-                <a:off x="3384331" y="6208836"/>
-                <a:ext cx="8713076" cy="830997"/>
+                <a:off x="3146839" y="6208836"/>
+                <a:ext cx="8950568" cy="830997"/>
               </a:xfrm>
               <a:prstGeom prst="rect">
                 <a:avLst/>
@@ -15718,7 +16204,7 @@
               <a:blipFill>
                 <a:blip r:embed="rId5"/>
                 <a:stretch>
-                  <a:fillRect l="-145" t="-1515" r="-872"/>
+                  <a:fillRect l="-283" t="-1515" r="-142"/>
                 </a:stretch>
               </a:blipFill>
             </p:spPr>
@@ -15762,6 +16248,66 @@
           <a:chExt cx="0" cy="0"/>
         </a:xfrm>
       </p:grpSpPr>
+      <p:pic>
+        <p:nvPicPr>
+          <p:cNvPr id="13" name="Picture 12">
+            <a:extLst>
+              <a:ext uri="{FF2B5EF4-FFF2-40B4-BE49-F238E27FC236}">
+                <a16:creationId xmlns:a16="http://schemas.microsoft.com/office/drawing/2014/main" id="{4764DA6D-97A6-6342-B554-A7BC77386650}"/>
+              </a:ext>
+            </a:extLst>
+          </p:cNvPr>
+          <p:cNvPicPr>
+            <a:picLocks noChangeAspect="1"/>
+          </p:cNvPicPr>
+          <p:nvPr/>
+        </p:nvPicPr>
+        <p:blipFill>
+          <a:blip r:embed="rId2"/>
+          <a:stretch>
+            <a:fillRect/>
+          </a:stretch>
+        </p:blipFill>
+        <p:spPr>
+          <a:xfrm>
+            <a:off x="3241432" y="1690688"/>
+            <a:ext cx="8950568" cy="2286000"/>
+          </a:xfrm>
+          <a:prstGeom prst="rect">
+            <a:avLst/>
+          </a:prstGeom>
+        </p:spPr>
+      </p:pic>
+      <p:pic>
+        <p:nvPicPr>
+          <p:cNvPr id="16" name="Picture 15">
+            <a:extLst>
+              <a:ext uri="{FF2B5EF4-FFF2-40B4-BE49-F238E27FC236}">
+                <a16:creationId xmlns:a16="http://schemas.microsoft.com/office/drawing/2014/main" id="{BF3A6B0B-BEBF-024F-8F04-43006CC8703D}"/>
+              </a:ext>
+            </a:extLst>
+          </p:cNvPr>
+          <p:cNvPicPr>
+            <a:picLocks noChangeAspect="1"/>
+          </p:cNvPicPr>
+          <p:nvPr/>
+        </p:nvPicPr>
+        <p:blipFill>
+          <a:blip r:embed="rId3"/>
+          <a:stretch>
+            <a:fillRect/>
+          </a:stretch>
+        </p:blipFill>
+        <p:spPr>
+          <a:xfrm>
+            <a:off x="3265585" y="4001294"/>
+            <a:ext cx="8950568" cy="2286000"/>
+          </a:xfrm>
+          <a:prstGeom prst="rect">
+            <a:avLst/>
+          </a:prstGeom>
+        </p:spPr>
+      </p:pic>
       <p:sp>
         <p:nvSpPr>
           <p:cNvPr id="18433" name="Title 1">
@@ -15799,8 +16345,8 @@
           </a:p>
         </p:txBody>
       </p:sp>
-      <mc:AlternateContent xmlns:mc="http://schemas.openxmlformats.org/markup-compatibility/2006">
-        <mc:Choice xmlns:a14="http://schemas.microsoft.com/office/drawing/2010/main" Requires="a14">
+      <mc:AlternateContent xmlns:mc="http://schemas.openxmlformats.org/markup-compatibility/2006" xmlns:a14="http://schemas.microsoft.com/office/drawing/2010/main">
+        <mc:Choice Requires="a14">
           <p:sp>
             <p:nvSpPr>
               <p:cNvPr id="18434" name="Content Placeholder 2">
@@ -16059,7 +16605,7 @@
             </p:txBody>
           </p:sp>
         </mc:Choice>
-        <mc:Fallback>
+        <mc:Fallback xmlns="">
           <p:sp>
             <p:nvSpPr>
               <p:cNvPr id="18434" name="Content Placeholder 2">
@@ -16082,7 +16628,7 @@
                 <a:ext cx="3090041" cy="4351338"/>
               </a:xfrm>
               <a:blipFill>
-                <a:blip r:embed="rId2"/>
+                <a:blip r:embed="rId4"/>
                 <a:stretch>
                   <a:fillRect l="-2049" t="-1170"/>
                 </a:stretch>
@@ -16103,126 +16649,6 @@
           </p:sp>
         </mc:Fallback>
       </mc:AlternateContent>
-      <p:pic>
-        <p:nvPicPr>
-          <p:cNvPr id="18435" name="Picture 3">
-            <a:extLst>
-              <a:ext uri="{FF2B5EF4-FFF2-40B4-BE49-F238E27FC236}">
-                <a16:creationId xmlns:a16="http://schemas.microsoft.com/office/drawing/2014/main" id="{F3EF34EE-F95F-C94B-8A13-08A5338FE7D5}"/>
-              </a:ext>
-            </a:extLst>
-          </p:cNvPr>
-          <p:cNvPicPr>
-            <a:picLocks noChangeAspect="1" noChangeArrowheads="1"/>
-          </p:cNvPicPr>
-          <p:nvPr/>
-        </p:nvPicPr>
-        <p:blipFill>
-          <a:blip r:embed="rId3">
-            <a:extLst>
-              <a:ext uri="{28A0092B-C50C-407E-A947-70E740481C1C}">
-                <a14:useLocalDpi xmlns:a14="http://schemas.microsoft.com/office/drawing/2010/main" val="0"/>
-              </a:ext>
-            </a:extLst>
-          </a:blip>
-          <a:srcRect/>
-          <a:stretch>
-            <a:fillRect/>
-          </a:stretch>
-        </p:blipFill>
-        <p:spPr bwMode="auto">
-          <a:xfrm>
-            <a:off x="3243741" y="1667975"/>
-            <a:ext cx="8948259" cy="2286000"/>
-          </a:xfrm>
-          <a:prstGeom prst="rect">
-            <a:avLst/>
-          </a:prstGeom>
-          <a:noFill/>
-          <a:ln>
-            <a:noFill/>
-          </a:ln>
-          <a:extLst>
-            <a:ext uri="{909E8E84-426E-40DD-AFC4-6F175D3DCCD1}">
-              <a14:hiddenFill xmlns:a14="http://schemas.microsoft.com/office/drawing/2010/main">
-                <a:solidFill>
-                  <a:srgbClr val="FFFFFF"/>
-                </a:solidFill>
-              </a14:hiddenFill>
-            </a:ext>
-            <a:ext uri="{91240B29-F687-4F45-9708-019B960494DF}">
-              <a14:hiddenLine xmlns:a14="http://schemas.microsoft.com/office/drawing/2010/main" w="9525">
-                <a:solidFill>
-                  <a:srgbClr val="000000"/>
-                </a:solidFill>
-                <a:miter lim="800000"/>
-                <a:headEnd/>
-                <a:tailEnd/>
-              </a14:hiddenLine>
-            </a:ext>
-          </a:extLst>
-        </p:spPr>
-      </p:pic>
-      <p:pic>
-        <p:nvPicPr>
-          <p:cNvPr id="18436" name="Picture 4">
-            <a:extLst>
-              <a:ext uri="{FF2B5EF4-FFF2-40B4-BE49-F238E27FC236}">
-                <a16:creationId xmlns:a16="http://schemas.microsoft.com/office/drawing/2014/main" id="{0C5B1EB8-7A6E-4B48-9FBC-40AA2B2AE1F8}"/>
-              </a:ext>
-            </a:extLst>
-          </p:cNvPr>
-          <p:cNvPicPr>
-            <a:picLocks noChangeAspect="1" noChangeArrowheads="1"/>
-          </p:cNvPicPr>
-          <p:nvPr/>
-        </p:nvPicPr>
-        <p:blipFill>
-          <a:blip r:embed="rId4">
-            <a:extLst>
-              <a:ext uri="{28A0092B-C50C-407E-A947-70E740481C1C}">
-                <a14:useLocalDpi xmlns:a14="http://schemas.microsoft.com/office/drawing/2010/main" val="0"/>
-              </a:ext>
-            </a:extLst>
-          </a:blip>
-          <a:srcRect/>
-          <a:stretch>
-            <a:fillRect/>
-          </a:stretch>
-        </p:blipFill>
-        <p:spPr bwMode="auto">
-          <a:xfrm>
-            <a:off x="3239183" y="4006916"/>
-            <a:ext cx="8952816" cy="2286000"/>
-          </a:xfrm>
-          <a:prstGeom prst="rect">
-            <a:avLst/>
-          </a:prstGeom>
-          <a:noFill/>
-          <a:ln>
-            <a:noFill/>
-          </a:ln>
-          <a:extLst>
-            <a:ext uri="{909E8E84-426E-40DD-AFC4-6F175D3DCCD1}">
-              <a14:hiddenFill xmlns:a14="http://schemas.microsoft.com/office/drawing/2010/main">
-                <a:solidFill>
-                  <a:srgbClr val="FFFFFF"/>
-                </a:solidFill>
-              </a14:hiddenFill>
-            </a:ext>
-            <a:ext uri="{91240B29-F687-4F45-9708-019B960494DF}">
-              <a14:hiddenLine xmlns:a14="http://schemas.microsoft.com/office/drawing/2010/main" w="9525">
-                <a:solidFill>
-                  <a:srgbClr val="000000"/>
-                </a:solidFill>
-                <a:miter lim="800000"/>
-                <a:headEnd/>
-                <a:tailEnd/>
-              </a14:hiddenLine>
-            </a:ext>
-          </a:extLst>
-        </p:spPr>
-      </p:pic>
       <p:cxnSp>
         <p:nvCxnSpPr>
           <p:cNvPr id="5" name="Straight Arrow Connector 4">
@@ -16283,7 +16709,7 @@
         </p:nvCxnSpPr>
         <p:spPr>
           <a:xfrm rot="10800000" flipH="1">
-            <a:off x="8891751" y="2777362"/>
+            <a:off x="8860221" y="2808892"/>
             <a:ext cx="546537" cy="536028"/>
           </a:xfrm>
           <a:prstGeom prst="straightConnector1">
@@ -16327,7 +16753,7 @@
         </p:nvCxnSpPr>
         <p:spPr>
           <a:xfrm flipH="1">
-            <a:off x="9637987" y="4785333"/>
+            <a:off x="9627477" y="4785333"/>
             <a:ext cx="746233" cy="0"/>
           </a:xfrm>
           <a:prstGeom prst="straightConnector1">
@@ -16371,7 +16797,7 @@
         </p:nvCxnSpPr>
         <p:spPr>
           <a:xfrm rot="5400000" flipH="1">
-            <a:off x="8886497" y="5523032"/>
+            <a:off x="8886497" y="5449462"/>
             <a:ext cx="746233" cy="0"/>
           </a:xfrm>
           <a:prstGeom prst="straightConnector1">
@@ -16415,8 +16841,8 @@
             </p:nvSpPr>
             <p:spPr>
               <a:xfrm>
-                <a:off x="3384331" y="6208836"/>
-                <a:ext cx="8713076" cy="830997"/>
+                <a:off x="3146839" y="6208836"/>
+                <a:ext cx="8950568" cy="830997"/>
               </a:xfrm>
               <a:prstGeom prst="rect">
                 <a:avLst/>
@@ -16559,7 +16985,35 @@
                     <a:latin typeface="Arial" panose="020B0604020202020204" pitchFamily="34" charset="0"/>
                     <a:cs typeface="Arial" panose="020B0604020202020204" pitchFamily="34" charset="0"/>
                   </a:rPr>
-                  <a:t>. Potentials from P. Reinert et al., Eur. Phys. J. A </a:t>
+                  <a:t> in the </a:t>
+                </a:r>
+                <a:r>
+                  <a:rPr lang="en-US" sz="1600" baseline="30000" dirty="0">
+                    <a:latin typeface="Arial" panose="020B0604020202020204" pitchFamily="34" charset="0"/>
+                    <a:cs typeface="Arial" panose="020B0604020202020204" pitchFamily="34" charset="0"/>
+                  </a:rPr>
+                  <a:t>1</a:t>
+                </a:r>
+                <a:r>
+                  <a:rPr lang="en-US" sz="1600" dirty="0">
+                    <a:latin typeface="Arial" panose="020B0604020202020204" pitchFamily="34" charset="0"/>
+                    <a:cs typeface="Arial" panose="020B0604020202020204" pitchFamily="34" charset="0"/>
+                  </a:rPr>
+                  <a:t>P</a:t>
+                </a:r>
+                <a:r>
+                  <a:rPr lang="en-US" sz="1600" baseline="-25000" dirty="0">
+                    <a:latin typeface="Arial" panose="020B0604020202020204" pitchFamily="34" charset="0"/>
+                    <a:cs typeface="Arial" panose="020B0604020202020204" pitchFamily="34" charset="0"/>
+                  </a:rPr>
+                  <a:t>1</a:t>
+                </a:r>
+                <a:r>
+                  <a:rPr lang="en-US" sz="1600" dirty="0">
+                    <a:latin typeface="Arial" panose="020B0604020202020204" pitchFamily="34" charset="0"/>
+                    <a:cs typeface="Arial" panose="020B0604020202020204" pitchFamily="34" charset="0"/>
+                  </a:rPr>
+                  <a:t> channel. Potentials from P. Reinert et al., Eur. Phys. J. A </a:t>
                 </a:r>
                 <a:r>
                   <a:rPr lang="en-US" sz="1600" b="1" dirty="0">
@@ -16604,8 +17058,8 @@
             </p:nvSpPr>
             <p:spPr>
               <a:xfrm>
-                <a:off x="3384331" y="6208836"/>
-                <a:ext cx="8713076" cy="830997"/>
+                <a:off x="3146839" y="6208836"/>
+                <a:ext cx="8950568" cy="830997"/>
               </a:xfrm>
               <a:prstGeom prst="rect">
                 <a:avLst/>
@@ -16613,7 +17067,7 @@
               <a:blipFill>
                 <a:blip r:embed="rId5"/>
                 <a:stretch>
-                  <a:fillRect l="-145" t="-1515" r="-872"/>
+                  <a:fillRect l="-283" t="-1515" r="-142"/>
                 </a:stretch>
               </a:blipFill>
             </p:spPr>
@@ -16831,8 +17285,8 @@
           </a:prstGeom>
         </p:spPr>
       </p:pic>
-      <mc:AlternateContent xmlns:mc="http://schemas.openxmlformats.org/markup-compatibility/2006">
-        <mc:Choice xmlns:a14="http://schemas.microsoft.com/office/drawing/2010/main" Requires="a14">
+      <mc:AlternateContent xmlns:mc="http://schemas.openxmlformats.org/markup-compatibility/2006" xmlns:a14="http://schemas.microsoft.com/office/drawing/2010/main">
+        <mc:Choice Requires="a14">
           <p:sp>
             <p:nvSpPr>
               <p:cNvPr id="8" name="TextBox 7">
@@ -16958,7 +17412,7 @@
             </p:txBody>
           </p:sp>
         </mc:Choice>
-        <mc:Fallback>
+        <mc:Fallback xmlns="">
           <p:sp>
             <p:nvSpPr>
               <p:cNvPr id="8" name="TextBox 7">
@@ -17407,8 +17861,8 @@
           </a:prstGeom>
         </p:spPr>
       </p:pic>
-      <mc:AlternateContent xmlns:mc="http://schemas.openxmlformats.org/markup-compatibility/2006">
-        <mc:Choice xmlns:a14="http://schemas.microsoft.com/office/drawing/2010/main" Requires="a14">
+      <mc:AlternateContent xmlns:mc="http://schemas.openxmlformats.org/markup-compatibility/2006" xmlns:a14="http://schemas.microsoft.com/office/drawing/2010/main">
+        <mc:Choice Requires="a14">
           <p:sp>
             <p:nvSpPr>
               <p:cNvPr id="8" name="TextBox 7">
@@ -17534,7 +17988,7 @@
             </p:txBody>
           </p:sp>
         </mc:Choice>
-        <mc:Fallback>
+        <mc:Fallback xmlns="">
           <p:sp>
             <p:nvSpPr>
               <p:cNvPr id="8" name="TextBox 7">
@@ -17832,8 +18286,8 @@
           </a:prstGeom>
         </p:spPr>
       </p:pic>
-      <mc:AlternateContent xmlns:mc="http://schemas.openxmlformats.org/markup-compatibility/2006">
-        <mc:Choice xmlns:a14="http://schemas.microsoft.com/office/drawing/2010/main" Requires="a14">
+      <mc:AlternateContent xmlns:mc="http://schemas.openxmlformats.org/markup-compatibility/2006" xmlns:a14="http://schemas.microsoft.com/office/drawing/2010/main">
+        <mc:Choice Requires="a14">
           <p:sp>
             <p:nvSpPr>
               <p:cNvPr id="8" name="TextBox 7">
@@ -17959,7 +18413,7 @@
             </p:txBody>
           </p:sp>
         </mc:Choice>
-        <mc:Fallback>
+        <mc:Fallback xmlns="">
           <p:sp>
             <p:nvSpPr>
               <p:cNvPr id="8" name="TextBox 7">
@@ -18389,8 +18843,8 @@
           </a:extLst>
         </p:spPr>
       </p:pic>
-      <mc:AlternateContent xmlns:mc="http://schemas.openxmlformats.org/markup-compatibility/2006">
-        <mc:Choice xmlns:a14="http://schemas.microsoft.com/office/drawing/2010/main" Requires="a14">
+      <mc:AlternateContent xmlns:mc="http://schemas.openxmlformats.org/markup-compatibility/2006" xmlns:a14="http://schemas.microsoft.com/office/drawing/2010/main">
+        <mc:Choice Requires="a14">
           <p:sp>
             <p:nvSpPr>
               <p:cNvPr id="7" name="TextBox 6">
@@ -18516,7 +18970,7 @@
             </p:txBody>
           </p:sp>
         </mc:Choice>
-        <mc:Fallback>
+        <mc:Fallback xmlns="">
           <p:sp>
             <p:nvSpPr>
               <p:cNvPr id="7" name="TextBox 6">

</xml_diff>

<commit_message>
Minor updates to DNP 2019 presentation
</commit_message>
<xml_diff>
--- a/Presentations/DNP_October2019/tropiano_dnp_october2019.pptx
+++ b/Presentations/DNP_October2019/tropiano_dnp_october2019.pptx
@@ -5348,10 +5348,10 @@
       </p:sp>
       <p:pic>
         <p:nvPicPr>
-          <p:cNvPr id="9" name="Picture 8">
+          <p:cNvPr id="12" name="Picture 11">
             <a:extLst>
               <a:ext uri="{FF2B5EF4-FFF2-40B4-BE49-F238E27FC236}">
-                <a16:creationId xmlns:a16="http://schemas.microsoft.com/office/drawing/2014/main" id="{5EB5BD42-682C-6849-87A0-53F346C8D3CB}"/>
+                <a16:creationId xmlns:a16="http://schemas.microsoft.com/office/drawing/2014/main" id="{2183C073-FE93-0146-B873-BEBCB2B17A5A}"/>
               </a:ext>
             </a:extLst>
           </p:cNvPr>
@@ -5368,8 +5368,8 @@
         </p:blipFill>
         <p:spPr>
           <a:xfrm>
-            <a:off x="470337" y="2478860"/>
-            <a:ext cx="7601446" cy="2194560"/>
+            <a:off x="470337" y="4638271"/>
+            <a:ext cx="7633255" cy="2194560"/>
           </a:xfrm>
           <a:prstGeom prst="rect">
             <a:avLst/>
@@ -5378,10 +5378,10 @@
       </p:pic>
       <p:pic>
         <p:nvPicPr>
-          <p:cNvPr id="10" name="Picture 9">
+          <p:cNvPr id="13" name="Picture 12">
             <a:extLst>
               <a:ext uri="{FF2B5EF4-FFF2-40B4-BE49-F238E27FC236}">
-                <a16:creationId xmlns:a16="http://schemas.microsoft.com/office/drawing/2014/main" id="{7AC97B25-3A3E-0C41-A143-E1073D62B7E3}"/>
+                <a16:creationId xmlns:a16="http://schemas.microsoft.com/office/drawing/2014/main" id="{DA64606D-5FCF-D447-9556-3FA0D75805E5}"/>
               </a:ext>
             </a:extLst>
           </p:cNvPr>
@@ -5398,8 +5398,8 @@
         </p:blipFill>
         <p:spPr>
           <a:xfrm>
-            <a:off x="470337" y="4663440"/>
-            <a:ext cx="7601446" cy="2194560"/>
+            <a:off x="454433" y="2481488"/>
+            <a:ext cx="7633255" cy="2194560"/>
           </a:xfrm>
           <a:prstGeom prst="rect">
             <a:avLst/>
@@ -19624,10 +19624,10 @@
       </p:sp>
       <p:pic>
         <p:nvPicPr>
-          <p:cNvPr id="3" name="Picture 2">
+          <p:cNvPr id="14" name="Picture 13">
             <a:extLst>
               <a:ext uri="{FF2B5EF4-FFF2-40B4-BE49-F238E27FC236}">
-                <a16:creationId xmlns:a16="http://schemas.microsoft.com/office/drawing/2014/main" id="{1D182B3A-BA23-1F4F-A835-B90A44C6832A}"/>
+                <a16:creationId xmlns:a16="http://schemas.microsoft.com/office/drawing/2014/main" id="{ABDBA50E-0E22-6541-8B87-42EE19D2812F}"/>
               </a:ext>
             </a:extLst>
           </p:cNvPr>
@@ -19644,8 +19644,8 @@
         </p:blipFill>
         <p:spPr>
           <a:xfrm>
-            <a:off x="470337" y="2478860"/>
-            <a:ext cx="7601446" cy="2194560"/>
+            <a:off x="470337" y="4638271"/>
+            <a:ext cx="7633255" cy="2194560"/>
           </a:xfrm>
           <a:prstGeom prst="rect">
             <a:avLst/>
@@ -19654,10 +19654,10 @@
       </p:pic>
       <p:pic>
         <p:nvPicPr>
-          <p:cNvPr id="5" name="Picture 4">
+          <p:cNvPr id="12" name="Picture 11">
             <a:extLst>
               <a:ext uri="{FF2B5EF4-FFF2-40B4-BE49-F238E27FC236}">
-                <a16:creationId xmlns:a16="http://schemas.microsoft.com/office/drawing/2014/main" id="{F387909D-63BD-DF4E-8350-87F92D7E0E29}"/>
+                <a16:creationId xmlns:a16="http://schemas.microsoft.com/office/drawing/2014/main" id="{461548EE-3808-8D4E-A34C-061919F51FD6}"/>
               </a:ext>
             </a:extLst>
           </p:cNvPr>
@@ -19674,8 +19674,8 @@
         </p:blipFill>
         <p:spPr>
           <a:xfrm>
-            <a:off x="470337" y="4663440"/>
-            <a:ext cx="7601446" cy="2194560"/>
+            <a:off x="454433" y="2481488"/>
+            <a:ext cx="7633255" cy="2194560"/>
           </a:xfrm>
           <a:prstGeom prst="rect">
             <a:avLst/>

</xml_diff>

<commit_message>
Updated DNP 2019 presentation
</commit_message>
<xml_diff>
--- a/Presentations/DNP_October2019/tropiano_dnp_october2019.pptx
+++ b/Presentations/DNP_October2019/tropiano_dnp_october2019.pptx
@@ -9356,321 +9356,6 @@
         <mc:Choice Requires="a14">
           <p:sp>
             <p:nvSpPr>
-              <p:cNvPr id="8" name="TextBox 7">
-                <a:extLst>
-                  <a:ext uri="{FF2B5EF4-FFF2-40B4-BE49-F238E27FC236}">
-                    <a16:creationId xmlns:a16="http://schemas.microsoft.com/office/drawing/2014/main" id="{936A8AA8-0A4D-674E-97C0-5C6F1591DA69}"/>
-                  </a:ext>
-                </a:extLst>
-              </p:cNvPr>
-              <p:cNvSpPr txBox="1"/>
-              <p:nvPr/>
-            </p:nvSpPr>
-            <p:spPr>
-              <a:xfrm>
-                <a:off x="5255172" y="6079808"/>
-                <a:ext cx="6989381" cy="890500"/>
-              </a:xfrm>
-              <a:prstGeom prst="rect">
-                <a:avLst/>
-              </a:prstGeom>
-              <a:noFill/>
-            </p:spPr>
-            <p:txBody>
-              <a:bodyPr wrap="square" rtlCol="0">
-                <a:spAutoFit/>
-              </a:bodyPr>
-              <a:lstStyle/>
-              <a:p>
-                <a:r>
-                  <a:rPr lang="en-US" sz="1600" dirty="0">
-                    <a:latin typeface="Arial" panose="020B0604020202020204" pitchFamily="34" charset="0"/>
-                    <a:cs typeface="Arial" panose="020B0604020202020204" pitchFamily="34" charset="0"/>
-                  </a:rPr>
-                  <a:t>Fig. 4: SRG evolution of </a:t>
-                </a:r>
-                <a14:m>
-                  <m:oMath xmlns:m="http://schemas.openxmlformats.org/officeDocument/2006/math">
-                    <m:sSubSup>
-                      <m:sSubSupPr>
-                        <m:ctrlPr>
-                          <a:rPr lang="en-US" sz="1600" i="1" smtClean="0">
-                            <a:latin typeface="Cambria Math" panose="02040503050406030204" pitchFamily="18" charset="0"/>
-                          </a:rPr>
-                        </m:ctrlPr>
-                      </m:sSubSupPr>
-                      <m:e>
-                        <m:r>
-                          <a:rPr lang="en-US" sz="1600" b="0" i="1" smtClean="0">
-                            <a:latin typeface="Cambria Math" panose="02040503050406030204" pitchFamily="18" charset="0"/>
-                          </a:rPr>
-                          <m:t>𝑎</m:t>
-                        </m:r>
-                      </m:e>
-                      <m:sub>
-                        <m:r>
-                          <a:rPr lang="en-US" sz="1600" b="0" i="1" smtClean="0">
-                            <a:latin typeface="Cambria Math" panose="02040503050406030204" pitchFamily="18" charset="0"/>
-                          </a:rPr>
-                          <m:t>𝑞</m:t>
-                        </m:r>
-                      </m:sub>
-                      <m:sup>
-                        <m:r>
-                          <a:rPr lang="en-US" sz="1600" i="1" smtClean="0">
-                            <a:latin typeface="Cambria Math" panose="02040503050406030204" pitchFamily="18" charset="0"/>
-                            <a:ea typeface="Cambria Math" panose="02040503050406030204" pitchFamily="18" charset="0"/>
-                          </a:rPr>
-                          <m:t>†</m:t>
-                        </m:r>
-                      </m:sup>
-                    </m:sSubSup>
-                    <m:sSub>
-                      <m:sSubPr>
-                        <m:ctrlPr>
-                          <a:rPr lang="en-US" sz="1600" i="1" smtClean="0">
-                            <a:latin typeface="Cambria Math" panose="02040503050406030204" pitchFamily="18" charset="0"/>
-                          </a:rPr>
-                        </m:ctrlPr>
-                      </m:sSubPr>
-                      <m:e>
-                        <m:r>
-                          <a:rPr lang="en-US" sz="1600" b="0" i="1" smtClean="0">
-                            <a:latin typeface="Cambria Math" panose="02040503050406030204" pitchFamily="18" charset="0"/>
-                          </a:rPr>
-                          <m:t>𝑎</m:t>
-                        </m:r>
-                      </m:e>
-                      <m:sub>
-                        <m:r>
-                          <a:rPr lang="en-US" sz="1600" b="0" i="1" smtClean="0">
-                            <a:latin typeface="Cambria Math" panose="02040503050406030204" pitchFamily="18" charset="0"/>
-                          </a:rPr>
-                          <m:t>𝑞</m:t>
-                        </m:r>
-                      </m:sub>
-                    </m:sSub>
-                    <m:r>
-                      <a:rPr lang="en-US" sz="1600" i="1">
-                        <a:latin typeface="Cambria Math" panose="02040503050406030204" pitchFamily="18" charset="0"/>
-                      </a:rPr>
-                      <m:t>(</m:t>
-                    </m:r>
-                    <m:r>
-                      <a:rPr lang="en-US" sz="1600" i="1">
-                        <a:latin typeface="Cambria Math" panose="02040503050406030204" pitchFamily="18" charset="0"/>
-                      </a:rPr>
-                      <m:t>𝑘</m:t>
-                    </m:r>
-                    <m:r>
-                      <a:rPr lang="en-US" sz="1600" i="1">
-                        <a:latin typeface="Cambria Math" panose="02040503050406030204" pitchFamily="18" charset="0"/>
-                      </a:rPr>
-                      <m:t>,</m:t>
-                    </m:r>
-                    <m:sSup>
-                      <m:sSupPr>
-                        <m:ctrlPr>
-                          <a:rPr lang="en-US" sz="1600" i="1">
-                            <a:latin typeface="Cambria Math" panose="02040503050406030204" pitchFamily="18" charset="0"/>
-                          </a:rPr>
-                        </m:ctrlPr>
-                      </m:sSupPr>
-                      <m:e>
-                        <m:r>
-                          <a:rPr lang="en-US" sz="1600" i="1">
-                            <a:latin typeface="Cambria Math" panose="02040503050406030204" pitchFamily="18" charset="0"/>
-                          </a:rPr>
-                          <m:t>𝑘</m:t>
-                        </m:r>
-                      </m:e>
-                      <m:sup>
-                        <m:r>
-                          <a:rPr lang="en-US" sz="1600" i="1">
-                            <a:latin typeface="Cambria Math" panose="02040503050406030204" pitchFamily="18" charset="0"/>
-                          </a:rPr>
-                          <m:t>′</m:t>
-                        </m:r>
-                      </m:sup>
-                    </m:sSup>
-                    <m:r>
-                      <a:rPr lang="en-US" sz="1600" i="1">
-                        <a:latin typeface="Cambria Math" panose="02040503050406030204" pitchFamily="18" charset="0"/>
-                      </a:rPr>
-                      <m:t>)</m:t>
-                    </m:r>
-                  </m:oMath>
-                </a14:m>
-                <a:r>
-                  <a:rPr lang="en-US" sz="1600" dirty="0">
-                    <a:latin typeface="Arial" panose="020B0604020202020204" pitchFamily="34" charset="0"/>
-                    <a:cs typeface="Arial" panose="020B0604020202020204" pitchFamily="34" charset="0"/>
-                  </a:rPr>
-                  <a:t> for several values of </a:t>
-                </a:r>
-                <a14:m>
-                  <m:oMath xmlns:m="http://schemas.openxmlformats.org/officeDocument/2006/math">
-                    <m:r>
-                      <a:rPr lang="en-US" sz="1600" i="1">
-                        <a:latin typeface="Cambria Math" panose="02040503050406030204" pitchFamily="18" charset="0"/>
-                        <a:ea typeface="Cambria Math" panose="02040503050406030204" pitchFamily="18" charset="0"/>
-                      </a:rPr>
-                      <m:t>𝜆</m:t>
-                    </m:r>
-                  </m:oMath>
-                </a14:m>
-                <a:r>
-                  <a:rPr lang="en-US" sz="1600" dirty="0">
-                    <a:latin typeface="Arial" panose="020B0604020202020204" pitchFamily="34" charset="0"/>
-                    <a:cs typeface="Arial" panose="020B0604020202020204" pitchFamily="34" charset="0"/>
-                  </a:rPr>
-                  <a:t> and </a:t>
-                </a:r>
-                <a14:m>
-                  <m:oMath xmlns:m="http://schemas.openxmlformats.org/officeDocument/2006/math">
-                    <m:r>
-                      <m:rPr>
-                        <m:sty m:val="p"/>
-                      </m:rPr>
-                      <a:rPr lang="el-GR" sz="1600" i="1" smtClean="0">
-                        <a:latin typeface="Cambria Math" panose="02040503050406030204" pitchFamily="18" charset="0"/>
-                        <a:ea typeface="Cambria Math" panose="02040503050406030204" pitchFamily="18" charset="0"/>
-                      </a:rPr>
-                      <m:t>Λ</m:t>
-                    </m:r>
-                  </m:oMath>
-                </a14:m>
-                <a:r>
-                  <a:rPr lang="en-US" sz="1600" dirty="0">
-                    <a:latin typeface="Arial" panose="020B0604020202020204" pitchFamily="34" charset="0"/>
-                    <a:cs typeface="Arial" panose="020B0604020202020204" pitchFamily="34" charset="0"/>
-                  </a:rPr>
-                  <a:t> where the transformations are done using the RKE N</a:t>
-                </a:r>
-                <a:r>
-                  <a:rPr lang="en-US" sz="1600" baseline="30000" dirty="0">
-                    <a:latin typeface="Arial" panose="020B0604020202020204" pitchFamily="34" charset="0"/>
-                    <a:cs typeface="Arial" panose="020B0604020202020204" pitchFamily="34" charset="0"/>
-                  </a:rPr>
-                  <a:t>4</a:t>
-                </a:r>
-                <a:r>
-                  <a:rPr lang="en-US" sz="1600" dirty="0">
-                    <a:latin typeface="Arial" panose="020B0604020202020204" pitchFamily="34" charset="0"/>
-                    <a:cs typeface="Arial" panose="020B0604020202020204" pitchFamily="34" charset="0"/>
-                  </a:rPr>
-                  <a:t>LO potential. Here </a:t>
-                </a:r>
-                <a14:m>
-                  <m:oMath xmlns:m="http://schemas.openxmlformats.org/officeDocument/2006/math">
-                    <m:r>
-                      <a:rPr lang="en-US" sz="1600" b="0" i="1" smtClean="0">
-                        <a:solidFill>
-                          <a:srgbClr val="C00000"/>
-                        </a:solidFill>
-                        <a:latin typeface="Cambria Math" panose="02040503050406030204" pitchFamily="18" charset="0"/>
-                        <a:cs typeface="Arial" panose="020B0604020202020204" pitchFamily="34" charset="0"/>
-                      </a:rPr>
-                      <m:t>𝑞</m:t>
-                    </m:r>
-                    <m:r>
-                      <a:rPr lang="en-US" sz="1600" b="0" i="1" smtClean="0">
-                        <a:solidFill>
-                          <a:srgbClr val="C00000"/>
-                        </a:solidFill>
-                        <a:latin typeface="Cambria Math" panose="02040503050406030204" pitchFamily="18" charset="0"/>
-                        <a:cs typeface="Arial" panose="020B0604020202020204" pitchFamily="34" charset="0"/>
-                      </a:rPr>
-                      <m:t>=3</m:t>
-                    </m:r>
-                  </m:oMath>
-                </a14:m>
-                <a:r>
-                  <a:rPr lang="en-US" sz="1600" dirty="0">
-                    <a:solidFill>
-                      <a:srgbClr val="C00000"/>
-                    </a:solidFill>
-                    <a:effectLst/>
-                    <a:latin typeface="Arial" panose="020B0604020202020204" pitchFamily="34" charset="0"/>
-                    <a:cs typeface="Arial" panose="020B0604020202020204" pitchFamily="34" charset="0"/>
-                  </a:rPr>
-                  <a:t> fm</a:t>
-                </a:r>
-                <a:r>
-                  <a:rPr lang="en-US" sz="1600" baseline="30000" dirty="0">
-                    <a:solidFill>
-                      <a:srgbClr val="C00000"/>
-                    </a:solidFill>
-                    <a:effectLst/>
-                    <a:latin typeface="Arial" panose="020B0604020202020204" pitchFamily="34" charset="0"/>
-                    <a:cs typeface="Arial" panose="020B0604020202020204" pitchFamily="34" charset="0"/>
-                  </a:rPr>
-                  <a:t>-1</a:t>
-                </a:r>
-                <a:r>
-                  <a:rPr lang="en-US" sz="1600" dirty="0">
-                    <a:effectLst/>
-                    <a:latin typeface="Arial" panose="020B0604020202020204" pitchFamily="34" charset="0"/>
-                    <a:cs typeface="Arial" panose="020B0604020202020204" pitchFamily="34" charset="0"/>
-                  </a:rPr>
-                  <a:t>.</a:t>
-                </a:r>
-              </a:p>
-              <a:p>
-                <a:endParaRPr lang="en-US" sz="1600" dirty="0"/>
-              </a:p>
-            </p:txBody>
-          </p:sp>
-        </mc:Choice>
-        <mc:Fallback xmlns="">
-          <p:sp>
-            <p:nvSpPr>
-              <p:cNvPr id="8" name="TextBox 7">
-                <a:extLst>
-                  <a:ext uri="{FF2B5EF4-FFF2-40B4-BE49-F238E27FC236}">
-                    <a16:creationId xmlns:a16="http://schemas.microsoft.com/office/drawing/2014/main" id="{936A8AA8-0A4D-674E-97C0-5C6F1591DA69}"/>
-                  </a:ext>
-                </a:extLst>
-              </p:cNvPr>
-              <p:cNvSpPr txBox="1">
-                <a:spLocks noRot="1" noChangeAspect="1" noMove="1" noResize="1" noEditPoints="1" noAdjustHandles="1" noChangeArrowheads="1" noChangeShapeType="1" noTextEdit="1"/>
-              </p:cNvSpPr>
-              <p:nvPr/>
-            </p:nvSpPr>
-            <p:spPr>
-              <a:xfrm>
-                <a:off x="5255172" y="6079808"/>
-                <a:ext cx="6989381" cy="890500"/>
-              </a:xfrm>
-              <a:prstGeom prst="rect">
-                <a:avLst/>
-              </a:prstGeom>
-              <a:blipFill>
-                <a:blip r:embed="rId6"/>
-                <a:stretch>
-                  <a:fillRect l="-363" r="-544"/>
-                </a:stretch>
-              </a:blipFill>
-            </p:spPr>
-            <p:txBody>
-              <a:bodyPr/>
-              <a:lstStyle/>
-              <a:p>
-                <a:r>
-                  <a:rPr lang="en-US">
-                    <a:noFill/>
-                  </a:rPr>
-                  <a:t> </a:t>
-                </a:r>
-              </a:p>
-            </p:txBody>
-          </p:sp>
-        </mc:Fallback>
-      </mc:AlternateContent>
-      <mc:AlternateContent xmlns:mc="http://schemas.openxmlformats.org/markup-compatibility/2006" xmlns:a14="http://schemas.microsoft.com/office/drawing/2010/main">
-        <mc:Choice Requires="a14">
-          <p:sp>
-            <p:nvSpPr>
               <p:cNvPr id="9" name="TextBox 8">
                 <a:extLst>
                   <a:ext uri="{FF2B5EF4-FFF2-40B4-BE49-F238E27FC236}">
@@ -9817,10 +9502,10 @@
       </mc:AlternateContent>
       <p:pic>
         <p:nvPicPr>
-          <p:cNvPr id="12" name="Picture 11">
+          <p:cNvPr id="13" name="Picture 12">
             <a:extLst>
               <a:ext uri="{FF2B5EF4-FFF2-40B4-BE49-F238E27FC236}">
-                <a16:creationId xmlns:a16="http://schemas.microsoft.com/office/drawing/2014/main" id="{F81AA5AA-A97F-1744-AC1F-5726777BB66A}"/>
+                <a16:creationId xmlns:a16="http://schemas.microsoft.com/office/drawing/2014/main" id="{BF20D5B2-3B11-1D49-8E46-D9A4A974E75A}"/>
               </a:ext>
             </a:extLst>
           </p:cNvPr>
@@ -9845,6 +9530,321 @@
           </a:prstGeom>
         </p:spPr>
       </p:pic>
+      <mc:AlternateContent xmlns:mc="http://schemas.openxmlformats.org/markup-compatibility/2006">
+        <mc:Choice xmlns:a14="http://schemas.microsoft.com/office/drawing/2010/main" Requires="a14">
+          <p:sp>
+            <p:nvSpPr>
+              <p:cNvPr id="8" name="TextBox 7">
+                <a:extLst>
+                  <a:ext uri="{FF2B5EF4-FFF2-40B4-BE49-F238E27FC236}">
+                    <a16:creationId xmlns:a16="http://schemas.microsoft.com/office/drawing/2014/main" id="{936A8AA8-0A4D-674E-97C0-5C6F1591DA69}"/>
+                  </a:ext>
+                </a:extLst>
+              </p:cNvPr>
+              <p:cNvSpPr txBox="1"/>
+              <p:nvPr/>
+            </p:nvSpPr>
+            <p:spPr>
+              <a:xfrm>
+                <a:off x="5255172" y="6079808"/>
+                <a:ext cx="6989381" cy="890500"/>
+              </a:xfrm>
+              <a:prstGeom prst="rect">
+                <a:avLst/>
+              </a:prstGeom>
+              <a:noFill/>
+            </p:spPr>
+            <p:txBody>
+              <a:bodyPr wrap="square" rtlCol="0">
+                <a:spAutoFit/>
+              </a:bodyPr>
+              <a:lstStyle/>
+              <a:p>
+                <a:r>
+                  <a:rPr lang="en-US" sz="1600" dirty="0">
+                    <a:latin typeface="Arial" panose="020B0604020202020204" pitchFamily="34" charset="0"/>
+                    <a:cs typeface="Arial" panose="020B0604020202020204" pitchFamily="34" charset="0"/>
+                  </a:rPr>
+                  <a:t>Fig. 4: SRG evolution of </a:t>
+                </a:r>
+                <a14:m>
+                  <m:oMath xmlns:m="http://schemas.openxmlformats.org/officeDocument/2006/math">
+                    <m:sSubSup>
+                      <m:sSubSupPr>
+                        <m:ctrlPr>
+                          <a:rPr lang="en-US" sz="1600" i="1" smtClean="0">
+                            <a:latin typeface="Cambria Math" panose="02040503050406030204" pitchFamily="18" charset="0"/>
+                          </a:rPr>
+                        </m:ctrlPr>
+                      </m:sSubSupPr>
+                      <m:e>
+                        <m:r>
+                          <a:rPr lang="en-US" sz="1600" b="0" i="1" smtClean="0">
+                            <a:latin typeface="Cambria Math" panose="02040503050406030204" pitchFamily="18" charset="0"/>
+                          </a:rPr>
+                          <m:t>𝑎</m:t>
+                        </m:r>
+                      </m:e>
+                      <m:sub>
+                        <m:r>
+                          <a:rPr lang="en-US" sz="1600" b="0" i="1" smtClean="0">
+                            <a:latin typeface="Cambria Math" panose="02040503050406030204" pitchFamily="18" charset="0"/>
+                          </a:rPr>
+                          <m:t>𝑞</m:t>
+                        </m:r>
+                      </m:sub>
+                      <m:sup>
+                        <m:r>
+                          <a:rPr lang="en-US" sz="1600" i="1" smtClean="0">
+                            <a:latin typeface="Cambria Math" panose="02040503050406030204" pitchFamily="18" charset="0"/>
+                            <a:ea typeface="Cambria Math" panose="02040503050406030204" pitchFamily="18" charset="0"/>
+                          </a:rPr>
+                          <m:t>†</m:t>
+                        </m:r>
+                      </m:sup>
+                    </m:sSubSup>
+                    <m:sSub>
+                      <m:sSubPr>
+                        <m:ctrlPr>
+                          <a:rPr lang="en-US" sz="1600" i="1" smtClean="0">
+                            <a:latin typeface="Cambria Math" panose="02040503050406030204" pitchFamily="18" charset="0"/>
+                          </a:rPr>
+                        </m:ctrlPr>
+                      </m:sSubPr>
+                      <m:e>
+                        <m:r>
+                          <a:rPr lang="en-US" sz="1600" b="0" i="1" smtClean="0">
+                            <a:latin typeface="Cambria Math" panose="02040503050406030204" pitchFamily="18" charset="0"/>
+                          </a:rPr>
+                          <m:t>𝑎</m:t>
+                        </m:r>
+                      </m:e>
+                      <m:sub>
+                        <m:r>
+                          <a:rPr lang="en-US" sz="1600" b="0" i="1" smtClean="0">
+                            <a:latin typeface="Cambria Math" panose="02040503050406030204" pitchFamily="18" charset="0"/>
+                          </a:rPr>
+                          <m:t>𝑞</m:t>
+                        </m:r>
+                      </m:sub>
+                    </m:sSub>
+                    <m:r>
+                      <a:rPr lang="en-US" sz="1600" i="1">
+                        <a:latin typeface="Cambria Math" panose="02040503050406030204" pitchFamily="18" charset="0"/>
+                      </a:rPr>
+                      <m:t>(</m:t>
+                    </m:r>
+                    <m:r>
+                      <a:rPr lang="en-US" sz="1600" i="1">
+                        <a:latin typeface="Cambria Math" panose="02040503050406030204" pitchFamily="18" charset="0"/>
+                      </a:rPr>
+                      <m:t>𝑘</m:t>
+                    </m:r>
+                    <m:r>
+                      <a:rPr lang="en-US" sz="1600" i="1">
+                        <a:latin typeface="Cambria Math" panose="02040503050406030204" pitchFamily="18" charset="0"/>
+                      </a:rPr>
+                      <m:t>,</m:t>
+                    </m:r>
+                    <m:sSup>
+                      <m:sSupPr>
+                        <m:ctrlPr>
+                          <a:rPr lang="en-US" sz="1600" i="1">
+                            <a:latin typeface="Cambria Math" panose="02040503050406030204" pitchFamily="18" charset="0"/>
+                          </a:rPr>
+                        </m:ctrlPr>
+                      </m:sSupPr>
+                      <m:e>
+                        <m:r>
+                          <a:rPr lang="en-US" sz="1600" i="1">
+                            <a:latin typeface="Cambria Math" panose="02040503050406030204" pitchFamily="18" charset="0"/>
+                          </a:rPr>
+                          <m:t>𝑘</m:t>
+                        </m:r>
+                      </m:e>
+                      <m:sup>
+                        <m:r>
+                          <a:rPr lang="en-US" sz="1600" i="1">
+                            <a:latin typeface="Cambria Math" panose="02040503050406030204" pitchFamily="18" charset="0"/>
+                          </a:rPr>
+                          <m:t>′</m:t>
+                        </m:r>
+                      </m:sup>
+                    </m:sSup>
+                    <m:r>
+                      <a:rPr lang="en-US" sz="1600" i="1">
+                        <a:latin typeface="Cambria Math" panose="02040503050406030204" pitchFamily="18" charset="0"/>
+                      </a:rPr>
+                      <m:t>)</m:t>
+                    </m:r>
+                  </m:oMath>
+                </a14:m>
+                <a:r>
+                  <a:rPr lang="en-US" sz="1600" dirty="0">
+                    <a:latin typeface="Arial" panose="020B0604020202020204" pitchFamily="34" charset="0"/>
+                    <a:cs typeface="Arial" panose="020B0604020202020204" pitchFamily="34" charset="0"/>
+                  </a:rPr>
+                  <a:t> for several values of </a:t>
+                </a:r>
+                <a14:m>
+                  <m:oMath xmlns:m="http://schemas.openxmlformats.org/officeDocument/2006/math">
+                    <m:r>
+                      <a:rPr lang="en-US" sz="1600" i="1">
+                        <a:latin typeface="Cambria Math" panose="02040503050406030204" pitchFamily="18" charset="0"/>
+                        <a:ea typeface="Cambria Math" panose="02040503050406030204" pitchFamily="18" charset="0"/>
+                      </a:rPr>
+                      <m:t>𝜆</m:t>
+                    </m:r>
+                  </m:oMath>
+                </a14:m>
+                <a:r>
+                  <a:rPr lang="en-US" sz="1600" dirty="0">
+                    <a:latin typeface="Arial" panose="020B0604020202020204" pitchFamily="34" charset="0"/>
+                    <a:cs typeface="Arial" panose="020B0604020202020204" pitchFamily="34" charset="0"/>
+                  </a:rPr>
+                  <a:t> and </a:t>
+                </a:r>
+                <a14:m>
+                  <m:oMath xmlns:m="http://schemas.openxmlformats.org/officeDocument/2006/math">
+                    <m:r>
+                      <m:rPr>
+                        <m:sty m:val="p"/>
+                      </m:rPr>
+                      <a:rPr lang="el-GR" sz="1600" i="1" smtClean="0">
+                        <a:latin typeface="Cambria Math" panose="02040503050406030204" pitchFamily="18" charset="0"/>
+                        <a:ea typeface="Cambria Math" panose="02040503050406030204" pitchFamily="18" charset="0"/>
+                      </a:rPr>
+                      <m:t>Λ</m:t>
+                    </m:r>
+                  </m:oMath>
+                </a14:m>
+                <a:r>
+                  <a:rPr lang="en-US" sz="1600" dirty="0">
+                    <a:latin typeface="Arial" panose="020B0604020202020204" pitchFamily="34" charset="0"/>
+                    <a:cs typeface="Arial" panose="020B0604020202020204" pitchFamily="34" charset="0"/>
+                  </a:rPr>
+                  <a:t> where the transformations are done using the RKE N</a:t>
+                </a:r>
+                <a:r>
+                  <a:rPr lang="en-US" sz="1600" baseline="30000" dirty="0">
+                    <a:latin typeface="Arial" panose="020B0604020202020204" pitchFamily="34" charset="0"/>
+                    <a:cs typeface="Arial" panose="020B0604020202020204" pitchFamily="34" charset="0"/>
+                  </a:rPr>
+                  <a:t>4</a:t>
+                </a:r>
+                <a:r>
+                  <a:rPr lang="en-US" sz="1600" dirty="0">
+                    <a:latin typeface="Arial" panose="020B0604020202020204" pitchFamily="34" charset="0"/>
+                    <a:cs typeface="Arial" panose="020B0604020202020204" pitchFamily="34" charset="0"/>
+                  </a:rPr>
+                  <a:t>LO potential. Here </a:t>
+                </a:r>
+                <a14:m>
+                  <m:oMath xmlns:m="http://schemas.openxmlformats.org/officeDocument/2006/math">
+                    <m:r>
+                      <a:rPr lang="en-US" sz="1600" b="0" i="1" smtClean="0">
+                        <a:solidFill>
+                          <a:srgbClr val="C00000"/>
+                        </a:solidFill>
+                        <a:latin typeface="Cambria Math" panose="02040503050406030204" pitchFamily="18" charset="0"/>
+                        <a:cs typeface="Arial" panose="020B0604020202020204" pitchFamily="34" charset="0"/>
+                      </a:rPr>
+                      <m:t>𝑞</m:t>
+                    </m:r>
+                    <m:r>
+                      <a:rPr lang="en-US" sz="1600" b="0" i="1" smtClean="0">
+                        <a:solidFill>
+                          <a:srgbClr val="C00000"/>
+                        </a:solidFill>
+                        <a:latin typeface="Cambria Math" panose="02040503050406030204" pitchFamily="18" charset="0"/>
+                        <a:cs typeface="Arial" panose="020B0604020202020204" pitchFamily="34" charset="0"/>
+                      </a:rPr>
+                      <m:t>=3</m:t>
+                    </m:r>
+                  </m:oMath>
+                </a14:m>
+                <a:r>
+                  <a:rPr lang="en-US" sz="1600" dirty="0">
+                    <a:solidFill>
+                      <a:srgbClr val="C00000"/>
+                    </a:solidFill>
+                    <a:effectLst/>
+                    <a:latin typeface="Arial" panose="020B0604020202020204" pitchFamily="34" charset="0"/>
+                    <a:cs typeface="Arial" panose="020B0604020202020204" pitchFamily="34" charset="0"/>
+                  </a:rPr>
+                  <a:t> fm</a:t>
+                </a:r>
+                <a:r>
+                  <a:rPr lang="en-US" sz="1600" baseline="30000" dirty="0">
+                    <a:solidFill>
+                      <a:srgbClr val="C00000"/>
+                    </a:solidFill>
+                    <a:effectLst/>
+                    <a:latin typeface="Arial" panose="020B0604020202020204" pitchFamily="34" charset="0"/>
+                    <a:cs typeface="Arial" panose="020B0604020202020204" pitchFamily="34" charset="0"/>
+                  </a:rPr>
+                  <a:t>-1</a:t>
+                </a:r>
+                <a:r>
+                  <a:rPr lang="en-US" sz="1600" dirty="0">
+                    <a:effectLst/>
+                    <a:latin typeface="Arial" panose="020B0604020202020204" pitchFamily="34" charset="0"/>
+                    <a:cs typeface="Arial" panose="020B0604020202020204" pitchFamily="34" charset="0"/>
+                  </a:rPr>
+                  <a:t>.</a:t>
+                </a:r>
+              </a:p>
+              <a:p>
+                <a:endParaRPr lang="en-US" sz="1600" dirty="0"/>
+              </a:p>
+            </p:txBody>
+          </p:sp>
+        </mc:Choice>
+        <mc:Fallback>
+          <p:sp>
+            <p:nvSpPr>
+              <p:cNvPr id="8" name="TextBox 7">
+                <a:extLst>
+                  <a:ext uri="{FF2B5EF4-FFF2-40B4-BE49-F238E27FC236}">
+                    <a16:creationId xmlns:a16="http://schemas.microsoft.com/office/drawing/2014/main" id="{936A8AA8-0A4D-674E-97C0-5C6F1591DA69}"/>
+                  </a:ext>
+                </a:extLst>
+              </p:cNvPr>
+              <p:cNvSpPr txBox="1">
+                <a:spLocks noRot="1" noChangeAspect="1" noMove="1" noResize="1" noEditPoints="1" noAdjustHandles="1" noChangeArrowheads="1" noChangeShapeType="1" noTextEdit="1"/>
+              </p:cNvSpPr>
+              <p:nvPr/>
+            </p:nvSpPr>
+            <p:spPr>
+              <a:xfrm>
+                <a:off x="5255172" y="6079808"/>
+                <a:ext cx="6989381" cy="890500"/>
+              </a:xfrm>
+              <a:prstGeom prst="rect">
+                <a:avLst/>
+              </a:prstGeom>
+              <a:blipFill>
+                <a:blip r:embed="rId9"/>
+                <a:stretch>
+                  <a:fillRect l="-363" r="-544"/>
+                </a:stretch>
+              </a:blipFill>
+            </p:spPr>
+            <p:txBody>
+              <a:bodyPr/>
+              <a:lstStyle/>
+              <a:p>
+                <a:r>
+                  <a:rPr lang="en-US">
+                    <a:noFill/>
+                  </a:rPr>
+                  <a:t> </a:t>
+                </a:r>
+              </a:p>
+            </p:txBody>
+          </p:sp>
+        </mc:Fallback>
+      </mc:AlternateContent>
     </p:spTree>
     <p:extLst>
       <p:ext uri="{BB962C8B-B14F-4D97-AF65-F5344CB8AC3E}">

</xml_diff>